<commit_message>
added conclusions to ppt and removed init.py
</commit_message>
<xml_diff>
--- a/Analysis/MaJicK Migration.pptx
+++ b/Analysis/MaJicK Migration.pptx
@@ -216,7 +216,7 @@
           <a:p>
             <a:fld id="{D7824BBB-C3D2-4424-8977-FBA5648BD2CA}" type="datetimeFigureOut">
               <a:rPr lang="en-US" smtClean="0"/>
-              <a:t>1/22/2019</a:t>
+              <a:t>1/23/2019</a:t>
             </a:fld>
             <a:endParaRPr lang="en-US"/>
           </a:p>
@@ -785,6 +785,12 @@
               <a:t>They breed in from Nov through Jan in South pole</a:t>
             </a:r>
           </a:p>
+          <a:p>
+            <a:endParaRPr lang="en-US" dirty="0"/>
+          </a:p>
+          <a:p>
+            <a:endParaRPr lang="en-US" dirty="0"/>
+          </a:p>
         </p:txBody>
       </p:sp>
       <p:sp>
@@ -888,7 +894,7 @@
           <a:p>
             <a:fld id="{97ECFEA8-8135-4EB6-9C13-2E1FEF8D1043}" type="slidenum">
               <a:rPr lang="en-US" smtClean="0"/>
-              <a:t>8</a:t>
+              <a:t>5</a:t>
             </a:fld>
             <a:endParaRPr lang="en-US"/>
           </a:p>
@@ -897,7 +903,7 @@
     </p:spTree>
     <p:extLst>
       <p:ext uri="{BB962C8B-B14F-4D97-AF65-F5344CB8AC3E}">
-        <p14:creationId xmlns:p14="http://schemas.microsoft.com/office/powerpoint/2010/main" val="1759403788"/>
+        <p14:creationId xmlns:p14="http://schemas.microsoft.com/office/powerpoint/2010/main" val="935834103"/>
       </p:ext>
     </p:extLst>
   </p:cSld>
@@ -951,6 +957,90 @@
           <a:bodyPr/>
           <a:lstStyle/>
           <a:p>
+            <a:endParaRPr lang="en-US" dirty="0"/>
+          </a:p>
+        </p:txBody>
+      </p:sp>
+      <p:sp>
+        <p:nvSpPr>
+          <p:cNvPr id="4" name="Slide Number Placeholder 3"/>
+          <p:cNvSpPr>
+            <a:spLocks noGrp="1"/>
+          </p:cNvSpPr>
+          <p:nvPr>
+            <p:ph type="sldNum" sz="quarter" idx="5"/>
+          </p:nvPr>
+        </p:nvSpPr>
+        <p:spPr/>
+        <p:txBody>
+          <a:bodyPr/>
+          <a:lstStyle/>
+          <a:p>
+            <a:fld id="{97ECFEA8-8135-4EB6-9C13-2E1FEF8D1043}" type="slidenum">
+              <a:rPr lang="en-US" smtClean="0"/>
+              <a:t>8</a:t>
+            </a:fld>
+            <a:endParaRPr lang="en-US"/>
+          </a:p>
+        </p:txBody>
+      </p:sp>
+    </p:spTree>
+    <p:extLst>
+      <p:ext uri="{BB962C8B-B14F-4D97-AF65-F5344CB8AC3E}">
+        <p14:creationId xmlns:p14="http://schemas.microsoft.com/office/powerpoint/2010/main" val="1759403788"/>
+      </p:ext>
+    </p:extLst>
+  </p:cSld>
+  <p:clrMapOvr>
+    <a:masterClrMapping/>
+  </p:clrMapOvr>
+</p:notes>
+</file>
+
+<file path=ppt/notesSlides/notesSlide6.xml><?xml version="1.0" encoding="utf-8"?>
+<p:notes xmlns:a="http://schemas.openxmlformats.org/drawingml/2006/main" xmlns:r="http://schemas.openxmlformats.org/officeDocument/2006/relationships" xmlns:p="http://schemas.openxmlformats.org/presentationml/2006/main">
+  <p:cSld>
+    <p:spTree>
+      <p:nvGrpSpPr>
+        <p:cNvPr id="1" name=""/>
+        <p:cNvGrpSpPr/>
+        <p:nvPr/>
+      </p:nvGrpSpPr>
+      <p:grpSpPr>
+        <a:xfrm>
+          <a:off x="0" y="0"/>
+          <a:ext cx="0" cy="0"/>
+          <a:chOff x="0" y="0"/>
+          <a:chExt cx="0" cy="0"/>
+        </a:xfrm>
+      </p:grpSpPr>
+      <p:sp>
+        <p:nvSpPr>
+          <p:cNvPr id="2" name="Slide Image Placeholder 1"/>
+          <p:cNvSpPr>
+            <a:spLocks noGrp="1" noRot="1" noChangeAspect="1"/>
+          </p:cNvSpPr>
+          <p:nvPr>
+            <p:ph type="sldImg"/>
+          </p:nvPr>
+        </p:nvSpPr>
+        <p:spPr/>
+      </p:sp>
+      <p:sp>
+        <p:nvSpPr>
+          <p:cNvPr id="3" name="Notes Placeholder 2"/>
+          <p:cNvSpPr>
+            <a:spLocks noGrp="1"/>
+          </p:cNvSpPr>
+          <p:nvPr>
+            <p:ph type="body" idx="1"/>
+          </p:nvPr>
+        </p:nvSpPr>
+        <p:spPr/>
+        <p:txBody>
+          <a:bodyPr/>
+          <a:lstStyle/>
+          <a:p>
             <a:pPr marL="0" marR="0" lvl="0" indent="0" algn="l" defTabSz="914400" rtl="0" eaLnBrk="1" fontAlgn="auto" latinLnBrk="0" hangingPunct="1">
               <a:lnSpc>
                 <a:spcPct val="100000"/>
@@ -971,6 +1061,32 @@
             <a:r>
               <a:rPr lang="en-US" dirty="0"/>
               <a:t>Conclusion could be different if we had the weather data : Due to government shutdown, we could not get to show if the climate change impacted the migratory pattern</a:t>
+            </a:r>
+          </a:p>
+          <a:p>
+            <a:endParaRPr lang="en-US" dirty="0"/>
+          </a:p>
+          <a:p>
+            <a:pPr marL="0" marR="0" lvl="0" indent="0" algn="l" defTabSz="914400" rtl="0" eaLnBrk="1" fontAlgn="auto" latinLnBrk="0" hangingPunct="1">
+              <a:lnSpc>
+                <a:spcPct val="100000"/>
+              </a:lnSpc>
+              <a:spcBef>
+                <a:spcPts val="0"/>
+              </a:spcBef>
+              <a:spcAft>
+                <a:spcPts val="0"/>
+              </a:spcAft>
+              <a:buClrTx/>
+              <a:buSzTx/>
+              <a:buFontTx/>
+              <a:buNone/>
+              <a:tabLst/>
+              <a:defRPr/>
+            </a:pPr>
+            <a:r>
+              <a:rPr lang="en-US" dirty="0"/>
+              <a:t>A further investigation into the correlation between the trends and climate change would help in making a more substantial conclusion</a:t>
             </a:r>
           </a:p>
           <a:p>
@@ -1184,7 +1300,7 @@
           <a:p>
             <a:fld id="{1CF3D951-39D4-484A-88E2-4D5BBFE68F91}" type="datetime1">
               <a:rPr lang="en-US" smtClean="0"/>
-              <a:t>1/22/2019</a:t>
+              <a:t>1/23/2019</a:t>
             </a:fld>
             <a:endParaRPr lang="en-US"/>
           </a:p>
@@ -1454,7 +1570,7 @@
           <a:p>
             <a:fld id="{06EA0C8B-6EBA-4AE7-8439-2FBC35DADD5A}" type="datetime1">
               <a:rPr lang="en-US" smtClean="0"/>
-              <a:t>1/22/2019</a:t>
+              <a:t>1/23/2019</a:t>
             </a:fld>
             <a:endParaRPr lang="en-US"/>
           </a:p>
@@ -1688,7 +1804,7 @@
           <a:p>
             <a:fld id="{0D74A4AA-9818-4507-A9D0-02D8CC5F7648}" type="datetime1">
               <a:rPr lang="en-US" smtClean="0"/>
-              <a:t>1/22/2019</a:t>
+              <a:t>1/23/2019</a:t>
             </a:fld>
             <a:endParaRPr lang="en-US"/>
           </a:p>
@@ -2001,7 +2117,7 @@
           <a:p>
             <a:fld id="{2AC42E96-2F1E-4B3D-AF9C-D040D64C641D}" type="datetime1">
               <a:rPr lang="en-US" smtClean="0"/>
-              <a:t>1/22/2019</a:t>
+              <a:t>1/23/2019</a:t>
             </a:fld>
             <a:endParaRPr lang="en-US"/>
           </a:p>
@@ -2477,7 +2593,7 @@
           <a:p>
             <a:fld id="{2FD78801-14BF-47D5-BAD7-6CCEAE2C8946}" type="datetime1">
               <a:rPr lang="en-US" smtClean="0"/>
-              <a:t>1/22/2019</a:t>
+              <a:t>1/23/2019</a:t>
             </a:fld>
             <a:endParaRPr lang="en-US"/>
           </a:p>
@@ -3027,7 +3143,7 @@
           <a:p>
             <a:fld id="{4F3D5B36-6038-4D00-9183-5B92274B9F1E}" type="datetime1">
               <a:rPr lang="en-US" smtClean="0"/>
-              <a:t>1/22/2019</a:t>
+              <a:t>1/23/2019</a:t>
             </a:fld>
             <a:endParaRPr lang="en-US"/>
           </a:p>
@@ -3804,7 +3920,7 @@
           <a:p>
             <a:fld id="{E090D65B-94A6-43C9-A36D-C8771DF33C06}" type="datetime1">
               <a:rPr lang="en-US" smtClean="0"/>
-              <a:t>1/22/2019</a:t>
+              <a:t>1/23/2019</a:t>
             </a:fld>
             <a:endParaRPr lang="en-US"/>
           </a:p>
@@ -3982,7 +4098,7 @@
           <a:p>
             <a:fld id="{E7DBD45A-91A8-49B1-AD0F-8D53051667DD}" type="datetime1">
               <a:rPr lang="en-US" smtClean="0"/>
-              <a:t>1/22/2019</a:t>
+              <a:t>1/23/2019</a:t>
             </a:fld>
             <a:endParaRPr lang="en-US"/>
           </a:p>
@@ -4208,7 +4324,7 @@
           <a:p>
             <a:fld id="{C1EB5F3C-397D-44F9-928F-45561A1E110A}" type="datetime1">
               <a:rPr lang="en-US" smtClean="0"/>
-              <a:t>1/22/2019</a:t>
+              <a:t>1/23/2019</a:t>
             </a:fld>
             <a:endParaRPr lang="en-US"/>
           </a:p>
@@ -4391,7 +4507,7 @@
           <a:p>
             <a:fld id="{28B125B2-8BF0-4730-B196-2FE4C8C54D7D}" type="datetime1">
               <a:rPr lang="en-US" smtClean="0"/>
-              <a:t>1/22/2019</a:t>
+              <a:t>1/23/2019</a:t>
             </a:fld>
             <a:endParaRPr lang="en-US"/>
           </a:p>
@@ -4683,7 +4799,7 @@
           <a:p>
             <a:fld id="{CB7C1C6D-F811-49BC-A16A-4F97A72E9376}" type="datetime1">
               <a:rPr lang="en-US" smtClean="0"/>
-              <a:t>1/22/2019</a:t>
+              <a:t>1/23/2019</a:t>
             </a:fld>
             <a:endParaRPr lang="en-US"/>
           </a:p>
@@ -4928,7 +5044,7 @@
           <a:p>
             <a:fld id="{B9C9AF56-2852-4457-B4DC-EF33E7840CF9}" type="datetime1">
               <a:rPr lang="en-US" smtClean="0"/>
-              <a:t>1/22/2019</a:t>
+              <a:t>1/23/2019</a:t>
             </a:fld>
             <a:endParaRPr lang="en-US"/>
           </a:p>
@@ -5315,7 +5431,7 @@
           <a:p>
             <a:fld id="{EE6C6051-4E33-4E42-BAD7-81A4FF935859}" type="datetime1">
               <a:rPr lang="en-US" smtClean="0"/>
-              <a:t>1/22/2019</a:t>
+              <a:t>1/23/2019</a:t>
             </a:fld>
             <a:endParaRPr lang="en-US"/>
           </a:p>
@@ -5441,7 +5557,7 @@
           <a:p>
             <a:fld id="{0C351873-2F7D-4F55-92D0-322D7B1361CF}" type="datetime1">
               <a:rPr lang="en-US" smtClean="0"/>
-              <a:t>1/22/2019</a:t>
+              <a:t>1/23/2019</a:t>
             </a:fld>
             <a:endParaRPr lang="en-US"/>
           </a:p>
@@ -5539,7 +5655,7 @@
           <a:p>
             <a:fld id="{C8797AEC-04D2-4B0E-9942-432D2D8A7EF7}" type="datetime1">
               <a:rPr lang="en-US" smtClean="0"/>
-              <a:t>1/22/2019</a:t>
+              <a:t>1/23/2019</a:t>
             </a:fld>
             <a:endParaRPr lang="en-US"/>
           </a:p>
@@ -5791,7 +5907,7 @@
           <a:p>
             <a:fld id="{91E7ED8B-B3B6-48FA-B0A8-BE34286099D0}" type="datetime1">
               <a:rPr lang="en-US" smtClean="0"/>
-              <a:t>1/22/2019</a:t>
+              <a:t>1/23/2019</a:t>
             </a:fld>
             <a:endParaRPr lang="en-US"/>
           </a:p>
@@ -6056,7 +6172,7 @@
           <a:p>
             <a:fld id="{A020F5B3-1967-4242-89AB-58158419561D}" type="datetime1">
               <a:rPr lang="en-US" smtClean="0"/>
-              <a:t>1/22/2019</a:t>
+              <a:t>1/23/2019</a:t>
             </a:fld>
             <a:endParaRPr lang="en-US"/>
           </a:p>
@@ -6302,7 +6418,7 @@
           <a:p>
             <a:fld id="{3CC0810C-4CEA-4232-8175-16B8DE980015}" type="datetime1">
               <a:rPr lang="en-US" smtClean="0"/>
-              <a:t>1/22/2019</a:t>
+              <a:t>1/23/2019</a:t>
             </a:fld>
             <a:endParaRPr lang="en-US"/>
           </a:p>
@@ -7055,7 +7171,1380 @@
           <p:nvPr>
             <p:extLst>
               <p:ext uri="{D42A27DB-BD31-4B8C-83A1-F6EECF244321}">
-                <p14:modId xmlns:p14="http://schemas.microsoft.com/office/powerpoint/2010/main" val="3662966044"/>
+                <p14:modId xmlns:p14="http://schemas.microsoft.com/office/powerpoint/2010/main" val="3844468959"/>
+              </p:ext>
+            </p:extLst>
+          </p:nvPr>
+        </p:nvGraphicFramePr>
+        <p:xfrm>
+          <a:off x="706046" y="3144874"/>
+          <a:ext cx="4649726" cy="1849120"/>
+        </p:xfrm>
+        <a:graphic>
+          <a:graphicData uri="http://schemas.openxmlformats.org/drawingml/2006/table">
+            <a:tbl>
+              <a:tblPr firstRow="1" bandRow="1">
+                <a:tableStyleId>{5C22544A-7EE6-4342-B048-85BDC9FD1C3A}</a:tableStyleId>
+              </a:tblPr>
+              <a:tblGrid>
+                <a:gridCol w="2324863">
+                  <a:extLst>
+                    <a:ext uri="{9D8B030D-6E8A-4147-A177-3AD203B41FA5}">
+                      <a16:colId xmlns:a16="http://schemas.microsoft.com/office/drawing/2014/main" val="3245679234"/>
+                    </a:ext>
+                  </a:extLst>
+                </a:gridCol>
+                <a:gridCol w="2324863">
+                  <a:extLst>
+                    <a:ext uri="{9D8B030D-6E8A-4147-A177-3AD203B41FA5}">
+                      <a16:colId xmlns:a16="http://schemas.microsoft.com/office/drawing/2014/main" val="2484969888"/>
+                    </a:ext>
+                  </a:extLst>
+                </a:gridCol>
+              </a:tblGrid>
+              <a:tr h="223277">
+                <a:tc>
+                  <a:txBody>
+                    <a:bodyPr/>
+                    <a:lstStyle/>
+                    <a:p>
+                      <a:r>
+                        <a:rPr lang="en-US" dirty="0"/>
+                        <a:t>Color</a:t>
+                      </a:r>
+                    </a:p>
+                  </a:txBody>
+                  <a:tcPr>
+                    <a:solidFill>
+                      <a:schemeClr val="bg1">
+                        <a:lumMod val="65000"/>
+                        <a:lumOff val="35000"/>
+                      </a:schemeClr>
+                    </a:solidFill>
+                  </a:tcPr>
+                </a:tc>
+                <a:tc>
+                  <a:txBody>
+                    <a:bodyPr/>
+                    <a:lstStyle/>
+                    <a:p>
+                      <a:r>
+                        <a:rPr lang="en-US" dirty="0"/>
+                        <a:t>Year</a:t>
+                      </a:r>
+                    </a:p>
+                  </a:txBody>
+                  <a:tcPr>
+                    <a:solidFill>
+                      <a:schemeClr val="bg1">
+                        <a:lumMod val="65000"/>
+                        <a:lumOff val="35000"/>
+                      </a:schemeClr>
+                    </a:solidFill>
+                  </a:tcPr>
+                </a:tc>
+                <a:extLst>
+                  <a:ext uri="{0D108BD9-81ED-4DB2-BD59-A6C34878D82A}">
+                    <a16:rowId xmlns:a16="http://schemas.microsoft.com/office/drawing/2014/main" val="4239120380"/>
+                  </a:ext>
+                </a:extLst>
+              </a:tr>
+              <a:tr h="370840">
+                <a:tc>
+                  <a:txBody>
+                    <a:bodyPr/>
+                    <a:lstStyle/>
+                    <a:p>
+                      <a:r>
+                        <a:rPr lang="en-US" dirty="0"/>
+                        <a:t>Black</a:t>
+                      </a:r>
+                    </a:p>
+                  </a:txBody>
+                  <a:tcPr>
+                    <a:solidFill>
+                      <a:schemeClr val="tx1">
+                        <a:lumMod val="95000"/>
+                      </a:schemeClr>
+                    </a:solidFill>
+                  </a:tcPr>
+                </a:tc>
+                <a:tc>
+                  <a:txBody>
+                    <a:bodyPr/>
+                    <a:lstStyle/>
+                    <a:p>
+                      <a:r>
+                        <a:rPr lang="en-US" dirty="0"/>
+                        <a:t>2016</a:t>
+                      </a:r>
+                    </a:p>
+                  </a:txBody>
+                  <a:tcPr>
+                    <a:solidFill>
+                      <a:schemeClr val="tx1">
+                        <a:lumMod val="95000"/>
+                      </a:schemeClr>
+                    </a:solidFill>
+                  </a:tcPr>
+                </a:tc>
+                <a:extLst>
+                  <a:ext uri="{0D108BD9-81ED-4DB2-BD59-A6C34878D82A}">
+                    <a16:rowId xmlns:a16="http://schemas.microsoft.com/office/drawing/2014/main" val="62383164"/>
+                  </a:ext>
+                </a:extLst>
+              </a:tr>
+              <a:tr h="370840">
+                <a:tc>
+                  <a:txBody>
+                    <a:bodyPr/>
+                    <a:lstStyle/>
+                    <a:p>
+                      <a:r>
+                        <a:rPr lang="en-US" dirty="0"/>
+                        <a:t>Red</a:t>
+                      </a:r>
+                    </a:p>
+                  </a:txBody>
+                  <a:tcPr>
+                    <a:solidFill>
+                      <a:schemeClr val="tx2"/>
+                    </a:solidFill>
+                  </a:tcPr>
+                </a:tc>
+                <a:tc>
+                  <a:txBody>
+                    <a:bodyPr/>
+                    <a:lstStyle/>
+                    <a:p>
+                      <a:r>
+                        <a:rPr lang="en-US" dirty="0"/>
+                        <a:t>2006</a:t>
+                      </a:r>
+                    </a:p>
+                  </a:txBody>
+                  <a:tcPr>
+                    <a:solidFill>
+                      <a:schemeClr val="tx2"/>
+                    </a:solidFill>
+                  </a:tcPr>
+                </a:tc>
+                <a:extLst>
+                  <a:ext uri="{0D108BD9-81ED-4DB2-BD59-A6C34878D82A}">
+                    <a16:rowId xmlns:a16="http://schemas.microsoft.com/office/drawing/2014/main" val="2573687272"/>
+                  </a:ext>
+                </a:extLst>
+              </a:tr>
+              <a:tr h="370840">
+                <a:tc>
+                  <a:txBody>
+                    <a:bodyPr/>
+                    <a:lstStyle/>
+                    <a:p>
+                      <a:r>
+                        <a:rPr lang="en-US" dirty="0"/>
+                        <a:t>Purple</a:t>
+                      </a:r>
+                    </a:p>
+                  </a:txBody>
+                  <a:tcPr>
+                    <a:solidFill>
+                      <a:schemeClr val="tx1">
+                        <a:lumMod val="95000"/>
+                      </a:schemeClr>
+                    </a:solidFill>
+                  </a:tcPr>
+                </a:tc>
+                <a:tc>
+                  <a:txBody>
+                    <a:bodyPr/>
+                    <a:lstStyle/>
+                    <a:p>
+                      <a:r>
+                        <a:rPr lang="en-US" dirty="0"/>
+                        <a:t>2000</a:t>
+                      </a:r>
+                    </a:p>
+                  </a:txBody>
+                  <a:tcPr>
+                    <a:solidFill>
+                      <a:schemeClr val="tx1">
+                        <a:lumMod val="95000"/>
+                      </a:schemeClr>
+                    </a:solidFill>
+                  </a:tcPr>
+                </a:tc>
+                <a:extLst>
+                  <a:ext uri="{0D108BD9-81ED-4DB2-BD59-A6C34878D82A}">
+                    <a16:rowId xmlns:a16="http://schemas.microsoft.com/office/drawing/2014/main" val="2158127444"/>
+                  </a:ext>
+                </a:extLst>
+              </a:tr>
+              <a:tr h="370840">
+                <a:tc>
+                  <a:txBody>
+                    <a:bodyPr/>
+                    <a:lstStyle/>
+                    <a:p>
+                      <a:r>
+                        <a:rPr lang="en-US" dirty="0"/>
+                        <a:t>Green</a:t>
+                      </a:r>
+                    </a:p>
+                  </a:txBody>
+                  <a:tcPr>
+                    <a:solidFill>
+                      <a:schemeClr val="tx2"/>
+                    </a:solidFill>
+                  </a:tcPr>
+                </a:tc>
+                <a:tc>
+                  <a:txBody>
+                    <a:bodyPr/>
+                    <a:lstStyle/>
+                    <a:p>
+                      <a:r>
+                        <a:rPr lang="en-US" dirty="0"/>
+                        <a:t>1997</a:t>
+                      </a:r>
+                    </a:p>
+                  </a:txBody>
+                  <a:tcPr>
+                    <a:solidFill>
+                      <a:schemeClr val="tx2"/>
+                    </a:solidFill>
+                  </a:tcPr>
+                </a:tc>
+                <a:extLst>
+                  <a:ext uri="{0D108BD9-81ED-4DB2-BD59-A6C34878D82A}">
+                    <a16:rowId xmlns:a16="http://schemas.microsoft.com/office/drawing/2014/main" val="434505823"/>
+                  </a:ext>
+                </a:extLst>
+              </a:tr>
+            </a:tbl>
+          </a:graphicData>
+        </a:graphic>
+      </p:graphicFrame>
+      <p:pic>
+        <p:nvPicPr>
+          <p:cNvPr id="11" name="Picture 10" descr="A picture containing water, animal, outdoor, bird&#10;&#10;Description automatically generated">
+            <a:extLst>
+              <a:ext uri="{FF2B5EF4-FFF2-40B4-BE49-F238E27FC236}">
+                <a16:creationId xmlns:a16="http://schemas.microsoft.com/office/drawing/2014/main" id="{1B9EA618-2597-48BD-A3CD-F3082CDA8598}"/>
+              </a:ext>
+            </a:extLst>
+          </p:cNvPr>
+          <p:cNvPicPr>
+            <a:picLocks noChangeAspect="1"/>
+          </p:cNvPicPr>
+          <p:nvPr/>
+        </p:nvPicPr>
+        <p:blipFill>
+          <a:blip r:embed="rId2">
+            <a:extLst>
+              <a:ext uri="{28A0092B-C50C-407E-A947-70E740481C1C}">
+                <a14:useLocalDpi xmlns:a14="http://schemas.microsoft.com/office/drawing/2010/main" val="0"/>
+              </a:ext>
+            </a:extLst>
+          </a:blip>
+          <a:stretch>
+            <a:fillRect/>
+          </a:stretch>
+        </p:blipFill>
+        <p:spPr>
+          <a:xfrm>
+            <a:off x="3798125" y="477949"/>
+            <a:ext cx="2472047" cy="1648031"/>
+          </a:xfrm>
+          <a:prstGeom prst="rect">
+            <a:avLst/>
+          </a:prstGeom>
+        </p:spPr>
+      </p:pic>
+      <p:pic>
+        <p:nvPicPr>
+          <p:cNvPr id="7" name="Picture 6">
+            <a:extLst>
+              <a:ext uri="{FF2B5EF4-FFF2-40B4-BE49-F238E27FC236}">
+                <a16:creationId xmlns:a16="http://schemas.microsoft.com/office/drawing/2014/main" id="{C13551CC-8643-4A25-95ED-8C4CE52DA014}"/>
+              </a:ext>
+            </a:extLst>
+          </p:cNvPr>
+          <p:cNvPicPr>
+            <a:picLocks noChangeAspect="1"/>
+          </p:cNvPicPr>
+          <p:nvPr/>
+        </p:nvPicPr>
+        <p:blipFill>
+          <a:blip r:embed="rId3"/>
+          <a:stretch>
+            <a:fillRect/>
+          </a:stretch>
+        </p:blipFill>
+        <p:spPr>
+          <a:xfrm>
+            <a:off x="5530397" y="2250933"/>
+            <a:ext cx="6269717" cy="3967752"/>
+          </a:xfrm>
+          <a:prstGeom prst="rect">
+            <a:avLst/>
+          </a:prstGeom>
+        </p:spPr>
+      </p:pic>
+    </p:spTree>
+    <p:extLst>
+      <p:ext uri="{BB962C8B-B14F-4D97-AF65-F5344CB8AC3E}">
+        <p14:creationId xmlns:p14="http://schemas.microsoft.com/office/powerpoint/2010/main" val="2683587537"/>
+      </p:ext>
+    </p:extLst>
+  </p:cSld>
+  <p:clrMapOvr>
+    <a:masterClrMapping/>
+  </p:clrMapOvr>
+</p:sld>
+</file>
+
+<file path=ppt/slides/slide11.xml><?xml version="1.0" encoding="utf-8"?>
+<p:sld xmlns:a="http://schemas.openxmlformats.org/drawingml/2006/main" xmlns:r="http://schemas.openxmlformats.org/officeDocument/2006/relationships" xmlns:p="http://schemas.openxmlformats.org/presentationml/2006/main">
+  <p:cSld>
+    <p:spTree>
+      <p:nvGrpSpPr>
+        <p:cNvPr id="1" name=""/>
+        <p:cNvGrpSpPr/>
+        <p:nvPr/>
+      </p:nvGrpSpPr>
+      <p:grpSpPr>
+        <a:xfrm>
+          <a:off x="0" y="0"/>
+          <a:ext cx="0" cy="0"/>
+          <a:chOff x="0" y="0"/>
+          <a:chExt cx="0" cy="0"/>
+        </a:xfrm>
+      </p:grpSpPr>
+      <p:sp>
+        <p:nvSpPr>
+          <p:cNvPr id="2" name="Title 1">
+            <a:extLst>
+              <a:ext uri="{FF2B5EF4-FFF2-40B4-BE49-F238E27FC236}">
+                <a16:creationId xmlns:a16="http://schemas.microsoft.com/office/drawing/2014/main" id="{49450B5A-480C-4F6A-B228-224360B7B570}"/>
+              </a:ext>
+            </a:extLst>
+          </p:cNvPr>
+          <p:cNvSpPr>
+            <a:spLocks noGrp="1"/>
+          </p:cNvSpPr>
+          <p:nvPr>
+            <p:ph type="title"/>
+          </p:nvPr>
+        </p:nvSpPr>
+        <p:spPr/>
+        <p:txBody>
+          <a:bodyPr/>
+          <a:lstStyle/>
+          <a:p>
+            <a:r>
+              <a:rPr lang="en-US" dirty="0"/>
+              <a:t>Summarize</a:t>
+            </a:r>
+          </a:p>
+        </p:txBody>
+      </p:sp>
+      <p:sp>
+        <p:nvSpPr>
+          <p:cNvPr id="3" name="Content Placeholder 2">
+            <a:extLst>
+              <a:ext uri="{FF2B5EF4-FFF2-40B4-BE49-F238E27FC236}">
+                <a16:creationId xmlns:a16="http://schemas.microsoft.com/office/drawing/2014/main" id="{B899EF6F-80C6-41A5-93D1-6A986E4749DE}"/>
+              </a:ext>
+            </a:extLst>
+          </p:cNvPr>
+          <p:cNvSpPr>
+            <a:spLocks noGrp="1"/>
+          </p:cNvSpPr>
+          <p:nvPr>
+            <p:ph idx="1"/>
+          </p:nvPr>
+        </p:nvSpPr>
+        <p:spPr/>
+        <p:txBody>
+          <a:bodyPr/>
+          <a:lstStyle/>
+          <a:p>
+            <a:r>
+              <a:rPr lang="en-US" dirty="0"/>
+              <a:t>Arctic Terns migrate yearly between the north and south pole </a:t>
+            </a:r>
+          </a:p>
+          <a:p>
+            <a:r>
+              <a:rPr lang="en-US" dirty="0"/>
+              <a:t>No apparent change to pattern over time</a:t>
+            </a:r>
+          </a:p>
+          <a:p>
+            <a:endParaRPr lang="en-US" dirty="0"/>
+          </a:p>
+          <a:p>
+            <a:r>
+              <a:rPr lang="en-US" dirty="0"/>
+              <a:t>Blue Whales have shown some migratory change over time</a:t>
+            </a:r>
+          </a:p>
+          <a:p>
+            <a:r>
+              <a:rPr lang="en-US" dirty="0"/>
+              <a:t>Return to the same latitudes during the </a:t>
+            </a:r>
+            <a:r>
+              <a:rPr lang="en-US"/>
+              <a:t>winter months</a:t>
+            </a:r>
+          </a:p>
+          <a:p>
+            <a:endParaRPr lang="en-US" dirty="0"/>
+          </a:p>
+          <a:p>
+            <a:r>
+              <a:rPr lang="en-US" dirty="0"/>
+              <a:t>Humpback Whales are trending north during Spring and Summer</a:t>
+            </a:r>
+          </a:p>
+          <a:p>
+            <a:r>
+              <a:rPr lang="en-US" dirty="0"/>
+              <a:t>Appear to return to the same latitude during Winter</a:t>
+            </a:r>
+          </a:p>
+        </p:txBody>
+      </p:sp>
+      <p:sp>
+        <p:nvSpPr>
+          <p:cNvPr id="4" name="Footer Placeholder 3">
+            <a:extLst>
+              <a:ext uri="{FF2B5EF4-FFF2-40B4-BE49-F238E27FC236}">
+                <a16:creationId xmlns:a16="http://schemas.microsoft.com/office/drawing/2014/main" id="{F8568461-1865-4FE4-80E6-5E8F2E0737AD}"/>
+              </a:ext>
+            </a:extLst>
+          </p:cNvPr>
+          <p:cNvSpPr>
+            <a:spLocks noGrp="1"/>
+          </p:cNvSpPr>
+          <p:nvPr>
+            <p:ph type="ftr" sz="quarter" idx="11"/>
+          </p:nvPr>
+        </p:nvSpPr>
+        <p:spPr/>
+        <p:txBody>
+          <a:bodyPr/>
+          <a:lstStyle/>
+          <a:p>
+            <a:r>
+              <a:rPr lang="en-US"/>
+              <a:t>MaJicK Migration - Private &amp; Confidential @ 2019</a:t>
+            </a:r>
+          </a:p>
+        </p:txBody>
+      </p:sp>
+    </p:spTree>
+    <p:extLst>
+      <p:ext uri="{BB962C8B-B14F-4D97-AF65-F5344CB8AC3E}">
+        <p14:creationId xmlns:p14="http://schemas.microsoft.com/office/powerpoint/2010/main" val="3635351589"/>
+      </p:ext>
+    </p:extLst>
+  </p:cSld>
+  <p:clrMapOvr>
+    <a:masterClrMapping/>
+  </p:clrMapOvr>
+</p:sld>
+</file>
+
+<file path=ppt/slides/slide12.xml><?xml version="1.0" encoding="utf-8"?>
+<p:sld xmlns:a="http://schemas.openxmlformats.org/drawingml/2006/main" xmlns:r="http://schemas.openxmlformats.org/officeDocument/2006/relationships" xmlns:p="http://schemas.openxmlformats.org/presentationml/2006/main">
+  <p:cSld>
+    <p:spTree>
+      <p:nvGrpSpPr>
+        <p:cNvPr id="1" name=""/>
+        <p:cNvGrpSpPr/>
+        <p:nvPr/>
+      </p:nvGrpSpPr>
+      <p:grpSpPr>
+        <a:xfrm>
+          <a:off x="0" y="0"/>
+          <a:ext cx="0" cy="0"/>
+          <a:chOff x="0" y="0"/>
+          <a:chExt cx="0" cy="0"/>
+        </a:xfrm>
+      </p:grpSpPr>
+      <p:sp>
+        <p:nvSpPr>
+          <p:cNvPr id="4" name="Title 3">
+            <a:extLst>
+              <a:ext uri="{FF2B5EF4-FFF2-40B4-BE49-F238E27FC236}">
+                <a16:creationId xmlns:a16="http://schemas.microsoft.com/office/drawing/2014/main" id="{B8A0B5D1-1D70-48FF-8512-8D9C8630018B}"/>
+              </a:ext>
+            </a:extLst>
+          </p:cNvPr>
+          <p:cNvSpPr>
+            <a:spLocks noGrp="1"/>
+          </p:cNvSpPr>
+          <p:nvPr>
+            <p:ph type="title"/>
+          </p:nvPr>
+        </p:nvSpPr>
+        <p:spPr/>
+        <p:txBody>
+          <a:bodyPr/>
+          <a:lstStyle/>
+          <a:p>
+            <a:r>
+              <a:rPr lang="en-US" dirty="0"/>
+              <a:t>Thank you</a:t>
+            </a:r>
+          </a:p>
+        </p:txBody>
+      </p:sp>
+      <p:sp>
+        <p:nvSpPr>
+          <p:cNvPr id="5" name="Text Placeholder 4">
+            <a:extLst>
+              <a:ext uri="{FF2B5EF4-FFF2-40B4-BE49-F238E27FC236}">
+                <a16:creationId xmlns:a16="http://schemas.microsoft.com/office/drawing/2014/main" id="{4AAF3649-9D81-4BBC-96DB-96A8530DBEC0}"/>
+              </a:ext>
+            </a:extLst>
+          </p:cNvPr>
+          <p:cNvSpPr>
+            <a:spLocks noGrp="1"/>
+          </p:cNvSpPr>
+          <p:nvPr>
+            <p:ph type="body" idx="1"/>
+          </p:nvPr>
+        </p:nvSpPr>
+        <p:spPr/>
+        <p:txBody>
+          <a:bodyPr/>
+          <a:lstStyle/>
+          <a:p>
+            <a:endParaRPr lang="en-US"/>
+          </a:p>
+        </p:txBody>
+      </p:sp>
+      <p:sp>
+        <p:nvSpPr>
+          <p:cNvPr id="6" name="Footer Placeholder 5">
+            <a:extLst>
+              <a:ext uri="{FF2B5EF4-FFF2-40B4-BE49-F238E27FC236}">
+                <a16:creationId xmlns:a16="http://schemas.microsoft.com/office/drawing/2014/main" id="{AB8DAC84-2DEB-4136-B8A8-138713232067}"/>
+              </a:ext>
+            </a:extLst>
+          </p:cNvPr>
+          <p:cNvSpPr>
+            <a:spLocks noGrp="1"/>
+          </p:cNvSpPr>
+          <p:nvPr>
+            <p:ph type="ftr" sz="quarter" idx="11"/>
+          </p:nvPr>
+        </p:nvSpPr>
+        <p:spPr>
+          <a:xfrm>
+            <a:off x="1024467" y="6205604"/>
+            <a:ext cx="6991492" cy="364065"/>
+          </a:xfrm>
+        </p:spPr>
+        <p:txBody>
+          <a:bodyPr/>
+          <a:lstStyle/>
+          <a:p>
+            <a:r>
+              <a:rPr lang="en-US"/>
+              <a:t>MaJicK Migration - Private &amp; Confidential @ 2019</a:t>
+            </a:r>
+            <a:endParaRPr lang="en-US" dirty="0"/>
+          </a:p>
+        </p:txBody>
+      </p:sp>
+    </p:spTree>
+    <p:extLst>
+      <p:ext uri="{BB962C8B-B14F-4D97-AF65-F5344CB8AC3E}">
+        <p14:creationId xmlns:p14="http://schemas.microsoft.com/office/powerpoint/2010/main" val="307642777"/>
+      </p:ext>
+    </p:extLst>
+  </p:cSld>
+  <p:clrMapOvr>
+    <a:masterClrMapping/>
+  </p:clrMapOvr>
+</p:sld>
+</file>
+
+<file path=ppt/slides/slide2.xml><?xml version="1.0" encoding="utf-8"?>
+<p:sld xmlns:a="http://schemas.openxmlformats.org/drawingml/2006/main" xmlns:r="http://schemas.openxmlformats.org/officeDocument/2006/relationships" xmlns:p="http://schemas.openxmlformats.org/presentationml/2006/main">
+  <p:cSld>
+    <p:spTree>
+      <p:nvGrpSpPr>
+        <p:cNvPr id="1" name=""/>
+        <p:cNvGrpSpPr/>
+        <p:nvPr/>
+      </p:nvGrpSpPr>
+      <p:grpSpPr>
+        <a:xfrm>
+          <a:off x="0" y="0"/>
+          <a:ext cx="0" cy="0"/>
+          <a:chOff x="0" y="0"/>
+          <a:chExt cx="0" cy="0"/>
+        </a:xfrm>
+      </p:grpSpPr>
+      <p:sp>
+        <p:nvSpPr>
+          <p:cNvPr id="2" name="Title 1">
+            <a:extLst>
+              <a:ext uri="{FF2B5EF4-FFF2-40B4-BE49-F238E27FC236}">
+                <a16:creationId xmlns:a16="http://schemas.microsoft.com/office/drawing/2014/main" id="{49450B5A-480C-4F6A-B228-224360B7B570}"/>
+              </a:ext>
+            </a:extLst>
+          </p:cNvPr>
+          <p:cNvSpPr>
+            <a:spLocks noGrp="1"/>
+          </p:cNvSpPr>
+          <p:nvPr>
+            <p:ph type="title"/>
+          </p:nvPr>
+        </p:nvSpPr>
+        <p:spPr/>
+        <p:txBody>
+          <a:bodyPr/>
+          <a:lstStyle/>
+          <a:p>
+            <a:r>
+              <a:rPr lang="en-US" dirty="0"/>
+              <a:t>Objectives</a:t>
+            </a:r>
+          </a:p>
+        </p:txBody>
+      </p:sp>
+      <p:sp>
+        <p:nvSpPr>
+          <p:cNvPr id="13" name="Content Placeholder 12">
+            <a:extLst>
+              <a:ext uri="{FF2B5EF4-FFF2-40B4-BE49-F238E27FC236}">
+                <a16:creationId xmlns:a16="http://schemas.microsoft.com/office/drawing/2014/main" id="{917C37C0-617A-4C87-9F0D-FEAA509A5CAD}"/>
+              </a:ext>
+            </a:extLst>
+          </p:cNvPr>
+          <p:cNvSpPr>
+            <a:spLocks noGrp="1"/>
+          </p:cNvSpPr>
+          <p:nvPr>
+            <p:ph idx="1"/>
+          </p:nvPr>
+        </p:nvSpPr>
+        <p:spPr/>
+        <p:txBody>
+          <a:bodyPr/>
+          <a:lstStyle/>
+          <a:p>
+            <a:r>
+              <a:rPr lang="en-US" dirty="0"/>
+              <a:t>Trend Analysis for:</a:t>
+            </a:r>
+          </a:p>
+          <a:p>
+            <a:pPr lvl="1"/>
+            <a:r>
+              <a:rPr lang="en-US" dirty="0"/>
+              <a:t>Arctic Terns</a:t>
+            </a:r>
+          </a:p>
+          <a:p>
+            <a:pPr lvl="1"/>
+            <a:r>
+              <a:rPr lang="en-US" dirty="0"/>
+              <a:t>Blue Whales</a:t>
+            </a:r>
+          </a:p>
+          <a:p>
+            <a:pPr lvl="1"/>
+            <a:r>
+              <a:rPr lang="en-US" dirty="0"/>
+              <a:t>Monarch Butterflies</a:t>
+            </a:r>
+          </a:p>
+          <a:p>
+            <a:pPr lvl="1"/>
+            <a:r>
+              <a:rPr lang="en-US" dirty="0"/>
+              <a:t>Humpback Whales</a:t>
+            </a:r>
+          </a:p>
+        </p:txBody>
+      </p:sp>
+      <p:sp>
+        <p:nvSpPr>
+          <p:cNvPr id="4" name="Footer Placeholder 3">
+            <a:extLst>
+              <a:ext uri="{FF2B5EF4-FFF2-40B4-BE49-F238E27FC236}">
+                <a16:creationId xmlns:a16="http://schemas.microsoft.com/office/drawing/2014/main" id="{0E24B4EA-1F63-4665-8435-56F2D246B66A}"/>
+              </a:ext>
+            </a:extLst>
+          </p:cNvPr>
+          <p:cNvSpPr>
+            <a:spLocks noGrp="1"/>
+          </p:cNvSpPr>
+          <p:nvPr>
+            <p:ph type="ftr" sz="quarter" idx="11"/>
+          </p:nvPr>
+        </p:nvSpPr>
+        <p:spPr/>
+        <p:txBody>
+          <a:bodyPr/>
+          <a:lstStyle/>
+          <a:p>
+            <a:r>
+              <a:rPr lang="en-US"/>
+              <a:t>MaJicK Migration - Private &amp; Confidential @ 2019</a:t>
+            </a:r>
+            <a:endParaRPr lang="en-US" dirty="0"/>
+          </a:p>
+        </p:txBody>
+      </p:sp>
+    </p:spTree>
+    <p:extLst>
+      <p:ext uri="{BB962C8B-B14F-4D97-AF65-F5344CB8AC3E}">
+        <p14:creationId xmlns:p14="http://schemas.microsoft.com/office/powerpoint/2010/main" val="949061266"/>
+      </p:ext>
+    </p:extLst>
+  </p:cSld>
+  <p:clrMapOvr>
+    <a:masterClrMapping/>
+  </p:clrMapOvr>
+</p:sld>
+</file>
+
+<file path=ppt/slides/slide3.xml><?xml version="1.0" encoding="utf-8"?>
+<p:sld xmlns:a="http://schemas.openxmlformats.org/drawingml/2006/main" xmlns:r="http://schemas.openxmlformats.org/officeDocument/2006/relationships" xmlns:p="http://schemas.openxmlformats.org/presentationml/2006/main">
+  <p:cSld>
+    <p:spTree>
+      <p:nvGrpSpPr>
+        <p:cNvPr id="1" name=""/>
+        <p:cNvGrpSpPr/>
+        <p:nvPr/>
+      </p:nvGrpSpPr>
+      <p:grpSpPr>
+        <a:xfrm>
+          <a:off x="0" y="0"/>
+          <a:ext cx="0" cy="0"/>
+          <a:chOff x="0" y="0"/>
+          <a:chExt cx="0" cy="0"/>
+        </a:xfrm>
+      </p:grpSpPr>
+      <p:sp>
+        <p:nvSpPr>
+          <p:cNvPr id="2" name="Title 1">
+            <a:extLst>
+              <a:ext uri="{FF2B5EF4-FFF2-40B4-BE49-F238E27FC236}">
+                <a16:creationId xmlns:a16="http://schemas.microsoft.com/office/drawing/2014/main" id="{49450B5A-480C-4F6A-B228-224360B7B570}"/>
+              </a:ext>
+            </a:extLst>
+          </p:cNvPr>
+          <p:cNvSpPr>
+            <a:spLocks noGrp="1"/>
+          </p:cNvSpPr>
+          <p:nvPr>
+            <p:ph type="title"/>
+          </p:nvPr>
+        </p:nvSpPr>
+        <p:spPr/>
+        <p:txBody>
+          <a:bodyPr/>
+          <a:lstStyle/>
+          <a:p>
+            <a:r>
+              <a:rPr lang="en-US" dirty="0"/>
+              <a:t>Resources</a:t>
+            </a:r>
+          </a:p>
+        </p:txBody>
+      </p:sp>
+      <p:sp>
+        <p:nvSpPr>
+          <p:cNvPr id="3" name="Content Placeholder 2">
+            <a:extLst>
+              <a:ext uri="{FF2B5EF4-FFF2-40B4-BE49-F238E27FC236}">
+                <a16:creationId xmlns:a16="http://schemas.microsoft.com/office/drawing/2014/main" id="{B899EF6F-80C6-41A5-93D1-6A986E4749DE}"/>
+              </a:ext>
+            </a:extLst>
+          </p:cNvPr>
+          <p:cNvSpPr>
+            <a:spLocks noGrp="1"/>
+          </p:cNvSpPr>
+          <p:nvPr>
+            <p:ph idx="1"/>
+          </p:nvPr>
+        </p:nvSpPr>
+        <p:spPr/>
+        <p:txBody>
+          <a:bodyPr/>
+          <a:lstStyle/>
+          <a:p>
+            <a:r>
+              <a:rPr lang="en-US" dirty="0"/>
+              <a:t>Datasets </a:t>
+            </a:r>
+          </a:p>
+          <a:p>
+            <a:pPr lvl="1"/>
+            <a:r>
+              <a:rPr lang="en-US" dirty="0"/>
+              <a:t>OBIS-SEAMAP (</a:t>
+            </a:r>
+            <a:r>
+              <a:rPr lang="en-US" dirty="0">
+                <a:hlinkClick r:id="rId3"/>
+              </a:rPr>
+              <a:t>http://seamap.env.duke.edu/</a:t>
+            </a:r>
+            <a:r>
+              <a:rPr lang="en-US" dirty="0"/>
+              <a:t>)</a:t>
+            </a:r>
+          </a:p>
+          <a:p>
+            <a:pPr lvl="1"/>
+            <a:r>
+              <a:rPr lang="en-US" dirty="0" err="1"/>
+              <a:t>iNaturalists</a:t>
+            </a:r>
+            <a:r>
+              <a:rPr lang="en-US" dirty="0"/>
+              <a:t> (</a:t>
+            </a:r>
+            <a:r>
+              <a:rPr lang="en-US" dirty="0">
+                <a:hlinkClick r:id="rId4"/>
+              </a:rPr>
+              <a:t>https://www.inaturalist.org/</a:t>
+            </a:r>
+            <a:r>
+              <a:rPr lang="en-US" dirty="0"/>
+              <a:t>)</a:t>
+            </a:r>
+          </a:p>
+          <a:p>
+            <a:r>
+              <a:rPr lang="en-US" dirty="0"/>
+              <a:t>Visual Graphics</a:t>
+            </a:r>
+          </a:p>
+          <a:p>
+            <a:pPr lvl="1"/>
+            <a:r>
+              <a:rPr lang="en-US" dirty="0"/>
+              <a:t>Matplotlib</a:t>
+            </a:r>
+          </a:p>
+          <a:p>
+            <a:pPr lvl="1"/>
+            <a:r>
+              <a:rPr lang="en-US" dirty="0"/>
+              <a:t>Google Cloud Platform </a:t>
+            </a:r>
+          </a:p>
+        </p:txBody>
+      </p:sp>
+      <p:sp>
+        <p:nvSpPr>
+          <p:cNvPr id="4" name="Footer Placeholder 3">
+            <a:extLst>
+              <a:ext uri="{FF2B5EF4-FFF2-40B4-BE49-F238E27FC236}">
+                <a16:creationId xmlns:a16="http://schemas.microsoft.com/office/drawing/2014/main" id="{9EEDDCCC-8549-4EDE-B56A-2124E66AF329}"/>
+              </a:ext>
+            </a:extLst>
+          </p:cNvPr>
+          <p:cNvSpPr>
+            <a:spLocks noGrp="1"/>
+          </p:cNvSpPr>
+          <p:nvPr>
+            <p:ph type="ftr" sz="quarter" idx="11"/>
+          </p:nvPr>
+        </p:nvSpPr>
+        <p:spPr/>
+        <p:txBody>
+          <a:bodyPr/>
+          <a:lstStyle/>
+          <a:p>
+            <a:r>
+              <a:rPr lang="en-US"/>
+              <a:t>MaJicK Migration - Private &amp; Confidential @ 2019</a:t>
+            </a:r>
+            <a:endParaRPr lang="en-US" dirty="0"/>
+          </a:p>
+        </p:txBody>
+      </p:sp>
+    </p:spTree>
+    <p:extLst>
+      <p:ext uri="{BB962C8B-B14F-4D97-AF65-F5344CB8AC3E}">
+        <p14:creationId xmlns:p14="http://schemas.microsoft.com/office/powerpoint/2010/main" val="1560771619"/>
+      </p:ext>
+    </p:extLst>
+  </p:cSld>
+  <p:clrMapOvr>
+    <a:masterClrMapping/>
+  </p:clrMapOvr>
+</p:sld>
+</file>
+
+<file path=ppt/slides/slide4.xml><?xml version="1.0" encoding="utf-8"?>
+<p:sld xmlns:a="http://schemas.openxmlformats.org/drawingml/2006/main" xmlns:r="http://schemas.openxmlformats.org/officeDocument/2006/relationships" xmlns:p="http://schemas.openxmlformats.org/presentationml/2006/main">
+  <p:cSld>
+    <p:spTree>
+      <p:nvGrpSpPr>
+        <p:cNvPr id="1" name=""/>
+        <p:cNvGrpSpPr/>
+        <p:nvPr/>
+      </p:nvGrpSpPr>
+      <p:grpSpPr>
+        <a:xfrm>
+          <a:off x="0" y="0"/>
+          <a:ext cx="0" cy="0"/>
+          <a:chOff x="0" y="0"/>
+          <a:chExt cx="0" cy="0"/>
+        </a:xfrm>
+      </p:grpSpPr>
+      <p:sp>
+        <p:nvSpPr>
+          <p:cNvPr id="2" name="Title 1">
+            <a:extLst>
+              <a:ext uri="{FF2B5EF4-FFF2-40B4-BE49-F238E27FC236}">
+                <a16:creationId xmlns:a16="http://schemas.microsoft.com/office/drawing/2014/main" id="{49450B5A-480C-4F6A-B228-224360B7B570}"/>
+              </a:ext>
+            </a:extLst>
+          </p:cNvPr>
+          <p:cNvSpPr>
+            <a:spLocks noGrp="1"/>
+          </p:cNvSpPr>
+          <p:nvPr>
+            <p:ph type="title"/>
+          </p:nvPr>
+        </p:nvSpPr>
+        <p:spPr/>
+        <p:txBody>
+          <a:bodyPr/>
+          <a:lstStyle/>
+          <a:p>
+            <a:r>
+              <a:rPr lang="en-US" dirty="0"/>
+              <a:t>Arctic Tern</a:t>
+            </a:r>
+          </a:p>
+        </p:txBody>
+      </p:sp>
+      <p:sp>
+        <p:nvSpPr>
+          <p:cNvPr id="4" name="Footer Placeholder 3">
+            <a:extLst>
+              <a:ext uri="{FF2B5EF4-FFF2-40B4-BE49-F238E27FC236}">
+                <a16:creationId xmlns:a16="http://schemas.microsoft.com/office/drawing/2014/main" id="{F39983D3-0428-4049-88EC-CCF238772BFA}"/>
+              </a:ext>
+            </a:extLst>
+          </p:cNvPr>
+          <p:cNvSpPr>
+            <a:spLocks noGrp="1"/>
+          </p:cNvSpPr>
+          <p:nvPr>
+            <p:ph type="ftr" sz="quarter" idx="11"/>
+          </p:nvPr>
+        </p:nvSpPr>
+        <p:spPr/>
+        <p:txBody>
+          <a:bodyPr/>
+          <a:lstStyle/>
+          <a:p>
+            <a:r>
+              <a:rPr lang="en-US"/>
+              <a:t>MaJicK Migration - Private &amp; Confidential @ 2019</a:t>
+            </a:r>
+          </a:p>
+        </p:txBody>
+      </p:sp>
+      <p:pic>
+        <p:nvPicPr>
+          <p:cNvPr id="5" name="Content Placeholder 5" descr="A bird standing next to a body of water&#10;&#10;Description automatically generated">
+            <a:extLst>
+              <a:ext uri="{FF2B5EF4-FFF2-40B4-BE49-F238E27FC236}">
+                <a16:creationId xmlns:a16="http://schemas.microsoft.com/office/drawing/2014/main" id="{A78660CF-AA7B-426A-A132-ABA8345F2475}"/>
+              </a:ext>
+            </a:extLst>
+          </p:cNvPr>
+          <p:cNvPicPr>
+            <a:picLocks noChangeAspect="1"/>
+          </p:cNvPicPr>
+          <p:nvPr/>
+        </p:nvPicPr>
+        <p:blipFill>
+          <a:blip r:embed="rId3">
+            <a:extLst>
+              <a:ext uri="{28A0092B-C50C-407E-A947-70E740481C1C}">
+                <a14:useLocalDpi xmlns:a14="http://schemas.microsoft.com/office/drawing/2010/main" val="0"/>
+              </a:ext>
+            </a:extLst>
+          </a:blip>
+          <a:stretch>
+            <a:fillRect/>
+          </a:stretch>
+        </p:blipFill>
+        <p:spPr>
+          <a:xfrm>
+            <a:off x="4724728" y="514720"/>
+            <a:ext cx="2742543" cy="1542680"/>
+          </a:xfrm>
+          <a:prstGeom prst="rect">
+            <a:avLst/>
+          </a:prstGeom>
+        </p:spPr>
+      </p:pic>
+      <p:sp>
+        <p:nvSpPr>
+          <p:cNvPr id="15" name="Content Placeholder 14">
+            <a:extLst>
+              <a:ext uri="{FF2B5EF4-FFF2-40B4-BE49-F238E27FC236}">
+                <a16:creationId xmlns:a16="http://schemas.microsoft.com/office/drawing/2014/main" id="{BEB2D8DF-8BCE-43BD-8550-7D8C5BAFACA0}"/>
+              </a:ext>
+            </a:extLst>
+          </p:cNvPr>
+          <p:cNvSpPr>
+            <a:spLocks noGrp="1"/>
+          </p:cNvSpPr>
+          <p:nvPr>
+            <p:ph idx="1"/>
+          </p:nvPr>
+        </p:nvSpPr>
+        <p:spPr/>
+        <p:txBody>
+          <a:bodyPr/>
+          <a:lstStyle/>
+          <a:p>
+            <a:r>
+              <a:rPr lang="en-US" dirty="0"/>
+              <a:t>Migration Pattern and time frame</a:t>
+            </a:r>
+          </a:p>
+          <a:p>
+            <a:r>
+              <a:rPr lang="en-US" dirty="0"/>
+              <a:t>Observable Trends</a:t>
+            </a:r>
+          </a:p>
+        </p:txBody>
+      </p:sp>
+      <p:pic>
+        <p:nvPicPr>
+          <p:cNvPr id="3" name="Picture 2">
+            <a:extLst>
+              <a:ext uri="{FF2B5EF4-FFF2-40B4-BE49-F238E27FC236}">
+                <a16:creationId xmlns:a16="http://schemas.microsoft.com/office/drawing/2014/main" id="{48EC9E94-A012-4765-9C03-415A55EC0199}"/>
+              </a:ext>
+            </a:extLst>
+          </p:cNvPr>
+          <p:cNvPicPr>
+            <a:picLocks noChangeAspect="1"/>
+          </p:cNvPicPr>
+          <p:nvPr/>
+        </p:nvPicPr>
+        <p:blipFill>
+          <a:blip r:embed="rId4"/>
+          <a:stretch>
+            <a:fillRect/>
+          </a:stretch>
+        </p:blipFill>
+        <p:spPr>
+          <a:xfrm>
+            <a:off x="5907869" y="2194559"/>
+            <a:ext cx="5501100" cy="3899068"/>
+          </a:xfrm>
+          <a:prstGeom prst="rect">
+            <a:avLst/>
+          </a:prstGeom>
+        </p:spPr>
+      </p:pic>
+    </p:spTree>
+    <p:extLst>
+      <p:ext uri="{BB962C8B-B14F-4D97-AF65-F5344CB8AC3E}">
+        <p14:creationId xmlns:p14="http://schemas.microsoft.com/office/powerpoint/2010/main" val="1404766003"/>
+      </p:ext>
+    </p:extLst>
+  </p:cSld>
+  <p:clrMapOvr>
+    <a:masterClrMapping/>
+  </p:clrMapOvr>
+</p:sld>
+</file>
+
+<file path=ppt/slides/slide5.xml><?xml version="1.0" encoding="utf-8"?>
+<p:sld xmlns:a="http://schemas.openxmlformats.org/drawingml/2006/main" xmlns:r="http://schemas.openxmlformats.org/officeDocument/2006/relationships" xmlns:p="http://schemas.openxmlformats.org/presentationml/2006/main">
+  <p:cSld>
+    <p:spTree>
+      <p:nvGrpSpPr>
+        <p:cNvPr id="1" name=""/>
+        <p:cNvGrpSpPr/>
+        <p:nvPr/>
+      </p:nvGrpSpPr>
+      <p:grpSpPr>
+        <a:xfrm>
+          <a:off x="0" y="0"/>
+          <a:ext cx="0" cy="0"/>
+          <a:chOff x="0" y="0"/>
+          <a:chExt cx="0" cy="0"/>
+        </a:xfrm>
+      </p:grpSpPr>
+      <p:sp>
+        <p:nvSpPr>
+          <p:cNvPr id="2" name="Title 1">
+            <a:extLst>
+              <a:ext uri="{FF2B5EF4-FFF2-40B4-BE49-F238E27FC236}">
+                <a16:creationId xmlns:a16="http://schemas.microsoft.com/office/drawing/2014/main" id="{49450B5A-480C-4F6A-B228-224360B7B570}"/>
+              </a:ext>
+            </a:extLst>
+          </p:cNvPr>
+          <p:cNvSpPr>
+            <a:spLocks noGrp="1"/>
+          </p:cNvSpPr>
+          <p:nvPr>
+            <p:ph type="title"/>
+          </p:nvPr>
+        </p:nvSpPr>
+        <p:spPr/>
+        <p:txBody>
+          <a:bodyPr/>
+          <a:lstStyle/>
+          <a:p>
+            <a:r>
+              <a:rPr lang="en-US" dirty="0"/>
+              <a:t>Arctic Tern</a:t>
+            </a:r>
+          </a:p>
+        </p:txBody>
+      </p:sp>
+      <p:sp>
+        <p:nvSpPr>
+          <p:cNvPr id="6" name="Text Placeholder 5">
+            <a:extLst>
+              <a:ext uri="{FF2B5EF4-FFF2-40B4-BE49-F238E27FC236}">
+                <a16:creationId xmlns:a16="http://schemas.microsoft.com/office/drawing/2014/main" id="{27AD3F13-CC89-430F-AE55-EF7E3833E37C}"/>
+              </a:ext>
+            </a:extLst>
+          </p:cNvPr>
+          <p:cNvSpPr>
+            <a:spLocks noGrp="1"/>
+          </p:cNvSpPr>
+          <p:nvPr>
+            <p:ph type="body" idx="1"/>
+          </p:nvPr>
+        </p:nvSpPr>
+        <p:spPr>
+          <a:xfrm>
+            <a:off x="682627" y="2183802"/>
+            <a:ext cx="5311774" cy="823912"/>
+          </a:xfrm>
+        </p:spPr>
+        <p:txBody>
+          <a:bodyPr/>
+          <a:lstStyle/>
+          <a:p>
+            <a:r>
+              <a:rPr lang="en-US" dirty="0"/>
+              <a:t>Legend</a:t>
+            </a:r>
+          </a:p>
+        </p:txBody>
+      </p:sp>
+      <p:sp>
+        <p:nvSpPr>
+          <p:cNvPr id="8" name="Content Placeholder 7">
+            <a:extLst>
+              <a:ext uri="{FF2B5EF4-FFF2-40B4-BE49-F238E27FC236}">
+                <a16:creationId xmlns:a16="http://schemas.microsoft.com/office/drawing/2014/main" id="{DF22A40A-C311-4A2D-A308-8C7AD6B3C279}"/>
+              </a:ext>
+            </a:extLst>
+          </p:cNvPr>
+          <p:cNvSpPr>
+            <a:spLocks noGrp="1"/>
+          </p:cNvSpPr>
+          <p:nvPr>
+            <p:ph sz="half" idx="2"/>
+          </p:nvPr>
+        </p:nvSpPr>
+        <p:spPr>
+          <a:xfrm>
+            <a:off x="685800" y="3132666"/>
+            <a:ext cx="5311775" cy="3086019"/>
+          </a:xfrm>
+        </p:spPr>
+        <p:txBody>
+          <a:bodyPr/>
+          <a:lstStyle/>
+          <a:p>
+            <a:endParaRPr lang="en-US" dirty="0"/>
+          </a:p>
+        </p:txBody>
+      </p:sp>
+      <p:sp>
+        <p:nvSpPr>
+          <p:cNvPr id="9" name="Text Placeholder 8">
+            <a:extLst>
+              <a:ext uri="{FF2B5EF4-FFF2-40B4-BE49-F238E27FC236}">
+                <a16:creationId xmlns:a16="http://schemas.microsoft.com/office/drawing/2014/main" id="{837B58F8-790A-4252-A2FC-1F567A878181}"/>
+              </a:ext>
+            </a:extLst>
+          </p:cNvPr>
+          <p:cNvSpPr>
+            <a:spLocks noGrp="1"/>
+          </p:cNvSpPr>
+          <p:nvPr>
+            <p:ph type="body" sz="quarter" idx="3"/>
+          </p:nvPr>
+        </p:nvSpPr>
+        <p:spPr/>
+        <p:txBody>
+          <a:bodyPr/>
+          <a:lstStyle/>
+          <a:p>
+            <a:endParaRPr lang="en-US"/>
+          </a:p>
+        </p:txBody>
+      </p:sp>
+      <p:sp>
+        <p:nvSpPr>
+          <p:cNvPr id="10" name="Content Placeholder 9">
+            <a:extLst>
+              <a:ext uri="{FF2B5EF4-FFF2-40B4-BE49-F238E27FC236}">
+                <a16:creationId xmlns:a16="http://schemas.microsoft.com/office/drawing/2014/main" id="{8C0480EE-8712-4AC6-BA14-45FC7BC09B81}"/>
+              </a:ext>
+            </a:extLst>
+          </p:cNvPr>
+          <p:cNvSpPr>
+            <a:spLocks noGrp="1"/>
+          </p:cNvSpPr>
+          <p:nvPr>
+            <p:ph sz="quarter" idx="4"/>
+          </p:nvPr>
+        </p:nvSpPr>
+        <p:spPr/>
+        <p:txBody>
+          <a:bodyPr/>
+          <a:lstStyle/>
+          <a:p>
+            <a:endParaRPr lang="en-US"/>
+          </a:p>
+        </p:txBody>
+      </p:sp>
+      <p:sp>
+        <p:nvSpPr>
+          <p:cNvPr id="4" name="Footer Placeholder 3">
+            <a:extLst>
+              <a:ext uri="{FF2B5EF4-FFF2-40B4-BE49-F238E27FC236}">
+                <a16:creationId xmlns:a16="http://schemas.microsoft.com/office/drawing/2014/main" id="{F39983D3-0428-4049-88EC-CCF238772BFA}"/>
+              </a:ext>
+            </a:extLst>
+          </p:cNvPr>
+          <p:cNvSpPr>
+            <a:spLocks noGrp="1"/>
+          </p:cNvSpPr>
+          <p:nvPr>
+            <p:ph type="ftr" sz="quarter" idx="11"/>
+          </p:nvPr>
+        </p:nvSpPr>
+        <p:spPr/>
+        <p:txBody>
+          <a:bodyPr/>
+          <a:lstStyle/>
+          <a:p>
+            <a:r>
+              <a:rPr lang="en-US"/>
+              <a:t>MaJicK Migration - Private &amp; Confidential @ 2019</a:t>
+            </a:r>
+          </a:p>
+        </p:txBody>
+      </p:sp>
+      <p:pic>
+        <p:nvPicPr>
+          <p:cNvPr id="5" name="Content Placeholder 5" descr="A bird standing next to a body of water&#10;&#10;Description automatically generated">
+            <a:extLst>
+              <a:ext uri="{FF2B5EF4-FFF2-40B4-BE49-F238E27FC236}">
+                <a16:creationId xmlns:a16="http://schemas.microsoft.com/office/drawing/2014/main" id="{A78660CF-AA7B-426A-A132-ABA8345F2475}"/>
+              </a:ext>
+            </a:extLst>
+          </p:cNvPr>
+          <p:cNvPicPr>
+            <a:picLocks noChangeAspect="1"/>
+          </p:cNvPicPr>
+          <p:nvPr/>
+        </p:nvPicPr>
+        <p:blipFill>
+          <a:blip r:embed="rId3">
+            <a:extLst>
+              <a:ext uri="{28A0092B-C50C-407E-A947-70E740481C1C}">
+                <a14:useLocalDpi xmlns:a14="http://schemas.microsoft.com/office/drawing/2010/main" val="0"/>
+              </a:ext>
+            </a:extLst>
+          </a:blip>
+          <a:stretch>
+            <a:fillRect/>
+          </a:stretch>
+        </p:blipFill>
+        <p:spPr>
+          <a:xfrm>
+            <a:off x="4724728" y="514720"/>
+            <a:ext cx="2742543" cy="1542680"/>
+          </a:xfrm>
+          <a:prstGeom prst="rect">
+            <a:avLst/>
+          </a:prstGeom>
+        </p:spPr>
+      </p:pic>
+      <p:pic>
+        <p:nvPicPr>
+          <p:cNvPr id="3" name="Picture 2">
+            <a:extLst>
+              <a:ext uri="{FF2B5EF4-FFF2-40B4-BE49-F238E27FC236}">
+                <a16:creationId xmlns:a16="http://schemas.microsoft.com/office/drawing/2014/main" id="{71600A87-3B21-4DE7-8390-CE285931D6AD}"/>
+              </a:ext>
+            </a:extLst>
+          </p:cNvPr>
+          <p:cNvPicPr>
+            <a:picLocks noChangeAspect="1"/>
+          </p:cNvPicPr>
+          <p:nvPr/>
+        </p:nvPicPr>
+        <p:blipFill>
+          <a:blip r:embed="rId4"/>
+          <a:stretch>
+            <a:fillRect/>
+          </a:stretch>
+        </p:blipFill>
+        <p:spPr>
+          <a:xfrm>
+            <a:off x="6172200" y="2194560"/>
+            <a:ext cx="5605672" cy="4024125"/>
+          </a:xfrm>
+          <a:prstGeom prst="rect">
+            <a:avLst/>
+          </a:prstGeom>
+        </p:spPr>
+      </p:pic>
+      <p:graphicFrame>
+        <p:nvGraphicFramePr>
+          <p:cNvPr id="14" name="Content Placeholder 10">
+            <a:extLst>
+              <a:ext uri="{FF2B5EF4-FFF2-40B4-BE49-F238E27FC236}">
+                <a16:creationId xmlns:a16="http://schemas.microsoft.com/office/drawing/2014/main" id="{0684B05F-51C8-422E-B0A8-1FB439521667}"/>
+              </a:ext>
+            </a:extLst>
+          </p:cNvPr>
+          <p:cNvGraphicFramePr>
+            <a:graphicFrameLocks/>
+          </p:cNvGraphicFramePr>
+          <p:nvPr>
+            <p:extLst>
+              <p:ext uri="{D42A27DB-BD31-4B8C-83A1-F6EECF244321}">
+                <p14:modId xmlns:p14="http://schemas.microsoft.com/office/powerpoint/2010/main" val="2932743281"/>
               </p:ext>
             </p:extLst>
           </p:nvPr>
@@ -7098,7 +8587,14 @@
                       </a:r>
                     </a:p>
                   </a:txBody>
-                  <a:tcPr/>
+                  <a:tcPr>
+                    <a:solidFill>
+                      <a:schemeClr val="bg1">
+                        <a:lumMod val="75000"/>
+                        <a:lumOff val="25000"/>
+                      </a:schemeClr>
+                    </a:solidFill>
+                  </a:tcPr>
                 </a:tc>
                 <a:tc>
                   <a:txBody>
@@ -7111,7 +8607,14 @@
                       </a:r>
                     </a:p>
                   </a:txBody>
-                  <a:tcPr/>
+                  <a:tcPr>
+                    <a:solidFill>
+                      <a:schemeClr val="bg1">
+                        <a:lumMod val="75000"/>
+                        <a:lumOff val="25000"/>
+                      </a:schemeClr>
+                    </a:solidFill>
+                  </a:tcPr>
                 </a:tc>
                 <a:extLst>
                   <a:ext uri="{0D108BD9-81ED-4DB2-BD59-A6C34878D82A}">
@@ -7127,11 +8630,17 @@
                     <a:p>
                       <a:r>
                         <a:rPr lang="en-US" dirty="0"/>
-                        <a:t>Black</a:t>
+                        <a:t>White</a:t>
                       </a:r>
                     </a:p>
                   </a:txBody>
-                  <a:tcPr/>
+                  <a:tcPr>
+                    <a:solidFill>
+                      <a:schemeClr val="tx1">
+                        <a:lumMod val="95000"/>
+                      </a:schemeClr>
+                    </a:solidFill>
+                  </a:tcPr>
                 </a:tc>
                 <a:tc>
                   <a:txBody>
@@ -7140,11 +8649,17 @@
                     <a:p>
                       <a:r>
                         <a:rPr lang="en-US" dirty="0"/>
-                        <a:t>2016</a:t>
+                        <a:t>2007</a:t>
                       </a:r>
                     </a:p>
                   </a:txBody>
-                  <a:tcPr/>
+                  <a:tcPr>
+                    <a:solidFill>
+                      <a:schemeClr val="tx1">
+                        <a:lumMod val="95000"/>
+                      </a:schemeClr>
+                    </a:solidFill>
+                  </a:tcPr>
                 </a:tc>
                 <a:extLst>
                   <a:ext uri="{0D108BD9-81ED-4DB2-BD59-A6C34878D82A}">
@@ -7160,11 +8675,15 @@
                     <a:p>
                       <a:r>
                         <a:rPr lang="en-US" dirty="0"/>
-                        <a:t>Red</a:t>
+                        <a:t>Green</a:t>
                       </a:r>
                     </a:p>
                   </a:txBody>
-                  <a:tcPr/>
+                  <a:tcPr>
+                    <a:solidFill>
+                      <a:schemeClr val="tx2"/>
+                    </a:solidFill>
+                  </a:tcPr>
                 </a:tc>
                 <a:tc>
                   <a:txBody>
@@ -7173,11 +8692,18 @@
                     <a:p>
                       <a:r>
                         <a:rPr lang="en-US" dirty="0"/>
-                        <a:t>2006</a:t>
+                        <a:t>1985</a:t>
                       </a:r>
                     </a:p>
                   </a:txBody>
-                  <a:tcPr/>
+                  <a:tcPr>
+                    <a:solidFill>
+                      <a:schemeClr val="bg2">
+                        <a:lumMod val="20000"/>
+                        <a:lumOff val="80000"/>
+                      </a:schemeClr>
+                    </a:solidFill>
+                  </a:tcPr>
                 </a:tc>
                 <a:extLst>
                   <a:ext uri="{0D108BD9-81ED-4DB2-BD59-A6C34878D82A}">
@@ -7197,1291 +8723,13 @@
                       </a:r>
                     </a:p>
                   </a:txBody>
-                  <a:tcPr/>
-                </a:tc>
-                <a:tc>
-                  <a:txBody>
-                    <a:bodyPr/>
-                    <a:lstStyle/>
-                    <a:p>
-                      <a:r>
-                        <a:rPr lang="en-US" dirty="0"/>
-                        <a:t>2000</a:t>
-                      </a:r>
-                    </a:p>
-                  </a:txBody>
-                  <a:tcPr/>
-                </a:tc>
-                <a:extLst>
-                  <a:ext uri="{0D108BD9-81ED-4DB2-BD59-A6C34878D82A}">
-                    <a16:rowId xmlns:a16="http://schemas.microsoft.com/office/drawing/2014/main" val="2158127444"/>
-                  </a:ext>
-                </a:extLst>
-              </a:tr>
-              <a:tr h="370840">
-                <a:tc>
-                  <a:txBody>
-                    <a:bodyPr/>
-                    <a:lstStyle/>
-                    <a:p>
-                      <a:r>
-                        <a:rPr lang="en-US" dirty="0"/>
-                        <a:t>Green</a:t>
-                      </a:r>
-                    </a:p>
-                  </a:txBody>
-                  <a:tcPr/>
-                </a:tc>
-                <a:tc>
-                  <a:txBody>
-                    <a:bodyPr/>
-                    <a:lstStyle/>
-                    <a:p>
-                      <a:r>
-                        <a:rPr lang="en-US" dirty="0"/>
-                        <a:t>1997</a:t>
-                      </a:r>
-                    </a:p>
-                  </a:txBody>
-                  <a:tcPr/>
-                </a:tc>
-                <a:extLst>
-                  <a:ext uri="{0D108BD9-81ED-4DB2-BD59-A6C34878D82A}">
-                    <a16:rowId xmlns:a16="http://schemas.microsoft.com/office/drawing/2014/main" val="434505823"/>
-                  </a:ext>
-                </a:extLst>
-              </a:tr>
-            </a:tbl>
-          </a:graphicData>
-        </a:graphic>
-      </p:graphicFrame>
-      <p:pic>
-        <p:nvPicPr>
-          <p:cNvPr id="11" name="Picture 10" descr="A picture containing water, animal, outdoor, bird&#10;&#10;Description automatically generated">
-            <a:extLst>
-              <a:ext uri="{FF2B5EF4-FFF2-40B4-BE49-F238E27FC236}">
-                <a16:creationId xmlns:a16="http://schemas.microsoft.com/office/drawing/2014/main" id="{1B9EA618-2597-48BD-A3CD-F3082CDA8598}"/>
-              </a:ext>
-            </a:extLst>
-          </p:cNvPr>
-          <p:cNvPicPr>
-            <a:picLocks noChangeAspect="1"/>
-          </p:cNvPicPr>
-          <p:nvPr/>
-        </p:nvPicPr>
-        <p:blipFill>
-          <a:blip r:embed="rId2">
-            <a:extLst>
-              <a:ext uri="{28A0092B-C50C-407E-A947-70E740481C1C}">
-                <a14:useLocalDpi xmlns:a14="http://schemas.microsoft.com/office/drawing/2010/main" val="0"/>
-              </a:ext>
-            </a:extLst>
-          </a:blip>
-          <a:stretch>
-            <a:fillRect/>
-          </a:stretch>
-        </p:blipFill>
-        <p:spPr>
-          <a:xfrm>
-            <a:off x="3798125" y="477949"/>
-            <a:ext cx="2472047" cy="1648031"/>
-          </a:xfrm>
-          <a:prstGeom prst="rect">
-            <a:avLst/>
-          </a:prstGeom>
-        </p:spPr>
-      </p:pic>
-      <p:pic>
-        <p:nvPicPr>
-          <p:cNvPr id="7" name="Picture 6">
-            <a:extLst>
-              <a:ext uri="{FF2B5EF4-FFF2-40B4-BE49-F238E27FC236}">
-                <a16:creationId xmlns:a16="http://schemas.microsoft.com/office/drawing/2014/main" id="{C13551CC-8643-4A25-95ED-8C4CE52DA014}"/>
-              </a:ext>
-            </a:extLst>
-          </p:cNvPr>
-          <p:cNvPicPr>
-            <a:picLocks noChangeAspect="1"/>
-          </p:cNvPicPr>
-          <p:nvPr/>
-        </p:nvPicPr>
-        <p:blipFill>
-          <a:blip r:embed="rId3"/>
-          <a:stretch>
-            <a:fillRect/>
-          </a:stretch>
-        </p:blipFill>
-        <p:spPr>
-          <a:xfrm>
-            <a:off x="6270172" y="2250933"/>
-            <a:ext cx="5215782" cy="3967752"/>
-          </a:xfrm>
-          <a:prstGeom prst="rect">
-            <a:avLst/>
-          </a:prstGeom>
-        </p:spPr>
-      </p:pic>
-    </p:spTree>
-    <p:extLst>
-      <p:ext uri="{BB962C8B-B14F-4D97-AF65-F5344CB8AC3E}">
-        <p14:creationId xmlns:p14="http://schemas.microsoft.com/office/powerpoint/2010/main" val="2683587537"/>
-      </p:ext>
-    </p:extLst>
-  </p:cSld>
-  <p:clrMapOvr>
-    <a:masterClrMapping/>
-  </p:clrMapOvr>
-</p:sld>
-</file>
-
-<file path=ppt/slides/slide11.xml><?xml version="1.0" encoding="utf-8"?>
-<p:sld xmlns:a="http://schemas.openxmlformats.org/drawingml/2006/main" xmlns:r="http://schemas.openxmlformats.org/officeDocument/2006/relationships" xmlns:p="http://schemas.openxmlformats.org/presentationml/2006/main">
-  <p:cSld>
-    <p:spTree>
-      <p:nvGrpSpPr>
-        <p:cNvPr id="1" name=""/>
-        <p:cNvGrpSpPr/>
-        <p:nvPr/>
-      </p:nvGrpSpPr>
-      <p:grpSpPr>
-        <a:xfrm>
-          <a:off x="0" y="0"/>
-          <a:ext cx="0" cy="0"/>
-          <a:chOff x="0" y="0"/>
-          <a:chExt cx="0" cy="0"/>
-        </a:xfrm>
-      </p:grpSpPr>
-      <p:sp>
-        <p:nvSpPr>
-          <p:cNvPr id="2" name="Title 1">
-            <a:extLst>
-              <a:ext uri="{FF2B5EF4-FFF2-40B4-BE49-F238E27FC236}">
-                <a16:creationId xmlns:a16="http://schemas.microsoft.com/office/drawing/2014/main" id="{49450B5A-480C-4F6A-B228-224360B7B570}"/>
-              </a:ext>
-            </a:extLst>
-          </p:cNvPr>
-          <p:cNvSpPr>
-            <a:spLocks noGrp="1"/>
-          </p:cNvSpPr>
-          <p:nvPr>
-            <p:ph type="title"/>
-          </p:nvPr>
-        </p:nvSpPr>
-        <p:spPr/>
-        <p:txBody>
-          <a:bodyPr/>
-          <a:lstStyle/>
-          <a:p>
-            <a:r>
-              <a:rPr lang="en-US" dirty="0"/>
-              <a:t>Summarize</a:t>
-            </a:r>
-          </a:p>
-        </p:txBody>
-      </p:sp>
-      <p:sp>
-        <p:nvSpPr>
-          <p:cNvPr id="3" name="Content Placeholder 2">
-            <a:extLst>
-              <a:ext uri="{FF2B5EF4-FFF2-40B4-BE49-F238E27FC236}">
-                <a16:creationId xmlns:a16="http://schemas.microsoft.com/office/drawing/2014/main" id="{B899EF6F-80C6-41A5-93D1-6A986E4749DE}"/>
-              </a:ext>
-            </a:extLst>
-          </p:cNvPr>
-          <p:cNvSpPr>
-            <a:spLocks noGrp="1"/>
-          </p:cNvSpPr>
-          <p:nvPr>
-            <p:ph idx="1"/>
-          </p:nvPr>
-        </p:nvSpPr>
-        <p:spPr/>
-        <p:txBody>
-          <a:bodyPr/>
-          <a:lstStyle/>
-          <a:p>
-            <a:r>
-              <a:rPr lang="en-US" dirty="0"/>
-              <a:t>Keys observations/ </a:t>
-            </a:r>
-            <a:r>
-              <a:rPr lang="en-US"/>
-              <a:t>trend analysis – TO BE UPDATED BY JUSTIN</a:t>
-            </a:r>
-            <a:endParaRPr lang="en-US" dirty="0"/>
-          </a:p>
-        </p:txBody>
-      </p:sp>
-      <p:sp>
-        <p:nvSpPr>
-          <p:cNvPr id="4" name="Footer Placeholder 3">
-            <a:extLst>
-              <a:ext uri="{FF2B5EF4-FFF2-40B4-BE49-F238E27FC236}">
-                <a16:creationId xmlns:a16="http://schemas.microsoft.com/office/drawing/2014/main" id="{F8568461-1865-4FE4-80E6-5E8F2E0737AD}"/>
-              </a:ext>
-            </a:extLst>
-          </p:cNvPr>
-          <p:cNvSpPr>
-            <a:spLocks noGrp="1"/>
-          </p:cNvSpPr>
-          <p:nvPr>
-            <p:ph type="ftr" sz="quarter" idx="11"/>
-          </p:nvPr>
-        </p:nvSpPr>
-        <p:spPr/>
-        <p:txBody>
-          <a:bodyPr/>
-          <a:lstStyle/>
-          <a:p>
-            <a:r>
-              <a:rPr lang="en-US"/>
-              <a:t>MaJicK Migration - Private &amp; Confidential @ 2019</a:t>
-            </a:r>
-          </a:p>
-        </p:txBody>
-      </p:sp>
-    </p:spTree>
-    <p:extLst>
-      <p:ext uri="{BB962C8B-B14F-4D97-AF65-F5344CB8AC3E}">
-        <p14:creationId xmlns:p14="http://schemas.microsoft.com/office/powerpoint/2010/main" val="3635351589"/>
-      </p:ext>
-    </p:extLst>
-  </p:cSld>
-  <p:clrMapOvr>
-    <a:masterClrMapping/>
-  </p:clrMapOvr>
-</p:sld>
-</file>
-
-<file path=ppt/slides/slide12.xml><?xml version="1.0" encoding="utf-8"?>
-<p:sld xmlns:a="http://schemas.openxmlformats.org/drawingml/2006/main" xmlns:r="http://schemas.openxmlformats.org/officeDocument/2006/relationships" xmlns:p="http://schemas.openxmlformats.org/presentationml/2006/main">
-  <p:cSld>
-    <p:spTree>
-      <p:nvGrpSpPr>
-        <p:cNvPr id="1" name=""/>
-        <p:cNvGrpSpPr/>
-        <p:nvPr/>
-      </p:nvGrpSpPr>
-      <p:grpSpPr>
-        <a:xfrm>
-          <a:off x="0" y="0"/>
-          <a:ext cx="0" cy="0"/>
-          <a:chOff x="0" y="0"/>
-          <a:chExt cx="0" cy="0"/>
-        </a:xfrm>
-      </p:grpSpPr>
-      <p:sp>
-        <p:nvSpPr>
-          <p:cNvPr id="4" name="Title 3">
-            <a:extLst>
-              <a:ext uri="{FF2B5EF4-FFF2-40B4-BE49-F238E27FC236}">
-                <a16:creationId xmlns:a16="http://schemas.microsoft.com/office/drawing/2014/main" id="{B8A0B5D1-1D70-48FF-8512-8D9C8630018B}"/>
-              </a:ext>
-            </a:extLst>
-          </p:cNvPr>
-          <p:cNvSpPr>
-            <a:spLocks noGrp="1"/>
-          </p:cNvSpPr>
-          <p:nvPr>
-            <p:ph type="title"/>
-          </p:nvPr>
-        </p:nvSpPr>
-        <p:spPr/>
-        <p:txBody>
-          <a:bodyPr/>
-          <a:lstStyle/>
-          <a:p>
-            <a:r>
-              <a:rPr lang="en-US" dirty="0"/>
-              <a:t>Thank you</a:t>
-            </a:r>
-          </a:p>
-        </p:txBody>
-      </p:sp>
-      <p:sp>
-        <p:nvSpPr>
-          <p:cNvPr id="5" name="Text Placeholder 4">
-            <a:extLst>
-              <a:ext uri="{FF2B5EF4-FFF2-40B4-BE49-F238E27FC236}">
-                <a16:creationId xmlns:a16="http://schemas.microsoft.com/office/drawing/2014/main" id="{4AAF3649-9D81-4BBC-96DB-96A8530DBEC0}"/>
-              </a:ext>
-            </a:extLst>
-          </p:cNvPr>
-          <p:cNvSpPr>
-            <a:spLocks noGrp="1"/>
-          </p:cNvSpPr>
-          <p:nvPr>
-            <p:ph type="body" idx="1"/>
-          </p:nvPr>
-        </p:nvSpPr>
-        <p:spPr/>
-        <p:txBody>
-          <a:bodyPr/>
-          <a:lstStyle/>
-          <a:p>
-            <a:endParaRPr lang="en-US"/>
-          </a:p>
-        </p:txBody>
-      </p:sp>
-      <p:sp>
-        <p:nvSpPr>
-          <p:cNvPr id="6" name="Footer Placeholder 5">
-            <a:extLst>
-              <a:ext uri="{FF2B5EF4-FFF2-40B4-BE49-F238E27FC236}">
-                <a16:creationId xmlns:a16="http://schemas.microsoft.com/office/drawing/2014/main" id="{AB8DAC84-2DEB-4136-B8A8-138713232067}"/>
-              </a:ext>
-            </a:extLst>
-          </p:cNvPr>
-          <p:cNvSpPr>
-            <a:spLocks noGrp="1"/>
-          </p:cNvSpPr>
-          <p:nvPr>
-            <p:ph type="ftr" sz="quarter" idx="11"/>
-          </p:nvPr>
-        </p:nvSpPr>
-        <p:spPr>
-          <a:xfrm>
-            <a:off x="1024467" y="6205604"/>
-            <a:ext cx="6991492" cy="364065"/>
-          </a:xfrm>
-        </p:spPr>
-        <p:txBody>
-          <a:bodyPr/>
-          <a:lstStyle/>
-          <a:p>
-            <a:r>
-              <a:rPr lang="en-US"/>
-              <a:t>MaJicK Migration - Private &amp; Confidential @ 2019</a:t>
-            </a:r>
-            <a:endParaRPr lang="en-US" dirty="0"/>
-          </a:p>
-        </p:txBody>
-      </p:sp>
-    </p:spTree>
-    <p:extLst>
-      <p:ext uri="{BB962C8B-B14F-4D97-AF65-F5344CB8AC3E}">
-        <p14:creationId xmlns:p14="http://schemas.microsoft.com/office/powerpoint/2010/main" val="307642777"/>
-      </p:ext>
-    </p:extLst>
-  </p:cSld>
-  <p:clrMapOvr>
-    <a:masterClrMapping/>
-  </p:clrMapOvr>
-</p:sld>
-</file>
-
-<file path=ppt/slides/slide2.xml><?xml version="1.0" encoding="utf-8"?>
-<p:sld xmlns:a="http://schemas.openxmlformats.org/drawingml/2006/main" xmlns:r="http://schemas.openxmlformats.org/officeDocument/2006/relationships" xmlns:p="http://schemas.openxmlformats.org/presentationml/2006/main">
-  <p:cSld>
-    <p:spTree>
-      <p:nvGrpSpPr>
-        <p:cNvPr id="1" name=""/>
-        <p:cNvGrpSpPr/>
-        <p:nvPr/>
-      </p:nvGrpSpPr>
-      <p:grpSpPr>
-        <a:xfrm>
-          <a:off x="0" y="0"/>
-          <a:ext cx="0" cy="0"/>
-          <a:chOff x="0" y="0"/>
-          <a:chExt cx="0" cy="0"/>
-        </a:xfrm>
-      </p:grpSpPr>
-      <p:sp>
-        <p:nvSpPr>
-          <p:cNvPr id="2" name="Title 1">
-            <a:extLst>
-              <a:ext uri="{FF2B5EF4-FFF2-40B4-BE49-F238E27FC236}">
-                <a16:creationId xmlns:a16="http://schemas.microsoft.com/office/drawing/2014/main" id="{49450B5A-480C-4F6A-B228-224360B7B570}"/>
-              </a:ext>
-            </a:extLst>
-          </p:cNvPr>
-          <p:cNvSpPr>
-            <a:spLocks noGrp="1"/>
-          </p:cNvSpPr>
-          <p:nvPr>
-            <p:ph type="title"/>
-          </p:nvPr>
-        </p:nvSpPr>
-        <p:spPr/>
-        <p:txBody>
-          <a:bodyPr/>
-          <a:lstStyle/>
-          <a:p>
-            <a:r>
-              <a:rPr lang="en-US" dirty="0"/>
-              <a:t>Objectives</a:t>
-            </a:r>
-          </a:p>
-        </p:txBody>
-      </p:sp>
-      <p:sp>
-        <p:nvSpPr>
-          <p:cNvPr id="13" name="Content Placeholder 12">
-            <a:extLst>
-              <a:ext uri="{FF2B5EF4-FFF2-40B4-BE49-F238E27FC236}">
-                <a16:creationId xmlns:a16="http://schemas.microsoft.com/office/drawing/2014/main" id="{917C37C0-617A-4C87-9F0D-FEAA509A5CAD}"/>
-              </a:ext>
-            </a:extLst>
-          </p:cNvPr>
-          <p:cNvSpPr>
-            <a:spLocks noGrp="1"/>
-          </p:cNvSpPr>
-          <p:nvPr>
-            <p:ph idx="1"/>
-          </p:nvPr>
-        </p:nvSpPr>
-        <p:spPr/>
-        <p:txBody>
-          <a:bodyPr/>
-          <a:lstStyle/>
-          <a:p>
-            <a:r>
-              <a:rPr lang="en-US" dirty="0"/>
-              <a:t>Trend Analysis for:</a:t>
-            </a:r>
-          </a:p>
-          <a:p>
-            <a:pPr lvl="1"/>
-            <a:r>
-              <a:rPr lang="en-US" dirty="0"/>
-              <a:t>Arctic Terns</a:t>
-            </a:r>
-          </a:p>
-          <a:p>
-            <a:pPr lvl="1"/>
-            <a:r>
-              <a:rPr lang="en-US" dirty="0"/>
-              <a:t>Blue Whales</a:t>
-            </a:r>
-          </a:p>
-          <a:p>
-            <a:pPr lvl="1"/>
-            <a:r>
-              <a:rPr lang="en-US" dirty="0"/>
-              <a:t>Monarch Butterflies</a:t>
-            </a:r>
-          </a:p>
-          <a:p>
-            <a:pPr lvl="1"/>
-            <a:r>
-              <a:rPr lang="en-US" dirty="0"/>
-              <a:t>Humpback Whales</a:t>
-            </a:r>
-          </a:p>
-        </p:txBody>
-      </p:sp>
-      <p:sp>
-        <p:nvSpPr>
-          <p:cNvPr id="4" name="Footer Placeholder 3">
-            <a:extLst>
-              <a:ext uri="{FF2B5EF4-FFF2-40B4-BE49-F238E27FC236}">
-                <a16:creationId xmlns:a16="http://schemas.microsoft.com/office/drawing/2014/main" id="{0E24B4EA-1F63-4665-8435-56F2D246B66A}"/>
-              </a:ext>
-            </a:extLst>
-          </p:cNvPr>
-          <p:cNvSpPr>
-            <a:spLocks noGrp="1"/>
-          </p:cNvSpPr>
-          <p:nvPr>
-            <p:ph type="ftr" sz="quarter" idx="11"/>
-          </p:nvPr>
-        </p:nvSpPr>
-        <p:spPr/>
-        <p:txBody>
-          <a:bodyPr/>
-          <a:lstStyle/>
-          <a:p>
-            <a:r>
-              <a:rPr lang="en-US"/>
-              <a:t>MaJicK Migration - Private &amp; Confidential @ 2019</a:t>
-            </a:r>
-            <a:endParaRPr lang="en-US" dirty="0"/>
-          </a:p>
-        </p:txBody>
-      </p:sp>
-    </p:spTree>
-    <p:extLst>
-      <p:ext uri="{BB962C8B-B14F-4D97-AF65-F5344CB8AC3E}">
-        <p14:creationId xmlns:p14="http://schemas.microsoft.com/office/powerpoint/2010/main" val="949061266"/>
-      </p:ext>
-    </p:extLst>
-  </p:cSld>
-  <p:clrMapOvr>
-    <a:masterClrMapping/>
-  </p:clrMapOvr>
-</p:sld>
-</file>
-
-<file path=ppt/slides/slide3.xml><?xml version="1.0" encoding="utf-8"?>
-<p:sld xmlns:a="http://schemas.openxmlformats.org/drawingml/2006/main" xmlns:r="http://schemas.openxmlformats.org/officeDocument/2006/relationships" xmlns:p="http://schemas.openxmlformats.org/presentationml/2006/main">
-  <p:cSld>
-    <p:spTree>
-      <p:nvGrpSpPr>
-        <p:cNvPr id="1" name=""/>
-        <p:cNvGrpSpPr/>
-        <p:nvPr/>
-      </p:nvGrpSpPr>
-      <p:grpSpPr>
-        <a:xfrm>
-          <a:off x="0" y="0"/>
-          <a:ext cx="0" cy="0"/>
-          <a:chOff x="0" y="0"/>
-          <a:chExt cx="0" cy="0"/>
-        </a:xfrm>
-      </p:grpSpPr>
-      <p:sp>
-        <p:nvSpPr>
-          <p:cNvPr id="2" name="Title 1">
-            <a:extLst>
-              <a:ext uri="{FF2B5EF4-FFF2-40B4-BE49-F238E27FC236}">
-                <a16:creationId xmlns:a16="http://schemas.microsoft.com/office/drawing/2014/main" id="{49450B5A-480C-4F6A-B228-224360B7B570}"/>
-              </a:ext>
-            </a:extLst>
-          </p:cNvPr>
-          <p:cNvSpPr>
-            <a:spLocks noGrp="1"/>
-          </p:cNvSpPr>
-          <p:nvPr>
-            <p:ph type="title"/>
-          </p:nvPr>
-        </p:nvSpPr>
-        <p:spPr/>
-        <p:txBody>
-          <a:bodyPr/>
-          <a:lstStyle/>
-          <a:p>
-            <a:r>
-              <a:rPr lang="en-US" dirty="0"/>
-              <a:t>Resources</a:t>
-            </a:r>
-          </a:p>
-        </p:txBody>
-      </p:sp>
-      <p:sp>
-        <p:nvSpPr>
-          <p:cNvPr id="3" name="Content Placeholder 2">
-            <a:extLst>
-              <a:ext uri="{FF2B5EF4-FFF2-40B4-BE49-F238E27FC236}">
-                <a16:creationId xmlns:a16="http://schemas.microsoft.com/office/drawing/2014/main" id="{B899EF6F-80C6-41A5-93D1-6A986E4749DE}"/>
-              </a:ext>
-            </a:extLst>
-          </p:cNvPr>
-          <p:cNvSpPr>
-            <a:spLocks noGrp="1"/>
-          </p:cNvSpPr>
-          <p:nvPr>
-            <p:ph idx="1"/>
-          </p:nvPr>
-        </p:nvSpPr>
-        <p:spPr/>
-        <p:txBody>
-          <a:bodyPr/>
-          <a:lstStyle/>
-          <a:p>
-            <a:r>
-              <a:rPr lang="en-US" dirty="0"/>
-              <a:t>Datasets </a:t>
-            </a:r>
-          </a:p>
-          <a:p>
-            <a:pPr lvl="1"/>
-            <a:r>
-              <a:rPr lang="en-US" dirty="0"/>
-              <a:t>OBIS-SEAMAP (</a:t>
-            </a:r>
-            <a:r>
-              <a:rPr lang="en-US" dirty="0">
-                <a:hlinkClick r:id="rId3"/>
-              </a:rPr>
-              <a:t>http://seamap.env.duke.edu/</a:t>
-            </a:r>
-            <a:r>
-              <a:rPr lang="en-US" dirty="0"/>
-              <a:t>)</a:t>
-            </a:r>
-          </a:p>
-          <a:p>
-            <a:pPr lvl="1"/>
-            <a:r>
-              <a:rPr lang="en-US" dirty="0" err="1"/>
-              <a:t>iNaturalists</a:t>
-            </a:r>
-            <a:r>
-              <a:rPr lang="en-US" dirty="0"/>
-              <a:t> (</a:t>
-            </a:r>
-            <a:r>
-              <a:rPr lang="en-US" dirty="0">
-                <a:hlinkClick r:id="rId4"/>
-              </a:rPr>
-              <a:t>https://www.inaturalist.org/</a:t>
-            </a:r>
-            <a:r>
-              <a:rPr lang="en-US" dirty="0"/>
-              <a:t>)</a:t>
-            </a:r>
-          </a:p>
-          <a:p>
-            <a:r>
-              <a:rPr lang="en-US" dirty="0"/>
-              <a:t>Visual Graphics</a:t>
-            </a:r>
-          </a:p>
-          <a:p>
-            <a:pPr lvl="1"/>
-            <a:r>
-              <a:rPr lang="en-US" dirty="0"/>
-              <a:t>Matplotlib</a:t>
-            </a:r>
-          </a:p>
-          <a:p>
-            <a:pPr lvl="1"/>
-            <a:r>
-              <a:rPr lang="en-US" dirty="0"/>
-              <a:t>Google Cloud Platform </a:t>
-            </a:r>
-          </a:p>
-        </p:txBody>
-      </p:sp>
-      <p:sp>
-        <p:nvSpPr>
-          <p:cNvPr id="4" name="Footer Placeholder 3">
-            <a:extLst>
-              <a:ext uri="{FF2B5EF4-FFF2-40B4-BE49-F238E27FC236}">
-                <a16:creationId xmlns:a16="http://schemas.microsoft.com/office/drawing/2014/main" id="{9EEDDCCC-8549-4EDE-B56A-2124E66AF329}"/>
-              </a:ext>
-            </a:extLst>
-          </p:cNvPr>
-          <p:cNvSpPr>
-            <a:spLocks noGrp="1"/>
-          </p:cNvSpPr>
-          <p:nvPr>
-            <p:ph type="ftr" sz="quarter" idx="11"/>
-          </p:nvPr>
-        </p:nvSpPr>
-        <p:spPr/>
-        <p:txBody>
-          <a:bodyPr/>
-          <a:lstStyle/>
-          <a:p>
-            <a:r>
-              <a:rPr lang="en-US"/>
-              <a:t>MaJicK Migration - Private &amp; Confidential @ 2019</a:t>
-            </a:r>
-            <a:endParaRPr lang="en-US" dirty="0"/>
-          </a:p>
-        </p:txBody>
-      </p:sp>
-    </p:spTree>
-    <p:extLst>
-      <p:ext uri="{BB962C8B-B14F-4D97-AF65-F5344CB8AC3E}">
-        <p14:creationId xmlns:p14="http://schemas.microsoft.com/office/powerpoint/2010/main" val="1560771619"/>
-      </p:ext>
-    </p:extLst>
-  </p:cSld>
-  <p:clrMapOvr>
-    <a:masterClrMapping/>
-  </p:clrMapOvr>
-</p:sld>
-</file>
-
-<file path=ppt/slides/slide4.xml><?xml version="1.0" encoding="utf-8"?>
-<p:sld xmlns:a="http://schemas.openxmlformats.org/drawingml/2006/main" xmlns:r="http://schemas.openxmlformats.org/officeDocument/2006/relationships" xmlns:p="http://schemas.openxmlformats.org/presentationml/2006/main">
-  <p:cSld>
-    <p:spTree>
-      <p:nvGrpSpPr>
-        <p:cNvPr id="1" name=""/>
-        <p:cNvGrpSpPr/>
-        <p:nvPr/>
-      </p:nvGrpSpPr>
-      <p:grpSpPr>
-        <a:xfrm>
-          <a:off x="0" y="0"/>
-          <a:ext cx="0" cy="0"/>
-          <a:chOff x="0" y="0"/>
-          <a:chExt cx="0" cy="0"/>
-        </a:xfrm>
-      </p:grpSpPr>
-      <p:sp>
-        <p:nvSpPr>
-          <p:cNvPr id="2" name="Title 1">
-            <a:extLst>
-              <a:ext uri="{FF2B5EF4-FFF2-40B4-BE49-F238E27FC236}">
-                <a16:creationId xmlns:a16="http://schemas.microsoft.com/office/drawing/2014/main" id="{49450B5A-480C-4F6A-B228-224360B7B570}"/>
-              </a:ext>
-            </a:extLst>
-          </p:cNvPr>
-          <p:cNvSpPr>
-            <a:spLocks noGrp="1"/>
-          </p:cNvSpPr>
-          <p:nvPr>
-            <p:ph type="title"/>
-          </p:nvPr>
-        </p:nvSpPr>
-        <p:spPr/>
-        <p:txBody>
-          <a:bodyPr/>
-          <a:lstStyle/>
-          <a:p>
-            <a:r>
-              <a:rPr lang="en-US" dirty="0"/>
-              <a:t>Arctic Tern</a:t>
-            </a:r>
-          </a:p>
-        </p:txBody>
-      </p:sp>
-      <p:sp>
-        <p:nvSpPr>
-          <p:cNvPr id="4" name="Footer Placeholder 3">
-            <a:extLst>
-              <a:ext uri="{FF2B5EF4-FFF2-40B4-BE49-F238E27FC236}">
-                <a16:creationId xmlns:a16="http://schemas.microsoft.com/office/drawing/2014/main" id="{F39983D3-0428-4049-88EC-CCF238772BFA}"/>
-              </a:ext>
-            </a:extLst>
-          </p:cNvPr>
-          <p:cNvSpPr>
-            <a:spLocks noGrp="1"/>
-          </p:cNvSpPr>
-          <p:nvPr>
-            <p:ph type="ftr" sz="quarter" idx="11"/>
-          </p:nvPr>
-        </p:nvSpPr>
-        <p:spPr/>
-        <p:txBody>
-          <a:bodyPr/>
-          <a:lstStyle/>
-          <a:p>
-            <a:r>
-              <a:rPr lang="en-US"/>
-              <a:t>MaJicK Migration - Private &amp; Confidential @ 2019</a:t>
-            </a:r>
-          </a:p>
-        </p:txBody>
-      </p:sp>
-      <p:pic>
-        <p:nvPicPr>
-          <p:cNvPr id="5" name="Content Placeholder 5" descr="A bird standing next to a body of water&#10;&#10;Description automatically generated">
-            <a:extLst>
-              <a:ext uri="{FF2B5EF4-FFF2-40B4-BE49-F238E27FC236}">
-                <a16:creationId xmlns:a16="http://schemas.microsoft.com/office/drawing/2014/main" id="{A78660CF-AA7B-426A-A132-ABA8345F2475}"/>
-              </a:ext>
-            </a:extLst>
-          </p:cNvPr>
-          <p:cNvPicPr>
-            <a:picLocks noChangeAspect="1"/>
-          </p:cNvPicPr>
-          <p:nvPr/>
-        </p:nvPicPr>
-        <p:blipFill>
-          <a:blip r:embed="rId3">
-            <a:extLst>
-              <a:ext uri="{28A0092B-C50C-407E-A947-70E740481C1C}">
-                <a14:useLocalDpi xmlns:a14="http://schemas.microsoft.com/office/drawing/2010/main" val="0"/>
-              </a:ext>
-            </a:extLst>
-          </a:blip>
-          <a:stretch>
-            <a:fillRect/>
-          </a:stretch>
-        </p:blipFill>
-        <p:spPr>
-          <a:xfrm>
-            <a:off x="4724728" y="514720"/>
-            <a:ext cx="2742543" cy="1542680"/>
-          </a:xfrm>
-          <a:prstGeom prst="rect">
-            <a:avLst/>
-          </a:prstGeom>
-        </p:spPr>
-      </p:pic>
-      <p:sp>
-        <p:nvSpPr>
-          <p:cNvPr id="15" name="Content Placeholder 14">
-            <a:extLst>
-              <a:ext uri="{FF2B5EF4-FFF2-40B4-BE49-F238E27FC236}">
-                <a16:creationId xmlns:a16="http://schemas.microsoft.com/office/drawing/2014/main" id="{BEB2D8DF-8BCE-43BD-8550-7D8C5BAFACA0}"/>
-              </a:ext>
-            </a:extLst>
-          </p:cNvPr>
-          <p:cNvSpPr>
-            <a:spLocks noGrp="1"/>
-          </p:cNvSpPr>
-          <p:nvPr>
-            <p:ph idx="1"/>
-          </p:nvPr>
-        </p:nvSpPr>
-        <p:spPr/>
-        <p:txBody>
-          <a:bodyPr/>
-          <a:lstStyle/>
-          <a:p>
-            <a:r>
-              <a:rPr lang="en-US" dirty="0"/>
-              <a:t>Migration Pattern and time frame</a:t>
-            </a:r>
-          </a:p>
-          <a:p>
-            <a:r>
-              <a:rPr lang="en-US" dirty="0"/>
-              <a:t>Observable Trends</a:t>
-            </a:r>
-          </a:p>
-        </p:txBody>
-      </p:sp>
-      <p:pic>
-        <p:nvPicPr>
-          <p:cNvPr id="3" name="Picture 2">
-            <a:extLst>
-              <a:ext uri="{FF2B5EF4-FFF2-40B4-BE49-F238E27FC236}">
-                <a16:creationId xmlns:a16="http://schemas.microsoft.com/office/drawing/2014/main" id="{48EC9E94-A012-4765-9C03-415A55EC0199}"/>
-              </a:ext>
-            </a:extLst>
-          </p:cNvPr>
-          <p:cNvPicPr>
-            <a:picLocks noChangeAspect="1"/>
-          </p:cNvPicPr>
-          <p:nvPr/>
-        </p:nvPicPr>
-        <p:blipFill>
-          <a:blip r:embed="rId4"/>
-          <a:stretch>
-            <a:fillRect/>
-          </a:stretch>
-        </p:blipFill>
-        <p:spPr>
-          <a:xfrm>
-            <a:off x="5907869" y="2194559"/>
-            <a:ext cx="5501100" cy="3899068"/>
-          </a:xfrm>
-          <a:prstGeom prst="rect">
-            <a:avLst/>
-          </a:prstGeom>
-        </p:spPr>
-      </p:pic>
-    </p:spTree>
-    <p:extLst>
-      <p:ext uri="{BB962C8B-B14F-4D97-AF65-F5344CB8AC3E}">
-        <p14:creationId xmlns:p14="http://schemas.microsoft.com/office/powerpoint/2010/main" val="1404766003"/>
-      </p:ext>
-    </p:extLst>
-  </p:cSld>
-  <p:clrMapOvr>
-    <a:masterClrMapping/>
-  </p:clrMapOvr>
-</p:sld>
-</file>
-
-<file path=ppt/slides/slide5.xml><?xml version="1.0" encoding="utf-8"?>
-<p:sld xmlns:a="http://schemas.openxmlformats.org/drawingml/2006/main" xmlns:r="http://schemas.openxmlformats.org/officeDocument/2006/relationships" xmlns:p="http://schemas.openxmlformats.org/presentationml/2006/main">
-  <p:cSld>
-    <p:spTree>
-      <p:nvGrpSpPr>
-        <p:cNvPr id="1" name=""/>
-        <p:cNvGrpSpPr/>
-        <p:nvPr/>
-      </p:nvGrpSpPr>
-      <p:grpSpPr>
-        <a:xfrm>
-          <a:off x="0" y="0"/>
-          <a:ext cx="0" cy="0"/>
-          <a:chOff x="0" y="0"/>
-          <a:chExt cx="0" cy="0"/>
-        </a:xfrm>
-      </p:grpSpPr>
-      <p:sp>
-        <p:nvSpPr>
-          <p:cNvPr id="2" name="Title 1">
-            <a:extLst>
-              <a:ext uri="{FF2B5EF4-FFF2-40B4-BE49-F238E27FC236}">
-                <a16:creationId xmlns:a16="http://schemas.microsoft.com/office/drawing/2014/main" id="{49450B5A-480C-4F6A-B228-224360B7B570}"/>
-              </a:ext>
-            </a:extLst>
-          </p:cNvPr>
-          <p:cNvSpPr>
-            <a:spLocks noGrp="1"/>
-          </p:cNvSpPr>
-          <p:nvPr>
-            <p:ph type="title"/>
-          </p:nvPr>
-        </p:nvSpPr>
-        <p:spPr/>
-        <p:txBody>
-          <a:bodyPr/>
-          <a:lstStyle/>
-          <a:p>
-            <a:r>
-              <a:rPr lang="en-US" dirty="0"/>
-              <a:t>Arctic Tern</a:t>
-            </a:r>
-          </a:p>
-        </p:txBody>
-      </p:sp>
-      <p:sp>
-        <p:nvSpPr>
-          <p:cNvPr id="6" name="Text Placeholder 5">
-            <a:extLst>
-              <a:ext uri="{FF2B5EF4-FFF2-40B4-BE49-F238E27FC236}">
-                <a16:creationId xmlns:a16="http://schemas.microsoft.com/office/drawing/2014/main" id="{27AD3F13-CC89-430F-AE55-EF7E3833E37C}"/>
-              </a:ext>
-            </a:extLst>
-          </p:cNvPr>
-          <p:cNvSpPr>
-            <a:spLocks noGrp="1"/>
-          </p:cNvSpPr>
-          <p:nvPr>
-            <p:ph type="body" idx="1"/>
-          </p:nvPr>
-        </p:nvSpPr>
-        <p:spPr>
-          <a:xfrm>
-            <a:off x="682627" y="2183802"/>
-            <a:ext cx="5311774" cy="823912"/>
-          </a:xfrm>
-        </p:spPr>
-        <p:txBody>
-          <a:bodyPr/>
-          <a:lstStyle/>
-          <a:p>
-            <a:r>
-              <a:rPr lang="en-US" dirty="0"/>
-              <a:t>Legend</a:t>
-            </a:r>
-          </a:p>
-        </p:txBody>
-      </p:sp>
-      <p:sp>
-        <p:nvSpPr>
-          <p:cNvPr id="8" name="Content Placeholder 7">
-            <a:extLst>
-              <a:ext uri="{FF2B5EF4-FFF2-40B4-BE49-F238E27FC236}">
-                <a16:creationId xmlns:a16="http://schemas.microsoft.com/office/drawing/2014/main" id="{DF22A40A-C311-4A2D-A308-8C7AD6B3C279}"/>
-              </a:ext>
-            </a:extLst>
-          </p:cNvPr>
-          <p:cNvSpPr>
-            <a:spLocks noGrp="1"/>
-          </p:cNvSpPr>
-          <p:nvPr>
-            <p:ph sz="half" idx="2"/>
-          </p:nvPr>
-        </p:nvSpPr>
-        <p:spPr>
-          <a:xfrm>
-            <a:off x="685800" y="3132666"/>
-            <a:ext cx="5311775" cy="3086019"/>
-          </a:xfrm>
-        </p:spPr>
-        <p:txBody>
-          <a:bodyPr/>
-          <a:lstStyle/>
-          <a:p>
-            <a:endParaRPr lang="en-US" dirty="0"/>
-          </a:p>
-        </p:txBody>
-      </p:sp>
-      <p:sp>
-        <p:nvSpPr>
-          <p:cNvPr id="9" name="Text Placeholder 8">
-            <a:extLst>
-              <a:ext uri="{FF2B5EF4-FFF2-40B4-BE49-F238E27FC236}">
-                <a16:creationId xmlns:a16="http://schemas.microsoft.com/office/drawing/2014/main" id="{837B58F8-790A-4252-A2FC-1F567A878181}"/>
-              </a:ext>
-            </a:extLst>
-          </p:cNvPr>
-          <p:cNvSpPr>
-            <a:spLocks noGrp="1"/>
-          </p:cNvSpPr>
-          <p:nvPr>
-            <p:ph type="body" sz="quarter" idx="3"/>
-          </p:nvPr>
-        </p:nvSpPr>
-        <p:spPr/>
-        <p:txBody>
-          <a:bodyPr/>
-          <a:lstStyle/>
-          <a:p>
-            <a:endParaRPr lang="en-US"/>
-          </a:p>
-        </p:txBody>
-      </p:sp>
-      <p:sp>
-        <p:nvSpPr>
-          <p:cNvPr id="10" name="Content Placeholder 9">
-            <a:extLst>
-              <a:ext uri="{FF2B5EF4-FFF2-40B4-BE49-F238E27FC236}">
-                <a16:creationId xmlns:a16="http://schemas.microsoft.com/office/drawing/2014/main" id="{8C0480EE-8712-4AC6-BA14-45FC7BC09B81}"/>
-              </a:ext>
-            </a:extLst>
-          </p:cNvPr>
-          <p:cNvSpPr>
-            <a:spLocks noGrp="1"/>
-          </p:cNvSpPr>
-          <p:nvPr>
-            <p:ph sz="quarter" idx="4"/>
-          </p:nvPr>
-        </p:nvSpPr>
-        <p:spPr/>
-        <p:txBody>
-          <a:bodyPr/>
-          <a:lstStyle/>
-          <a:p>
-            <a:endParaRPr lang="en-US"/>
-          </a:p>
-        </p:txBody>
-      </p:sp>
-      <p:sp>
-        <p:nvSpPr>
-          <p:cNvPr id="4" name="Footer Placeholder 3">
-            <a:extLst>
-              <a:ext uri="{FF2B5EF4-FFF2-40B4-BE49-F238E27FC236}">
-                <a16:creationId xmlns:a16="http://schemas.microsoft.com/office/drawing/2014/main" id="{F39983D3-0428-4049-88EC-CCF238772BFA}"/>
-              </a:ext>
-            </a:extLst>
-          </p:cNvPr>
-          <p:cNvSpPr>
-            <a:spLocks noGrp="1"/>
-          </p:cNvSpPr>
-          <p:nvPr>
-            <p:ph type="ftr" sz="quarter" idx="11"/>
-          </p:nvPr>
-        </p:nvSpPr>
-        <p:spPr/>
-        <p:txBody>
-          <a:bodyPr/>
-          <a:lstStyle/>
-          <a:p>
-            <a:r>
-              <a:rPr lang="en-US"/>
-              <a:t>MaJicK Migration - Private &amp; Confidential @ 2019</a:t>
-            </a:r>
-          </a:p>
-        </p:txBody>
-      </p:sp>
-      <p:pic>
-        <p:nvPicPr>
-          <p:cNvPr id="5" name="Content Placeholder 5" descr="A bird standing next to a body of water&#10;&#10;Description automatically generated">
-            <a:extLst>
-              <a:ext uri="{FF2B5EF4-FFF2-40B4-BE49-F238E27FC236}">
-                <a16:creationId xmlns:a16="http://schemas.microsoft.com/office/drawing/2014/main" id="{A78660CF-AA7B-426A-A132-ABA8345F2475}"/>
-              </a:ext>
-            </a:extLst>
-          </p:cNvPr>
-          <p:cNvPicPr>
-            <a:picLocks noChangeAspect="1"/>
-          </p:cNvPicPr>
-          <p:nvPr/>
-        </p:nvPicPr>
-        <p:blipFill>
-          <a:blip r:embed="rId2">
-            <a:extLst>
-              <a:ext uri="{28A0092B-C50C-407E-A947-70E740481C1C}">
-                <a14:useLocalDpi xmlns:a14="http://schemas.microsoft.com/office/drawing/2010/main" val="0"/>
-              </a:ext>
-            </a:extLst>
-          </a:blip>
-          <a:stretch>
-            <a:fillRect/>
-          </a:stretch>
-        </p:blipFill>
-        <p:spPr>
-          <a:xfrm>
-            <a:off x="4724728" y="514720"/>
-            <a:ext cx="2742543" cy="1542680"/>
-          </a:xfrm>
-          <a:prstGeom prst="rect">
-            <a:avLst/>
-          </a:prstGeom>
-        </p:spPr>
-      </p:pic>
-      <p:pic>
-        <p:nvPicPr>
-          <p:cNvPr id="3" name="Picture 2">
-            <a:extLst>
-              <a:ext uri="{FF2B5EF4-FFF2-40B4-BE49-F238E27FC236}">
-                <a16:creationId xmlns:a16="http://schemas.microsoft.com/office/drawing/2014/main" id="{71600A87-3B21-4DE7-8390-CE285931D6AD}"/>
-              </a:ext>
-            </a:extLst>
-          </p:cNvPr>
-          <p:cNvPicPr>
-            <a:picLocks noChangeAspect="1"/>
-          </p:cNvPicPr>
-          <p:nvPr/>
-        </p:nvPicPr>
-        <p:blipFill>
-          <a:blip r:embed="rId3"/>
-          <a:stretch>
-            <a:fillRect/>
-          </a:stretch>
-        </p:blipFill>
-        <p:spPr>
-          <a:xfrm>
-            <a:off x="6172200" y="2194560"/>
-            <a:ext cx="5605672" cy="4024125"/>
-          </a:xfrm>
-          <a:prstGeom prst="rect">
-            <a:avLst/>
-          </a:prstGeom>
-        </p:spPr>
-      </p:pic>
-      <p:graphicFrame>
-        <p:nvGraphicFramePr>
-          <p:cNvPr id="14" name="Content Placeholder 10">
-            <a:extLst>
-              <a:ext uri="{FF2B5EF4-FFF2-40B4-BE49-F238E27FC236}">
-                <a16:creationId xmlns:a16="http://schemas.microsoft.com/office/drawing/2014/main" id="{0684B05F-51C8-422E-B0A8-1FB439521667}"/>
-              </a:ext>
-            </a:extLst>
-          </p:cNvPr>
-          <p:cNvGraphicFramePr>
-            <a:graphicFrameLocks/>
-          </p:cNvGraphicFramePr>
-          <p:nvPr>
-            <p:extLst>
-              <p:ext uri="{D42A27DB-BD31-4B8C-83A1-F6EECF244321}">
-                <p14:modId xmlns:p14="http://schemas.microsoft.com/office/powerpoint/2010/main" val="3573174110"/>
-              </p:ext>
-            </p:extLst>
-          </p:nvPr>
-        </p:nvGraphicFramePr>
-        <p:xfrm>
-          <a:off x="706046" y="3132666"/>
-          <a:ext cx="5311776" cy="1854200"/>
-        </p:xfrm>
-        <a:graphic>
-          <a:graphicData uri="http://schemas.openxmlformats.org/drawingml/2006/table">
-            <a:tbl>
-              <a:tblPr firstRow="1" bandRow="1">
-                <a:tableStyleId>{5C22544A-7EE6-4342-B048-85BDC9FD1C3A}</a:tableStyleId>
-              </a:tblPr>
-              <a:tblGrid>
-                <a:gridCol w="2655888">
-                  <a:extLst>
-                    <a:ext uri="{9D8B030D-6E8A-4147-A177-3AD203B41FA5}">
-                      <a16:colId xmlns:a16="http://schemas.microsoft.com/office/drawing/2014/main" val="3245679234"/>
-                    </a:ext>
-                  </a:extLst>
-                </a:gridCol>
-                <a:gridCol w="2655888">
-                  <a:extLst>
-                    <a:ext uri="{9D8B030D-6E8A-4147-A177-3AD203B41FA5}">
-                      <a16:colId xmlns:a16="http://schemas.microsoft.com/office/drawing/2014/main" val="2484969888"/>
-                    </a:ext>
-                  </a:extLst>
-                </a:gridCol>
-              </a:tblGrid>
-              <a:tr h="370840">
-                <a:tc>
-                  <a:txBody>
-                    <a:bodyPr/>
-                    <a:lstStyle/>
-                    <a:p>
-                      <a:r>
-                        <a:rPr lang="en-US" dirty="0"/>
-                        <a:t>Color</a:t>
-                      </a:r>
-                    </a:p>
-                  </a:txBody>
-                  <a:tcPr/>
-                </a:tc>
-                <a:tc>
-                  <a:txBody>
-                    <a:bodyPr/>
-                    <a:lstStyle/>
-                    <a:p>
-                      <a:r>
-                        <a:rPr lang="en-US" dirty="0"/>
-                        <a:t>Year</a:t>
-                      </a:r>
-                    </a:p>
-                  </a:txBody>
-                  <a:tcPr/>
-                </a:tc>
-                <a:extLst>
-                  <a:ext uri="{0D108BD9-81ED-4DB2-BD59-A6C34878D82A}">
-                    <a16:rowId xmlns:a16="http://schemas.microsoft.com/office/drawing/2014/main" val="4239120380"/>
-                  </a:ext>
-                </a:extLst>
-              </a:tr>
-              <a:tr h="370840">
-                <a:tc>
-                  <a:txBody>
-                    <a:bodyPr/>
-                    <a:lstStyle/>
-                    <a:p>
-                      <a:r>
-                        <a:rPr lang="en-US" dirty="0"/>
-                        <a:t>White</a:t>
-                      </a:r>
-                    </a:p>
-                  </a:txBody>
-                  <a:tcPr/>
-                </a:tc>
-                <a:tc>
-                  <a:txBody>
-                    <a:bodyPr/>
-                    <a:lstStyle/>
-                    <a:p>
-                      <a:r>
-                        <a:rPr lang="en-US" dirty="0"/>
-                        <a:t>2007</a:t>
-                      </a:r>
-                    </a:p>
-                  </a:txBody>
-                  <a:tcPr/>
-                </a:tc>
-                <a:extLst>
-                  <a:ext uri="{0D108BD9-81ED-4DB2-BD59-A6C34878D82A}">
-                    <a16:rowId xmlns:a16="http://schemas.microsoft.com/office/drawing/2014/main" val="62383164"/>
-                  </a:ext>
-                </a:extLst>
-              </a:tr>
-              <a:tr h="370840">
-                <a:tc>
-                  <a:txBody>
-                    <a:bodyPr/>
-                    <a:lstStyle/>
-                    <a:p>
-                      <a:r>
-                        <a:rPr lang="en-US" dirty="0"/>
-                        <a:t>Green</a:t>
-                      </a:r>
-                    </a:p>
-                  </a:txBody>
-                  <a:tcPr/>
-                </a:tc>
-                <a:tc>
-                  <a:txBody>
-                    <a:bodyPr/>
-                    <a:lstStyle/>
-                    <a:p>
-                      <a:r>
-                        <a:rPr lang="en-US" dirty="0"/>
-                        <a:t>1985</a:t>
-                      </a:r>
-                    </a:p>
-                  </a:txBody>
-                  <a:tcPr/>
-                </a:tc>
-                <a:extLst>
-                  <a:ext uri="{0D108BD9-81ED-4DB2-BD59-A6C34878D82A}">
-                    <a16:rowId xmlns:a16="http://schemas.microsoft.com/office/drawing/2014/main" val="2573687272"/>
-                  </a:ext>
-                </a:extLst>
-              </a:tr>
-              <a:tr h="370840">
-                <a:tc>
-                  <a:txBody>
-                    <a:bodyPr/>
-                    <a:lstStyle/>
-                    <a:p>
-                      <a:r>
-                        <a:rPr lang="en-US" dirty="0"/>
-                        <a:t>Purple</a:t>
-                      </a:r>
-                    </a:p>
-                  </a:txBody>
-                  <a:tcPr/>
+                  <a:tcPr>
+                    <a:solidFill>
+                      <a:schemeClr val="tx1">
+                        <a:lumMod val="95000"/>
+                      </a:schemeClr>
+                    </a:solidFill>
+                  </a:tcPr>
                 </a:tc>
                 <a:tc>
                   <a:txBody>
@@ -8494,7 +8742,13 @@
                       </a:r>
                     </a:p>
                   </a:txBody>
-                  <a:tcPr/>
+                  <a:tcPr>
+                    <a:solidFill>
+                      <a:schemeClr val="tx1">
+                        <a:lumMod val="95000"/>
+                      </a:schemeClr>
+                    </a:solidFill>
+                  </a:tcPr>
                 </a:tc>
                 <a:extLst>
                   <a:ext uri="{0D108BD9-81ED-4DB2-BD59-A6C34878D82A}">
@@ -8514,7 +8768,11 @@
                       </a:r>
                     </a:p>
                   </a:txBody>
-                  <a:tcPr/>
+                  <a:tcPr>
+                    <a:solidFill>
+                      <a:schemeClr val="tx2"/>
+                    </a:solidFill>
+                  </a:tcPr>
                 </a:tc>
                 <a:tc>
                   <a:txBody>
@@ -8527,7 +8785,11 @@
                       </a:r>
                     </a:p>
                   </a:txBody>
-                  <a:tcPr/>
+                  <a:tcPr>
+                    <a:solidFill>
+                      <a:schemeClr val="tx2"/>
+                    </a:solidFill>
+                  </a:tcPr>
                 </a:tc>
                 <a:extLst>
                   <a:ext uri="{0D108BD9-81ED-4DB2-BD59-A6C34878D82A}">
@@ -8939,14 +9201,14 @@
           <p:nvPr>
             <p:extLst>
               <p:ext uri="{D42A27DB-BD31-4B8C-83A1-F6EECF244321}">
-                <p14:modId xmlns:p14="http://schemas.microsoft.com/office/powerpoint/2010/main" val="2897741037"/>
+                <p14:modId xmlns:p14="http://schemas.microsoft.com/office/powerpoint/2010/main" val="3937103469"/>
               </p:ext>
             </p:extLst>
           </p:nvPr>
         </p:nvGraphicFramePr>
         <p:xfrm>
           <a:off x="706046" y="3132666"/>
-          <a:ext cx="5311776" cy="1854200"/>
+          <a:ext cx="4323482" cy="1854200"/>
         </p:xfrm>
         <a:graphic>
           <a:graphicData uri="http://schemas.openxmlformats.org/drawingml/2006/table">
@@ -8955,14 +9217,14 @@
                 <a:tableStyleId>{5C22544A-7EE6-4342-B048-85BDC9FD1C3A}</a:tableStyleId>
               </a:tblPr>
               <a:tblGrid>
-                <a:gridCol w="2655888">
+                <a:gridCol w="2161741">
                   <a:extLst>
                     <a:ext uri="{9D8B030D-6E8A-4147-A177-3AD203B41FA5}">
                       <a16:colId xmlns:a16="http://schemas.microsoft.com/office/drawing/2014/main" val="3245679234"/>
                     </a:ext>
                   </a:extLst>
                 </a:gridCol>
-                <a:gridCol w="2655888">
+                <a:gridCol w="2161741">
                   <a:extLst>
                     <a:ext uri="{9D8B030D-6E8A-4147-A177-3AD203B41FA5}">
                       <a16:colId xmlns:a16="http://schemas.microsoft.com/office/drawing/2014/main" val="2484969888"/>
@@ -8982,7 +9244,14 @@
                       </a:r>
                     </a:p>
                   </a:txBody>
-                  <a:tcPr/>
+                  <a:tcPr>
+                    <a:solidFill>
+                      <a:schemeClr val="bg1">
+                        <a:lumMod val="50000"/>
+                        <a:lumOff val="50000"/>
+                      </a:schemeClr>
+                    </a:solidFill>
+                  </a:tcPr>
                 </a:tc>
                 <a:tc>
                   <a:txBody>
@@ -8995,7 +9264,14 @@
                       </a:r>
                     </a:p>
                   </a:txBody>
-                  <a:tcPr/>
+                  <a:tcPr>
+                    <a:solidFill>
+                      <a:schemeClr val="bg1">
+                        <a:lumMod val="50000"/>
+                        <a:lumOff val="50000"/>
+                      </a:schemeClr>
+                    </a:solidFill>
+                  </a:tcPr>
                 </a:tc>
                 <a:extLst>
                   <a:ext uri="{0D108BD9-81ED-4DB2-BD59-A6C34878D82A}">
@@ -9015,7 +9291,13 @@
                       </a:r>
                     </a:p>
                   </a:txBody>
-                  <a:tcPr/>
+                  <a:tcPr>
+                    <a:solidFill>
+                      <a:schemeClr val="tx1">
+                        <a:lumMod val="95000"/>
+                      </a:schemeClr>
+                    </a:solidFill>
+                  </a:tcPr>
                 </a:tc>
                 <a:tc>
                   <a:txBody>
@@ -9028,7 +9310,13 @@
                       </a:r>
                     </a:p>
                   </a:txBody>
-                  <a:tcPr/>
+                  <a:tcPr>
+                    <a:solidFill>
+                      <a:schemeClr val="tx1">
+                        <a:lumMod val="95000"/>
+                      </a:schemeClr>
+                    </a:solidFill>
+                  </a:tcPr>
                 </a:tc>
                 <a:extLst>
                   <a:ext uri="{0D108BD9-81ED-4DB2-BD59-A6C34878D82A}">
@@ -9048,7 +9336,11 @@
                       </a:r>
                     </a:p>
                   </a:txBody>
-                  <a:tcPr/>
+                  <a:tcPr>
+                    <a:solidFill>
+                      <a:schemeClr val="tx2"/>
+                    </a:solidFill>
+                  </a:tcPr>
                 </a:tc>
                 <a:tc>
                   <a:txBody>
@@ -9061,7 +9353,11 @@
                       </a:r>
                     </a:p>
                   </a:txBody>
-                  <a:tcPr/>
+                  <a:tcPr>
+                    <a:solidFill>
+                      <a:schemeClr val="tx2"/>
+                    </a:solidFill>
+                  </a:tcPr>
                 </a:tc>
                 <a:extLst>
                   <a:ext uri="{0D108BD9-81ED-4DB2-BD59-A6C34878D82A}">
@@ -9081,7 +9377,13 @@
                       </a:r>
                     </a:p>
                   </a:txBody>
-                  <a:tcPr/>
+                  <a:tcPr>
+                    <a:solidFill>
+                      <a:schemeClr val="tx1">
+                        <a:lumMod val="95000"/>
+                      </a:schemeClr>
+                    </a:solidFill>
+                  </a:tcPr>
                 </a:tc>
                 <a:tc>
                   <a:txBody>
@@ -9094,7 +9396,13 @@
                       </a:r>
                     </a:p>
                   </a:txBody>
-                  <a:tcPr/>
+                  <a:tcPr>
+                    <a:solidFill>
+                      <a:schemeClr val="tx1">
+                        <a:lumMod val="95000"/>
+                      </a:schemeClr>
+                    </a:solidFill>
+                  </a:tcPr>
                 </a:tc>
                 <a:extLst>
                   <a:ext uri="{0D108BD9-81ED-4DB2-BD59-A6C34878D82A}">
@@ -9114,7 +9422,11 @@
                       </a:r>
                     </a:p>
                   </a:txBody>
-                  <a:tcPr/>
+                  <a:tcPr>
+                    <a:solidFill>
+                      <a:schemeClr val="tx2"/>
+                    </a:solidFill>
+                  </a:tcPr>
                 </a:tc>
                 <a:tc>
                   <a:txBody>
@@ -9127,7 +9439,11 @@
                       </a:r>
                     </a:p>
                   </a:txBody>
-                  <a:tcPr/>
+                  <a:tcPr>
+                    <a:solidFill>
+                      <a:schemeClr val="tx2"/>
+                    </a:solidFill>
+                  </a:tcPr>
                 </a:tc>
                 <a:extLst>
                   <a:ext uri="{0D108BD9-81ED-4DB2-BD59-A6C34878D82A}">
@@ -9197,8 +9513,8 @@
         </p:blipFill>
         <p:spPr>
           <a:xfrm>
-            <a:off x="6305796" y="2327251"/>
-            <a:ext cx="5200403" cy="3891433"/>
+            <a:off x="5428343" y="2327251"/>
+            <a:ext cx="6502399" cy="3891433"/>
           </a:xfrm>
           <a:prstGeom prst="rect">
             <a:avLst/>

</xml_diff>

<commit_message>
Updated Presentation to accomodate animation & other content change.
</commit_message>
<xml_diff>
--- a/Analysis/MaJicK Migration.pptx
+++ b/Analysis/MaJicK Migration.pptx
@@ -1087,6 +1087,51 @@
             <a:r>
               <a:rPr lang="en-US" dirty="0"/>
               <a:t>A further investigation into the correlation between the trends and climate change would help in making a more substantial conclusion</a:t>
+            </a:r>
+          </a:p>
+          <a:p>
+            <a:endParaRPr lang="en-US" dirty="0"/>
+          </a:p>
+          <a:p>
+            <a:r>
+              <a:rPr lang="en-US" dirty="0"/>
+              <a:t>Arctic Terns migrate yearly between the north and south pole </a:t>
+            </a:r>
+          </a:p>
+          <a:p>
+            <a:r>
+              <a:rPr lang="en-US" dirty="0"/>
+              <a:t>No apparent change to pattern over time</a:t>
+            </a:r>
+          </a:p>
+          <a:p>
+            <a:endParaRPr lang="en-US" dirty="0"/>
+          </a:p>
+          <a:p>
+            <a:r>
+              <a:rPr lang="en-US" dirty="0"/>
+              <a:t>Blue Whales have shown some migratory change over time</a:t>
+            </a:r>
+          </a:p>
+          <a:p>
+            <a:r>
+              <a:rPr lang="en-US" dirty="0"/>
+              <a:t>Return to the same latitudes during the winter months</a:t>
+            </a:r>
+          </a:p>
+          <a:p>
+            <a:endParaRPr lang="en-US" dirty="0"/>
+          </a:p>
+          <a:p>
+            <a:r>
+              <a:rPr lang="en-US" dirty="0"/>
+              <a:t>Humpback Whales are trending north during Spring and Summer</a:t>
+            </a:r>
+          </a:p>
+          <a:p>
+            <a:r>
+              <a:rPr lang="en-US" dirty="0"/>
+              <a:t>Appear to return to the same latitude during Winter</a:t>
             </a:r>
           </a:p>
           <a:p>
@@ -6860,8 +6905,24 @@
           <a:lstStyle/>
           <a:p>
             <a:r>
+              <a:rPr lang="en-US" u="sng" dirty="0" err="1"/>
+              <a:t>M</a:t>
+            </a:r>
+            <a:r>
               <a:rPr lang="en-US" dirty="0" err="1"/>
-              <a:t>MaJicK</a:t>
+              <a:t>a</a:t>
+            </a:r>
+            <a:r>
+              <a:rPr lang="en-US" u="sng" dirty="0" err="1"/>
+              <a:t>J</a:t>
+            </a:r>
+            <a:r>
+              <a:rPr lang="en-US" dirty="0" err="1"/>
+              <a:t>ic</a:t>
+            </a:r>
+            <a:r>
+              <a:rPr lang="en-US" u="sng" dirty="0" err="1"/>
+              <a:t>K</a:t>
             </a:r>
             <a:r>
               <a:rPr lang="en-US" dirty="0"/>
@@ -6900,22 +6961,34 @@
           <a:p>
             <a:pPr algn="r"/>
             <a:r>
+              <a:rPr lang="en-US" sz="1200" b="1" u="sng" dirty="0"/>
+              <a:t>M</a:t>
+            </a:r>
+            <a:r>
               <a:rPr lang="en-US" sz="1200" dirty="0"/>
-              <a:t>Malik Awan</a:t>
+              <a:t>alik Awan</a:t>
             </a:r>
           </a:p>
           <a:p>
             <a:pPr algn="r"/>
             <a:r>
+              <a:rPr lang="en-US" sz="1200" b="1" u="sng" dirty="0"/>
+              <a:t>J</a:t>
+            </a:r>
+            <a:r>
               <a:rPr lang="en-US" sz="1200" dirty="0"/>
-              <a:t>Justin Parker</a:t>
+              <a:t>ustin Parker</a:t>
             </a:r>
           </a:p>
           <a:p>
             <a:pPr algn="r"/>
             <a:r>
+              <a:rPr lang="en-US" sz="1200" b="1" u="sng" dirty="0"/>
+              <a:t>K</a:t>
+            </a:r>
+            <a:r>
               <a:rPr lang="en-US" sz="1200" dirty="0"/>
-              <a:t>Karika Shah</a:t>
+              <a:t>arika Shah</a:t>
             </a:r>
           </a:p>
         </p:txBody>
@@ -7171,14 +7244,14 @@
           <p:nvPr>
             <p:extLst>
               <p:ext uri="{D42A27DB-BD31-4B8C-83A1-F6EECF244321}">
-                <p14:modId xmlns:p14="http://schemas.microsoft.com/office/powerpoint/2010/main" val="3844468959"/>
+                <p14:modId xmlns:p14="http://schemas.microsoft.com/office/powerpoint/2010/main" val="1470077227"/>
               </p:ext>
             </p:extLst>
           </p:nvPr>
         </p:nvGraphicFramePr>
         <p:xfrm>
           <a:off x="706046" y="3144874"/>
-          <a:ext cx="4649726" cy="1849120"/>
+          <a:ext cx="4139086" cy="1849120"/>
         </p:xfrm>
         <a:graphic>
           <a:graphicData uri="http://schemas.openxmlformats.org/drawingml/2006/table">
@@ -7187,14 +7260,14 @@
                 <a:tableStyleId>{5C22544A-7EE6-4342-B048-85BDC9FD1C3A}</a:tableStyleId>
               </a:tblPr>
               <a:tblGrid>
-                <a:gridCol w="2324863">
+                <a:gridCol w="2069543">
                   <a:extLst>
                     <a:ext uri="{9D8B030D-6E8A-4147-A177-3AD203B41FA5}">
                       <a16:colId xmlns:a16="http://schemas.microsoft.com/office/drawing/2014/main" val="3245679234"/>
                     </a:ext>
                   </a:extLst>
                 </a:gridCol>
-                <a:gridCol w="2324863">
+                <a:gridCol w="2069543">
                   <a:extLst>
                     <a:ext uri="{9D8B030D-6E8A-4147-A177-3AD203B41FA5}">
                       <a16:colId xmlns:a16="http://schemas.microsoft.com/office/drawing/2014/main" val="2484969888"/>
@@ -7562,23 +7635,38 @@
             <a:spLocks noGrp="1"/>
           </p:cNvSpPr>
           <p:nvPr>
-            <p:ph idx="1"/>
-          </p:nvPr>
-        </p:nvSpPr>
-        <p:spPr/>
-        <p:txBody>
-          <a:bodyPr/>
+            <p:ph sz="half" idx="2"/>
+          </p:nvPr>
+        </p:nvSpPr>
+        <p:spPr>
+          <a:xfrm>
+            <a:off x="685800" y="2396396"/>
+            <a:ext cx="5311775" cy="3086019"/>
+          </a:xfrm>
+        </p:spPr>
+        <p:txBody>
+          <a:bodyPr>
+            <a:normAutofit/>
+          </a:bodyPr>
           <a:lstStyle/>
           <a:p>
             <a:r>
               <a:rPr lang="en-US" dirty="0"/>
-              <a:t>Arctic Terns migrate yearly between the north and south pole </a:t>
-            </a:r>
-          </a:p>
-          <a:p>
+              <a:t>Arctic Terns </a:t>
+            </a:r>
+          </a:p>
+          <a:p>
+            <a:pPr lvl="1"/>
             <a:r>
               <a:rPr lang="en-US" dirty="0"/>
-              <a:t>No apparent change to pattern over time</a:t>
+              <a:t>Migrate yearly between poles</a:t>
+            </a:r>
+          </a:p>
+          <a:p>
+            <a:pPr lvl="1"/>
+            <a:r>
+              <a:rPr lang="en-US" dirty="0"/>
+              <a:t>No apparent change in pattern</a:t>
             </a:r>
           </a:p>
           <a:p>
@@ -7587,32 +7675,73 @@
           <a:p>
             <a:r>
               <a:rPr lang="en-US" dirty="0"/>
-              <a:t>Blue Whales have shown some migratory change over time</a:t>
-            </a:r>
-          </a:p>
-          <a:p>
+              <a:t>Blue Whales </a:t>
+            </a:r>
+          </a:p>
+          <a:p>
+            <a:pPr lvl="1"/>
             <a:r>
               <a:rPr lang="en-US" dirty="0"/>
-              <a:t>Return to the same latitudes during the </a:t>
-            </a:r>
-            <a:r>
-              <a:rPr lang="en-US"/>
-              <a:t>winter months</a:t>
+              <a:t>Some migratory change over time</a:t>
+            </a:r>
+          </a:p>
+          <a:p>
+            <a:pPr lvl="1"/>
+            <a:r>
+              <a:rPr lang="en-US" dirty="0"/>
+              <a:t>Winter - Return to the same latitudes</a:t>
             </a:r>
           </a:p>
           <a:p>
             <a:endParaRPr lang="en-US" dirty="0"/>
           </a:p>
+        </p:txBody>
+      </p:sp>
+      <p:sp>
+        <p:nvSpPr>
+          <p:cNvPr id="7" name="Content Placeholder 6">
+            <a:extLst>
+              <a:ext uri="{FF2B5EF4-FFF2-40B4-BE49-F238E27FC236}">
+                <a16:creationId xmlns:a16="http://schemas.microsoft.com/office/drawing/2014/main" id="{87F47DC5-99B8-4F0D-9296-03A53D19EEE7}"/>
+              </a:ext>
+            </a:extLst>
+          </p:cNvPr>
+          <p:cNvSpPr>
+            <a:spLocks noGrp="1"/>
+          </p:cNvSpPr>
+          <p:nvPr>
+            <p:ph sz="quarter" idx="4"/>
+          </p:nvPr>
+        </p:nvSpPr>
+        <p:spPr>
+          <a:xfrm>
+            <a:off x="6194427" y="2396396"/>
+            <a:ext cx="5334000" cy="3086019"/>
+          </a:xfrm>
+        </p:spPr>
+        <p:txBody>
+          <a:bodyPr>
+            <a:normAutofit/>
+          </a:bodyPr>
+          <a:lstStyle/>
           <a:p>
             <a:r>
               <a:rPr lang="en-US" dirty="0"/>
-              <a:t>Humpback Whales are trending north during Spring and Summer</a:t>
-            </a:r>
-          </a:p>
-          <a:p>
+              <a:t>Humpback Whales </a:t>
+            </a:r>
+          </a:p>
+          <a:p>
+            <a:pPr lvl="1"/>
             <a:r>
               <a:rPr lang="en-US" dirty="0"/>
-              <a:t>Appear to return to the same latitude during Winter</a:t>
+              <a:t>Trending north - Spring &amp; Summer</a:t>
+            </a:r>
+          </a:p>
+          <a:p>
+            <a:pPr lvl="1"/>
+            <a:r>
+              <a:rPr lang="en-US" dirty="0"/>
+              <a:t>Winter - Return to the same latitudes</a:t>
             </a:r>
           </a:p>
         </p:txBody>
@@ -7655,6 +7784,373 @@
   <p:clrMapOvr>
     <a:masterClrMapping/>
   </p:clrMapOvr>
+  <p:timing>
+    <p:tnLst>
+      <p:par>
+        <p:cTn id="1" dur="indefinite" restart="never" nodeType="tmRoot">
+          <p:childTnLst>
+            <p:seq concurrent="1" nextAc="seek">
+              <p:cTn id="2" dur="indefinite" nodeType="mainSeq">
+                <p:childTnLst>
+                  <p:par>
+                    <p:cTn id="3" fill="hold">
+                      <p:stCondLst>
+                        <p:cond delay="indefinite"/>
+                      </p:stCondLst>
+                      <p:childTnLst>
+                        <p:par>
+                          <p:cTn id="4" fill="hold">
+                            <p:stCondLst>
+                              <p:cond delay="0"/>
+                            </p:stCondLst>
+                            <p:childTnLst>
+                              <p:par>
+                                <p:cTn id="5" presetID="1" presetClass="entr" presetSubtype="0" fill="hold" grpId="0" nodeType="clickEffect">
+                                  <p:stCondLst>
+                                    <p:cond delay="0"/>
+                                  </p:stCondLst>
+                                  <p:childTnLst>
+                                    <p:set>
+                                      <p:cBhvr>
+                                        <p:cTn id="6" dur="1" fill="hold">
+                                          <p:stCondLst>
+                                            <p:cond delay="0"/>
+                                          </p:stCondLst>
+                                        </p:cTn>
+                                        <p:tgtEl>
+                                          <p:spTgt spid="3">
+                                            <p:txEl>
+                                              <p:pRg st="0" end="0"/>
+                                            </p:txEl>
+                                          </p:spTgt>
+                                        </p:tgtEl>
+                                        <p:attrNameLst>
+                                          <p:attrName>style.visibility</p:attrName>
+                                        </p:attrNameLst>
+                                      </p:cBhvr>
+                                      <p:to>
+                                        <p:strVal val="visible"/>
+                                      </p:to>
+                                    </p:set>
+                                  </p:childTnLst>
+                                </p:cTn>
+                              </p:par>
+                              <p:par>
+                                <p:cTn id="7" presetID="1" presetClass="entr" presetSubtype="0" fill="hold" grpId="0" nodeType="withEffect">
+                                  <p:stCondLst>
+                                    <p:cond delay="0"/>
+                                  </p:stCondLst>
+                                  <p:childTnLst>
+                                    <p:set>
+                                      <p:cBhvr>
+                                        <p:cTn id="8" dur="1" fill="hold">
+                                          <p:stCondLst>
+                                            <p:cond delay="0"/>
+                                          </p:stCondLst>
+                                        </p:cTn>
+                                        <p:tgtEl>
+                                          <p:spTgt spid="3">
+                                            <p:txEl>
+                                              <p:pRg st="1" end="1"/>
+                                            </p:txEl>
+                                          </p:spTgt>
+                                        </p:tgtEl>
+                                        <p:attrNameLst>
+                                          <p:attrName>style.visibility</p:attrName>
+                                        </p:attrNameLst>
+                                      </p:cBhvr>
+                                      <p:to>
+                                        <p:strVal val="visible"/>
+                                      </p:to>
+                                    </p:set>
+                                  </p:childTnLst>
+                                </p:cTn>
+                              </p:par>
+                              <p:par>
+                                <p:cTn id="9" presetID="1" presetClass="entr" presetSubtype="0" fill="hold" grpId="0" nodeType="withEffect">
+                                  <p:stCondLst>
+                                    <p:cond delay="0"/>
+                                  </p:stCondLst>
+                                  <p:childTnLst>
+                                    <p:set>
+                                      <p:cBhvr>
+                                        <p:cTn id="10" dur="1" fill="hold">
+                                          <p:stCondLst>
+                                            <p:cond delay="0"/>
+                                          </p:stCondLst>
+                                        </p:cTn>
+                                        <p:tgtEl>
+                                          <p:spTgt spid="3">
+                                            <p:txEl>
+                                              <p:pRg st="2" end="2"/>
+                                            </p:txEl>
+                                          </p:spTgt>
+                                        </p:tgtEl>
+                                        <p:attrNameLst>
+                                          <p:attrName>style.visibility</p:attrName>
+                                        </p:attrNameLst>
+                                      </p:cBhvr>
+                                      <p:to>
+                                        <p:strVal val="visible"/>
+                                      </p:to>
+                                    </p:set>
+                                  </p:childTnLst>
+                                </p:cTn>
+                              </p:par>
+                            </p:childTnLst>
+                          </p:cTn>
+                        </p:par>
+                      </p:childTnLst>
+                    </p:cTn>
+                  </p:par>
+                  <p:par>
+                    <p:cTn id="11" fill="hold">
+                      <p:stCondLst>
+                        <p:cond delay="indefinite"/>
+                      </p:stCondLst>
+                      <p:childTnLst>
+                        <p:par>
+                          <p:cTn id="12" fill="hold">
+                            <p:stCondLst>
+                              <p:cond delay="0"/>
+                            </p:stCondLst>
+                            <p:childTnLst>
+                              <p:par>
+                                <p:cTn id="13" presetID="1" presetClass="entr" presetSubtype="0" fill="hold" grpId="0" nodeType="clickEffect">
+                                  <p:stCondLst>
+                                    <p:cond delay="0"/>
+                                  </p:stCondLst>
+                                  <p:childTnLst>
+                                    <p:set>
+                                      <p:cBhvr>
+                                        <p:cTn id="14" dur="1" fill="hold">
+                                          <p:stCondLst>
+                                            <p:cond delay="0"/>
+                                          </p:stCondLst>
+                                        </p:cTn>
+                                        <p:tgtEl>
+                                          <p:spTgt spid="3">
+                                            <p:txEl>
+                                              <p:pRg st="4" end="4"/>
+                                            </p:txEl>
+                                          </p:spTgt>
+                                        </p:tgtEl>
+                                        <p:attrNameLst>
+                                          <p:attrName>style.visibility</p:attrName>
+                                        </p:attrNameLst>
+                                      </p:cBhvr>
+                                      <p:to>
+                                        <p:strVal val="visible"/>
+                                      </p:to>
+                                    </p:set>
+                                  </p:childTnLst>
+                                </p:cTn>
+                              </p:par>
+                              <p:par>
+                                <p:cTn id="15" presetID="1" presetClass="entr" presetSubtype="0" fill="hold" grpId="0" nodeType="withEffect">
+                                  <p:stCondLst>
+                                    <p:cond delay="0"/>
+                                  </p:stCondLst>
+                                  <p:childTnLst>
+                                    <p:set>
+                                      <p:cBhvr>
+                                        <p:cTn id="16" dur="1" fill="hold">
+                                          <p:stCondLst>
+                                            <p:cond delay="0"/>
+                                          </p:stCondLst>
+                                        </p:cTn>
+                                        <p:tgtEl>
+                                          <p:spTgt spid="3">
+                                            <p:txEl>
+                                              <p:pRg st="5" end="5"/>
+                                            </p:txEl>
+                                          </p:spTgt>
+                                        </p:tgtEl>
+                                        <p:attrNameLst>
+                                          <p:attrName>style.visibility</p:attrName>
+                                        </p:attrNameLst>
+                                      </p:cBhvr>
+                                      <p:to>
+                                        <p:strVal val="visible"/>
+                                      </p:to>
+                                    </p:set>
+                                  </p:childTnLst>
+                                </p:cTn>
+                              </p:par>
+                              <p:par>
+                                <p:cTn id="17" presetID="1" presetClass="entr" presetSubtype="0" fill="hold" grpId="0" nodeType="withEffect">
+                                  <p:stCondLst>
+                                    <p:cond delay="0"/>
+                                  </p:stCondLst>
+                                  <p:childTnLst>
+                                    <p:set>
+                                      <p:cBhvr>
+                                        <p:cTn id="18" dur="1" fill="hold">
+                                          <p:stCondLst>
+                                            <p:cond delay="0"/>
+                                          </p:stCondLst>
+                                        </p:cTn>
+                                        <p:tgtEl>
+                                          <p:spTgt spid="3">
+                                            <p:txEl>
+                                              <p:pRg st="6" end="6"/>
+                                            </p:txEl>
+                                          </p:spTgt>
+                                        </p:tgtEl>
+                                        <p:attrNameLst>
+                                          <p:attrName>style.visibility</p:attrName>
+                                        </p:attrNameLst>
+                                      </p:cBhvr>
+                                      <p:to>
+                                        <p:strVal val="visible"/>
+                                      </p:to>
+                                    </p:set>
+                                  </p:childTnLst>
+                                </p:cTn>
+                              </p:par>
+                            </p:childTnLst>
+                          </p:cTn>
+                        </p:par>
+                      </p:childTnLst>
+                    </p:cTn>
+                  </p:par>
+                  <p:par>
+                    <p:cTn id="19" fill="hold">
+                      <p:stCondLst>
+                        <p:cond delay="indefinite"/>
+                      </p:stCondLst>
+                      <p:childTnLst>
+                        <p:par>
+                          <p:cTn id="20" fill="hold">
+                            <p:stCondLst>
+                              <p:cond delay="0"/>
+                            </p:stCondLst>
+                            <p:childTnLst>
+                              <p:par>
+                                <p:cTn id="21" presetID="1" presetClass="entr" presetSubtype="0" fill="hold" grpId="0" nodeType="clickEffect">
+                                  <p:stCondLst>
+                                    <p:cond delay="0"/>
+                                  </p:stCondLst>
+                                  <p:childTnLst>
+                                    <p:set>
+                                      <p:cBhvr>
+                                        <p:cTn id="22" dur="1" fill="hold">
+                                          <p:stCondLst>
+                                            <p:cond delay="0"/>
+                                          </p:stCondLst>
+                                        </p:cTn>
+                                        <p:tgtEl>
+                                          <p:spTgt spid="7">
+                                            <p:txEl>
+                                              <p:pRg st="0" end="0"/>
+                                            </p:txEl>
+                                          </p:spTgt>
+                                        </p:tgtEl>
+                                        <p:attrNameLst>
+                                          <p:attrName>style.visibility</p:attrName>
+                                        </p:attrNameLst>
+                                      </p:cBhvr>
+                                      <p:to>
+                                        <p:strVal val="visible"/>
+                                      </p:to>
+                                    </p:set>
+                                  </p:childTnLst>
+                                </p:cTn>
+                              </p:par>
+                              <p:par>
+                                <p:cTn id="23" presetID="1" presetClass="entr" presetSubtype="0" fill="hold" grpId="0" nodeType="withEffect">
+                                  <p:stCondLst>
+                                    <p:cond delay="0"/>
+                                  </p:stCondLst>
+                                  <p:childTnLst>
+                                    <p:set>
+                                      <p:cBhvr>
+                                        <p:cTn id="24" dur="1" fill="hold">
+                                          <p:stCondLst>
+                                            <p:cond delay="0"/>
+                                          </p:stCondLst>
+                                        </p:cTn>
+                                        <p:tgtEl>
+                                          <p:spTgt spid="7">
+                                            <p:txEl>
+                                              <p:pRg st="1" end="1"/>
+                                            </p:txEl>
+                                          </p:spTgt>
+                                        </p:tgtEl>
+                                        <p:attrNameLst>
+                                          <p:attrName>style.visibility</p:attrName>
+                                        </p:attrNameLst>
+                                      </p:cBhvr>
+                                      <p:to>
+                                        <p:strVal val="visible"/>
+                                      </p:to>
+                                    </p:set>
+                                  </p:childTnLst>
+                                </p:cTn>
+                              </p:par>
+                              <p:par>
+                                <p:cTn id="25" presetID="1" presetClass="entr" presetSubtype="0" fill="hold" grpId="0" nodeType="withEffect">
+                                  <p:stCondLst>
+                                    <p:cond delay="0"/>
+                                  </p:stCondLst>
+                                  <p:childTnLst>
+                                    <p:set>
+                                      <p:cBhvr>
+                                        <p:cTn id="26" dur="1" fill="hold">
+                                          <p:stCondLst>
+                                            <p:cond delay="0"/>
+                                          </p:stCondLst>
+                                        </p:cTn>
+                                        <p:tgtEl>
+                                          <p:spTgt spid="7">
+                                            <p:txEl>
+                                              <p:pRg st="2" end="2"/>
+                                            </p:txEl>
+                                          </p:spTgt>
+                                        </p:tgtEl>
+                                        <p:attrNameLst>
+                                          <p:attrName>style.visibility</p:attrName>
+                                        </p:attrNameLst>
+                                      </p:cBhvr>
+                                      <p:to>
+                                        <p:strVal val="visible"/>
+                                      </p:to>
+                                    </p:set>
+                                  </p:childTnLst>
+                                </p:cTn>
+                              </p:par>
+                            </p:childTnLst>
+                          </p:cTn>
+                        </p:par>
+                      </p:childTnLst>
+                    </p:cTn>
+                  </p:par>
+                </p:childTnLst>
+              </p:cTn>
+              <p:prevCondLst>
+                <p:cond evt="onPrev" delay="0">
+                  <p:tgtEl>
+                    <p:sldTgt/>
+                  </p:tgtEl>
+                </p:cond>
+              </p:prevCondLst>
+              <p:nextCondLst>
+                <p:cond evt="onNext" delay="0">
+                  <p:tgtEl>
+                    <p:sldTgt/>
+                  </p:tgtEl>
+                </p:cond>
+              </p:nextCondLst>
+            </p:seq>
+          </p:childTnLst>
+        </p:cTn>
+      </p:par>
+    </p:tnLst>
+    <p:bldLst>
+      <p:bldP spid="3" grpId="0" build="p"/>
+      <p:bldP spid="7" grpId="0" build="p"/>
+    </p:bldLst>
+  </p:timing>
 </p:sld>
 </file>
 
@@ -7833,46 +8329,83 @@
             <a:spLocks noGrp="1"/>
           </p:cNvSpPr>
           <p:nvPr>
-            <p:ph idx="1"/>
-          </p:nvPr>
-        </p:nvSpPr>
-        <p:spPr/>
+            <p:ph sz="half" idx="2"/>
+          </p:nvPr>
+        </p:nvSpPr>
+        <p:spPr>
+          <a:xfrm>
+            <a:off x="536823" y="2227766"/>
+            <a:ext cx="5311775" cy="3086019"/>
+          </a:xfrm>
+        </p:spPr>
         <p:txBody>
           <a:bodyPr/>
           <a:lstStyle/>
           <a:p>
             <a:r>
               <a:rPr lang="en-US" dirty="0"/>
-              <a:t>Trend Analysis for:</a:t>
-            </a:r>
-          </a:p>
-          <a:p>
-            <a:pPr lvl="1"/>
+              <a:t>Investigate the change in pattern</a:t>
+            </a:r>
+          </a:p>
+          <a:p>
+            <a:r>
+              <a:rPr lang="en-US" dirty="0"/>
+              <a:t>Link trend with environmental factors </a:t>
+            </a:r>
+          </a:p>
+        </p:txBody>
+      </p:sp>
+      <p:sp>
+        <p:nvSpPr>
+          <p:cNvPr id="6" name="Content Placeholder 5">
+            <a:extLst>
+              <a:ext uri="{FF2B5EF4-FFF2-40B4-BE49-F238E27FC236}">
+                <a16:creationId xmlns:a16="http://schemas.microsoft.com/office/drawing/2014/main" id="{B4E470DF-9A76-488F-81FE-8F419691B874}"/>
+              </a:ext>
+            </a:extLst>
+          </p:cNvPr>
+          <p:cNvSpPr>
+            <a:spLocks noGrp="1"/>
+          </p:cNvSpPr>
+          <p:nvPr>
+            <p:ph sz="quarter" idx="4"/>
+          </p:nvPr>
+        </p:nvSpPr>
+        <p:spPr>
+          <a:xfrm>
+            <a:off x="7303323" y="2663613"/>
+            <a:ext cx="4107873" cy="3086019"/>
+          </a:xfrm>
+        </p:spPr>
+        <p:txBody>
+          <a:bodyPr/>
+          <a:lstStyle/>
+          <a:p>
             <a:r>
               <a:rPr lang="en-US" dirty="0"/>
               <a:t>Arctic Terns</a:t>
             </a:r>
           </a:p>
           <a:p>
-            <a:pPr lvl="1"/>
             <a:r>
               <a:rPr lang="en-US" dirty="0"/>
               <a:t>Blue Whales</a:t>
             </a:r>
           </a:p>
           <a:p>
-            <a:pPr lvl="1"/>
             <a:r>
               <a:rPr lang="en-US" dirty="0"/>
               <a:t>Monarch Butterflies</a:t>
             </a:r>
           </a:p>
           <a:p>
-            <a:pPr lvl="1"/>
             <a:r>
               <a:rPr lang="en-US" dirty="0"/>
               <a:t>Humpback Whales</a:t>
             </a:r>
+          </a:p>
+          <a:p>
+            <a:endParaRPr lang="en-US" dirty="0"/>
           </a:p>
         </p:txBody>
       </p:sp>
@@ -7902,6 +8435,81 @@
               <a:t>MaJicK Migration - Private &amp; Confidential @ 2019</a:t>
             </a:r>
             <a:endParaRPr lang="en-US" dirty="0"/>
+          </a:p>
+        </p:txBody>
+      </p:sp>
+      <p:cxnSp>
+        <p:nvCxnSpPr>
+          <p:cNvPr id="8" name="Connector: Elbow 7">
+            <a:extLst>
+              <a:ext uri="{FF2B5EF4-FFF2-40B4-BE49-F238E27FC236}">
+                <a16:creationId xmlns:a16="http://schemas.microsoft.com/office/drawing/2014/main" id="{5F3523E1-23A6-4780-86F1-6230707B8127}"/>
+              </a:ext>
+            </a:extLst>
+          </p:cNvPr>
+          <p:cNvCxnSpPr>
+            <a:cxnSpLocks/>
+          </p:cNvCxnSpPr>
+          <p:nvPr/>
+        </p:nvCxnSpPr>
+        <p:spPr>
+          <a:xfrm>
+            <a:off x="5023262" y="2826327"/>
+            <a:ext cx="2280061" cy="1006222"/>
+          </a:xfrm>
+          <a:prstGeom prst="bentConnector3">
+            <a:avLst/>
+          </a:prstGeom>
+          <a:ln>
+            <a:tailEnd type="triangle"/>
+          </a:ln>
+        </p:spPr>
+        <p:style>
+          <a:lnRef idx="1">
+            <a:schemeClr val="accent1"/>
+          </a:lnRef>
+          <a:fillRef idx="0">
+            <a:schemeClr val="accent1"/>
+          </a:fillRef>
+          <a:effectRef idx="0">
+            <a:schemeClr val="accent1"/>
+          </a:effectRef>
+          <a:fontRef idx="minor">
+            <a:schemeClr val="tx1"/>
+          </a:fontRef>
+        </p:style>
+      </p:cxnSp>
+      <p:sp>
+        <p:nvSpPr>
+          <p:cNvPr id="15" name="Rectangle 14">
+            <a:extLst>
+              <a:ext uri="{FF2B5EF4-FFF2-40B4-BE49-F238E27FC236}">
+                <a16:creationId xmlns:a16="http://schemas.microsoft.com/office/drawing/2014/main" id="{4819932C-681A-4518-BB71-3A07DB890CFC}"/>
+              </a:ext>
+            </a:extLst>
+          </p:cNvPr>
+          <p:cNvSpPr/>
+          <p:nvPr/>
+        </p:nvSpPr>
+        <p:spPr>
+          <a:xfrm>
+            <a:off x="6163292" y="2909219"/>
+            <a:ext cx="1140031" cy="923330"/>
+          </a:xfrm>
+          <a:prstGeom prst="rect">
+            <a:avLst/>
+          </a:prstGeom>
+        </p:spPr>
+        <p:txBody>
+          <a:bodyPr wrap="square">
+            <a:spAutoFit/>
+          </a:bodyPr>
+          <a:lstStyle/>
+          <a:p>
+            <a:r>
+              <a:rPr lang="en-US" dirty="0"/>
+              <a:t>Trend Analysis for </a:t>
+            </a:r>
           </a:p>
         </p:txBody>
       </p:sp>
@@ -7915,6 +8523,334 @@
   <p:clrMapOvr>
     <a:masterClrMapping/>
   </p:clrMapOvr>
+  <p:timing>
+    <p:tnLst>
+      <p:par>
+        <p:cTn id="1" dur="indefinite" restart="never" nodeType="tmRoot">
+          <p:childTnLst>
+            <p:seq concurrent="1" nextAc="seek">
+              <p:cTn id="2" dur="indefinite" nodeType="mainSeq">
+                <p:childTnLst>
+                  <p:par>
+                    <p:cTn id="3" fill="hold">
+                      <p:stCondLst>
+                        <p:cond delay="indefinite"/>
+                      </p:stCondLst>
+                      <p:childTnLst>
+                        <p:par>
+                          <p:cTn id="4" fill="hold">
+                            <p:stCondLst>
+                              <p:cond delay="0"/>
+                            </p:stCondLst>
+                            <p:childTnLst>
+                              <p:par>
+                                <p:cTn id="5" presetID="1" presetClass="entr" presetSubtype="0" fill="hold" grpId="0" nodeType="clickEffect">
+                                  <p:stCondLst>
+                                    <p:cond delay="0"/>
+                                  </p:stCondLst>
+                                  <p:childTnLst>
+                                    <p:set>
+                                      <p:cBhvr>
+                                        <p:cTn id="6" dur="1" fill="hold">
+                                          <p:stCondLst>
+                                            <p:cond delay="0"/>
+                                          </p:stCondLst>
+                                        </p:cTn>
+                                        <p:tgtEl>
+                                          <p:spTgt spid="13">
+                                            <p:txEl>
+                                              <p:pRg st="0" end="0"/>
+                                            </p:txEl>
+                                          </p:spTgt>
+                                        </p:tgtEl>
+                                        <p:attrNameLst>
+                                          <p:attrName>style.visibility</p:attrName>
+                                        </p:attrNameLst>
+                                      </p:cBhvr>
+                                      <p:to>
+                                        <p:strVal val="visible"/>
+                                      </p:to>
+                                    </p:set>
+                                  </p:childTnLst>
+                                </p:cTn>
+                              </p:par>
+                            </p:childTnLst>
+                          </p:cTn>
+                        </p:par>
+                      </p:childTnLst>
+                    </p:cTn>
+                  </p:par>
+                  <p:par>
+                    <p:cTn id="7" fill="hold">
+                      <p:stCondLst>
+                        <p:cond delay="indefinite"/>
+                      </p:stCondLst>
+                      <p:childTnLst>
+                        <p:par>
+                          <p:cTn id="8" fill="hold">
+                            <p:stCondLst>
+                              <p:cond delay="0"/>
+                            </p:stCondLst>
+                            <p:childTnLst>
+                              <p:par>
+                                <p:cTn id="9" presetID="1" presetClass="entr" presetSubtype="0" fill="hold" grpId="0" nodeType="clickEffect">
+                                  <p:stCondLst>
+                                    <p:cond delay="0"/>
+                                  </p:stCondLst>
+                                  <p:childTnLst>
+                                    <p:set>
+                                      <p:cBhvr>
+                                        <p:cTn id="10" dur="1" fill="hold">
+                                          <p:stCondLst>
+                                            <p:cond delay="0"/>
+                                          </p:stCondLst>
+                                        </p:cTn>
+                                        <p:tgtEl>
+                                          <p:spTgt spid="13">
+                                            <p:txEl>
+                                              <p:pRg st="1" end="1"/>
+                                            </p:txEl>
+                                          </p:spTgt>
+                                        </p:tgtEl>
+                                        <p:attrNameLst>
+                                          <p:attrName>style.visibility</p:attrName>
+                                        </p:attrNameLst>
+                                      </p:cBhvr>
+                                      <p:to>
+                                        <p:strVal val="visible"/>
+                                      </p:to>
+                                    </p:set>
+                                  </p:childTnLst>
+                                </p:cTn>
+                              </p:par>
+                            </p:childTnLst>
+                          </p:cTn>
+                        </p:par>
+                      </p:childTnLst>
+                    </p:cTn>
+                  </p:par>
+                  <p:par>
+                    <p:cTn id="11" fill="hold">
+                      <p:stCondLst>
+                        <p:cond delay="indefinite"/>
+                      </p:stCondLst>
+                      <p:childTnLst>
+                        <p:par>
+                          <p:cTn id="12" fill="hold">
+                            <p:stCondLst>
+                              <p:cond delay="0"/>
+                            </p:stCondLst>
+                            <p:childTnLst>
+                              <p:par>
+                                <p:cTn id="13" presetID="1" presetClass="entr" presetSubtype="0" fill="hold" nodeType="clickEffect">
+                                  <p:stCondLst>
+                                    <p:cond delay="0"/>
+                                  </p:stCondLst>
+                                  <p:childTnLst>
+                                    <p:set>
+                                      <p:cBhvr>
+                                        <p:cTn id="14" dur="1" fill="hold">
+                                          <p:stCondLst>
+                                            <p:cond delay="0"/>
+                                          </p:stCondLst>
+                                        </p:cTn>
+                                        <p:tgtEl>
+                                          <p:spTgt spid="8"/>
+                                        </p:tgtEl>
+                                        <p:attrNameLst>
+                                          <p:attrName>style.visibility</p:attrName>
+                                        </p:attrNameLst>
+                                      </p:cBhvr>
+                                      <p:to>
+                                        <p:strVal val="visible"/>
+                                      </p:to>
+                                    </p:set>
+                                  </p:childTnLst>
+                                </p:cTn>
+                              </p:par>
+                              <p:par>
+                                <p:cTn id="15" presetID="1" presetClass="entr" presetSubtype="0" fill="hold" grpId="0" nodeType="withEffect">
+                                  <p:stCondLst>
+                                    <p:cond delay="0"/>
+                                  </p:stCondLst>
+                                  <p:childTnLst>
+                                    <p:set>
+                                      <p:cBhvr>
+                                        <p:cTn id="16" dur="1" fill="hold">
+                                          <p:stCondLst>
+                                            <p:cond delay="0"/>
+                                          </p:stCondLst>
+                                        </p:cTn>
+                                        <p:tgtEl>
+                                          <p:spTgt spid="15"/>
+                                        </p:tgtEl>
+                                        <p:attrNameLst>
+                                          <p:attrName>style.visibility</p:attrName>
+                                        </p:attrNameLst>
+                                      </p:cBhvr>
+                                      <p:to>
+                                        <p:strVal val="visible"/>
+                                      </p:to>
+                                    </p:set>
+                                  </p:childTnLst>
+                                </p:cTn>
+                              </p:par>
+                              <p:par>
+                                <p:cTn id="17" presetID="1" presetClass="entr" presetSubtype="0" fill="hold" nodeType="withEffect">
+                                  <p:stCondLst>
+                                    <p:cond delay="0"/>
+                                  </p:stCondLst>
+                                  <p:childTnLst>
+                                    <p:set>
+                                      <p:cBhvr>
+                                        <p:cTn id="18" dur="1" fill="hold">
+                                          <p:stCondLst>
+                                            <p:cond delay="0"/>
+                                          </p:stCondLst>
+                                        </p:cTn>
+                                        <p:tgtEl>
+                                          <p:spTgt spid="6">
+                                            <p:txEl>
+                                              <p:pRg st="0" end="0"/>
+                                            </p:txEl>
+                                          </p:spTgt>
+                                        </p:tgtEl>
+                                        <p:attrNameLst>
+                                          <p:attrName>style.visibility</p:attrName>
+                                        </p:attrNameLst>
+                                      </p:cBhvr>
+                                      <p:to>
+                                        <p:strVal val="visible"/>
+                                      </p:to>
+                                    </p:set>
+                                  </p:childTnLst>
+                                </p:cTn>
+                              </p:par>
+                              <p:par>
+                                <p:cTn id="19" presetID="1" presetClass="entr" presetSubtype="0" fill="hold" nodeType="withEffect">
+                                  <p:stCondLst>
+                                    <p:cond delay="0"/>
+                                  </p:stCondLst>
+                                  <p:childTnLst>
+                                    <p:set>
+                                      <p:cBhvr>
+                                        <p:cTn id="20" dur="1" fill="hold">
+                                          <p:stCondLst>
+                                            <p:cond delay="0"/>
+                                          </p:stCondLst>
+                                        </p:cTn>
+                                        <p:tgtEl>
+                                          <p:spTgt spid="6">
+                                            <p:txEl>
+                                              <p:pRg st="1" end="1"/>
+                                            </p:txEl>
+                                          </p:spTgt>
+                                        </p:tgtEl>
+                                        <p:attrNameLst>
+                                          <p:attrName>style.visibility</p:attrName>
+                                        </p:attrNameLst>
+                                      </p:cBhvr>
+                                      <p:to>
+                                        <p:strVal val="visible"/>
+                                      </p:to>
+                                    </p:set>
+                                  </p:childTnLst>
+                                </p:cTn>
+                              </p:par>
+                              <p:par>
+                                <p:cTn id="21" presetID="1" presetClass="entr" presetSubtype="0" fill="hold" nodeType="withEffect">
+                                  <p:stCondLst>
+                                    <p:cond delay="0"/>
+                                  </p:stCondLst>
+                                  <p:childTnLst>
+                                    <p:set>
+                                      <p:cBhvr>
+                                        <p:cTn id="22" dur="1" fill="hold">
+                                          <p:stCondLst>
+                                            <p:cond delay="0"/>
+                                          </p:stCondLst>
+                                        </p:cTn>
+                                        <p:tgtEl>
+                                          <p:spTgt spid="6">
+                                            <p:txEl>
+                                              <p:pRg st="2" end="2"/>
+                                            </p:txEl>
+                                          </p:spTgt>
+                                        </p:tgtEl>
+                                        <p:attrNameLst>
+                                          <p:attrName>style.visibility</p:attrName>
+                                        </p:attrNameLst>
+                                      </p:cBhvr>
+                                      <p:to>
+                                        <p:strVal val="visible"/>
+                                      </p:to>
+                                    </p:set>
+                                  </p:childTnLst>
+                                </p:cTn>
+                              </p:par>
+                              <p:par>
+                                <p:cTn id="23" presetID="1" presetClass="entr" presetSubtype="0" fill="hold" nodeType="withEffect">
+                                  <p:stCondLst>
+                                    <p:cond delay="0"/>
+                                  </p:stCondLst>
+                                  <p:childTnLst>
+                                    <p:set>
+                                      <p:cBhvr>
+                                        <p:cTn id="24" dur="1" fill="hold">
+                                          <p:stCondLst>
+                                            <p:cond delay="0"/>
+                                          </p:stCondLst>
+                                        </p:cTn>
+                                        <p:tgtEl>
+                                          <p:spTgt spid="6">
+                                            <p:txEl>
+                                              <p:pRg st="3" end="3"/>
+                                            </p:txEl>
+                                          </p:spTgt>
+                                        </p:tgtEl>
+                                        <p:attrNameLst>
+                                          <p:attrName>style.visibility</p:attrName>
+                                        </p:attrNameLst>
+                                      </p:cBhvr>
+                                      <p:to>
+                                        <p:strVal val="visible"/>
+                                      </p:to>
+                                    </p:set>
+                                  </p:childTnLst>
+                                </p:cTn>
+                              </p:par>
+                            </p:childTnLst>
+                          </p:cTn>
+                        </p:par>
+                      </p:childTnLst>
+                    </p:cTn>
+                  </p:par>
+                </p:childTnLst>
+              </p:cTn>
+              <p:prevCondLst>
+                <p:cond evt="onPrev" delay="0">
+                  <p:tgtEl>
+                    <p:sldTgt/>
+                  </p:tgtEl>
+                </p:cond>
+              </p:prevCondLst>
+              <p:nextCondLst>
+                <p:cond evt="onNext" delay="0">
+                  <p:tgtEl>
+                    <p:sldTgt/>
+                  </p:tgtEl>
+                </p:cond>
+              </p:nextCondLst>
+            </p:seq>
+          </p:childTnLst>
+        </p:cTn>
+      </p:par>
+    </p:tnLst>
+    <p:bldLst>
+      <p:bldP spid="13" grpId="0" build="p"/>
+      <p:bldP spid="15" grpId="0"/>
+    </p:bldLst>
+  </p:timing>
 </p:sld>
 </file>
 
@@ -7965,6 +8901,34 @@
       </p:sp>
       <p:sp>
         <p:nvSpPr>
+          <p:cNvPr id="5" name="Text Placeholder 4">
+            <a:extLst>
+              <a:ext uri="{FF2B5EF4-FFF2-40B4-BE49-F238E27FC236}">
+                <a16:creationId xmlns:a16="http://schemas.microsoft.com/office/drawing/2014/main" id="{49CB8401-74DE-4DA8-AAAA-E8A22CA736AB}"/>
+              </a:ext>
+            </a:extLst>
+          </p:cNvPr>
+          <p:cNvSpPr>
+            <a:spLocks noGrp="1"/>
+          </p:cNvSpPr>
+          <p:nvPr>
+            <p:ph type="body" idx="1"/>
+          </p:nvPr>
+        </p:nvSpPr>
+        <p:spPr/>
+        <p:txBody>
+          <a:bodyPr/>
+          <a:lstStyle/>
+          <a:p>
+            <a:r>
+              <a:rPr lang="en-US" dirty="0"/>
+              <a:t>Datasets </a:t>
+            </a:r>
+          </a:p>
+        </p:txBody>
+      </p:sp>
+      <p:sp>
+        <p:nvSpPr>
           <p:cNvPr id="3" name="Content Placeholder 2">
             <a:extLst>
               <a:ext uri="{FF2B5EF4-FFF2-40B4-BE49-F238E27FC236}">
@@ -7976,7 +8940,7 @@
             <a:spLocks noGrp="1"/>
           </p:cNvSpPr>
           <p:nvPr>
-            <p:ph idx="1"/>
+            <p:ph sz="half" idx="2"/>
           </p:nvPr>
         </p:nvSpPr>
         <p:spPr/>
@@ -7984,13 +8948,6 @@
           <a:bodyPr/>
           <a:lstStyle/>
           <a:p>
-            <a:r>
-              <a:rPr lang="en-US" dirty="0"/>
-              <a:t>Datasets </a:t>
-            </a:r>
-          </a:p>
-          <a:p>
-            <a:pPr lvl="1"/>
             <a:r>
               <a:rPr lang="en-US" dirty="0"/>
               <a:t>OBIS-SEAMAP (</a:t>
@@ -8007,7 +8964,6 @@
             </a:r>
           </a:p>
           <a:p>
-            <a:pPr lvl="1"/>
             <a:r>
               <a:rPr lang="en-US" dirty="0" err="1"/>
               <a:t>iNaturalists</a:t>
@@ -8027,25 +8983,70 @@
               <a:t>)</a:t>
             </a:r>
           </a:p>
+        </p:txBody>
+      </p:sp>
+      <p:sp>
+        <p:nvSpPr>
+          <p:cNvPr id="6" name="Text Placeholder 5">
+            <a:extLst>
+              <a:ext uri="{FF2B5EF4-FFF2-40B4-BE49-F238E27FC236}">
+                <a16:creationId xmlns:a16="http://schemas.microsoft.com/office/drawing/2014/main" id="{C082F4D2-ACC1-4D4E-A66B-DF7FB2EA76F9}"/>
+              </a:ext>
+            </a:extLst>
+          </p:cNvPr>
+          <p:cNvSpPr>
+            <a:spLocks noGrp="1"/>
+          </p:cNvSpPr>
+          <p:nvPr>
+            <p:ph type="body" sz="quarter" idx="3"/>
+          </p:nvPr>
+        </p:nvSpPr>
+        <p:spPr/>
+        <p:txBody>
+          <a:bodyPr/>
+          <a:lstStyle/>
           <a:p>
             <a:r>
               <a:rPr lang="en-US" dirty="0"/>
               <a:t>Visual Graphics</a:t>
             </a:r>
           </a:p>
-          <a:p>
-            <a:pPr lvl="1"/>
+        </p:txBody>
+      </p:sp>
+      <p:sp>
+        <p:nvSpPr>
+          <p:cNvPr id="7" name="Content Placeholder 6">
+            <a:extLst>
+              <a:ext uri="{FF2B5EF4-FFF2-40B4-BE49-F238E27FC236}">
+                <a16:creationId xmlns:a16="http://schemas.microsoft.com/office/drawing/2014/main" id="{FEBF02FC-3C33-4BB0-B9C3-6BF1CA89670D}"/>
+              </a:ext>
+            </a:extLst>
+          </p:cNvPr>
+          <p:cNvSpPr>
+            <a:spLocks noGrp="1"/>
+          </p:cNvSpPr>
+          <p:nvPr>
+            <p:ph sz="quarter" idx="4"/>
+          </p:nvPr>
+        </p:nvSpPr>
+        <p:spPr/>
+        <p:txBody>
+          <a:bodyPr/>
+          <a:lstStyle/>
+          <a:p>
             <a:r>
               <a:rPr lang="en-US" dirty="0"/>
               <a:t>Matplotlib</a:t>
             </a:r>
           </a:p>
           <a:p>
-            <a:pPr lvl="1"/>
             <a:r>
               <a:rPr lang="en-US" dirty="0"/>
               <a:t>Google Cloud Platform </a:t>
             </a:r>
+          </a:p>
+          <a:p>
+            <a:endParaRPr lang="en-US" dirty="0"/>
           </a:p>
         </p:txBody>
       </p:sp>
@@ -8088,6 +9089,264 @@
   <p:clrMapOvr>
     <a:masterClrMapping/>
   </p:clrMapOvr>
+  <p:timing>
+    <p:tnLst>
+      <p:par>
+        <p:cTn id="1" dur="indefinite" restart="never" nodeType="tmRoot">
+          <p:childTnLst>
+            <p:seq concurrent="1" nextAc="seek">
+              <p:cTn id="2" dur="indefinite" nodeType="mainSeq">
+                <p:childTnLst>
+                  <p:par>
+                    <p:cTn id="3" fill="hold">
+                      <p:stCondLst>
+                        <p:cond delay="indefinite"/>
+                      </p:stCondLst>
+                      <p:childTnLst>
+                        <p:par>
+                          <p:cTn id="4" fill="hold">
+                            <p:stCondLst>
+                              <p:cond delay="0"/>
+                            </p:stCondLst>
+                            <p:childTnLst>
+                              <p:par>
+                                <p:cTn id="5" presetID="1" presetClass="entr" presetSubtype="0" fill="hold" grpId="0" nodeType="clickEffect">
+                                  <p:stCondLst>
+                                    <p:cond delay="0"/>
+                                  </p:stCondLst>
+                                  <p:childTnLst>
+                                    <p:set>
+                                      <p:cBhvr>
+                                        <p:cTn id="6" dur="1" fill="hold">
+                                          <p:stCondLst>
+                                            <p:cond delay="0"/>
+                                          </p:stCondLst>
+                                        </p:cTn>
+                                        <p:tgtEl>
+                                          <p:spTgt spid="5">
+                                            <p:txEl>
+                                              <p:pRg st="0" end="0"/>
+                                            </p:txEl>
+                                          </p:spTgt>
+                                        </p:tgtEl>
+                                        <p:attrNameLst>
+                                          <p:attrName>style.visibility</p:attrName>
+                                        </p:attrNameLst>
+                                      </p:cBhvr>
+                                      <p:to>
+                                        <p:strVal val="visible"/>
+                                      </p:to>
+                                    </p:set>
+                                  </p:childTnLst>
+                                </p:cTn>
+                              </p:par>
+                              <p:par>
+                                <p:cTn id="7" presetID="1" presetClass="entr" presetSubtype="0" fill="hold" grpId="0" nodeType="withEffect">
+                                  <p:stCondLst>
+                                    <p:cond delay="0"/>
+                                  </p:stCondLst>
+                                  <p:childTnLst>
+                                    <p:set>
+                                      <p:cBhvr>
+                                        <p:cTn id="8" dur="1" fill="hold">
+                                          <p:stCondLst>
+                                            <p:cond delay="0"/>
+                                          </p:stCondLst>
+                                        </p:cTn>
+                                        <p:tgtEl>
+                                          <p:spTgt spid="3">
+                                            <p:txEl>
+                                              <p:pRg st="0" end="0"/>
+                                            </p:txEl>
+                                          </p:spTgt>
+                                        </p:tgtEl>
+                                        <p:attrNameLst>
+                                          <p:attrName>style.visibility</p:attrName>
+                                        </p:attrNameLst>
+                                      </p:cBhvr>
+                                      <p:to>
+                                        <p:strVal val="visible"/>
+                                      </p:to>
+                                    </p:set>
+                                  </p:childTnLst>
+                                </p:cTn>
+                              </p:par>
+                              <p:par>
+                                <p:cTn id="9" presetID="1" presetClass="entr" presetSubtype="0" fill="hold" grpId="0" nodeType="withEffect">
+                                  <p:stCondLst>
+                                    <p:cond delay="0"/>
+                                  </p:stCondLst>
+                                  <p:childTnLst>
+                                    <p:set>
+                                      <p:cBhvr>
+                                        <p:cTn id="10" dur="1" fill="hold">
+                                          <p:stCondLst>
+                                            <p:cond delay="0"/>
+                                          </p:stCondLst>
+                                        </p:cTn>
+                                        <p:tgtEl>
+                                          <p:spTgt spid="3">
+                                            <p:txEl>
+                                              <p:pRg st="1" end="1"/>
+                                            </p:txEl>
+                                          </p:spTgt>
+                                        </p:tgtEl>
+                                        <p:attrNameLst>
+                                          <p:attrName>style.visibility</p:attrName>
+                                        </p:attrNameLst>
+                                      </p:cBhvr>
+                                      <p:to>
+                                        <p:strVal val="visible"/>
+                                      </p:to>
+                                    </p:set>
+                                  </p:childTnLst>
+                                </p:cTn>
+                              </p:par>
+                            </p:childTnLst>
+                          </p:cTn>
+                        </p:par>
+                      </p:childTnLst>
+                    </p:cTn>
+                  </p:par>
+                  <p:par>
+                    <p:cTn id="11" fill="hold">
+                      <p:stCondLst>
+                        <p:cond delay="indefinite"/>
+                      </p:stCondLst>
+                      <p:childTnLst>
+                        <p:par>
+                          <p:cTn id="12" fill="hold">
+                            <p:stCondLst>
+                              <p:cond delay="0"/>
+                            </p:stCondLst>
+                            <p:childTnLst>
+                              <p:par>
+                                <p:cTn id="13" presetID="1" presetClass="entr" presetSubtype="0" fill="hold" grpId="0" nodeType="clickEffect">
+                                  <p:stCondLst>
+                                    <p:cond delay="0"/>
+                                  </p:stCondLst>
+                                  <p:childTnLst>
+                                    <p:set>
+                                      <p:cBhvr>
+                                        <p:cTn id="14" dur="1" fill="hold">
+                                          <p:stCondLst>
+                                            <p:cond delay="0"/>
+                                          </p:stCondLst>
+                                        </p:cTn>
+                                        <p:tgtEl>
+                                          <p:spTgt spid="6">
+                                            <p:txEl>
+                                              <p:pRg st="0" end="0"/>
+                                            </p:txEl>
+                                          </p:spTgt>
+                                        </p:tgtEl>
+                                        <p:attrNameLst>
+                                          <p:attrName>style.visibility</p:attrName>
+                                        </p:attrNameLst>
+                                      </p:cBhvr>
+                                      <p:to>
+                                        <p:strVal val="visible"/>
+                                      </p:to>
+                                    </p:set>
+                                  </p:childTnLst>
+                                </p:cTn>
+                              </p:par>
+                              <p:par>
+                                <p:cTn id="15" presetID="1" presetClass="entr" presetSubtype="0" fill="hold" grpId="0" nodeType="withEffect">
+                                  <p:stCondLst>
+                                    <p:cond delay="0"/>
+                                  </p:stCondLst>
+                                  <p:childTnLst>
+                                    <p:set>
+                                      <p:cBhvr>
+                                        <p:cTn id="16" dur="1" fill="hold">
+                                          <p:stCondLst>
+                                            <p:cond delay="0"/>
+                                          </p:stCondLst>
+                                        </p:cTn>
+                                        <p:tgtEl>
+                                          <p:spTgt spid="7">
+                                            <p:txEl>
+                                              <p:pRg st="0" end="0"/>
+                                            </p:txEl>
+                                          </p:spTgt>
+                                        </p:tgtEl>
+                                        <p:attrNameLst>
+                                          <p:attrName>style.visibility</p:attrName>
+                                        </p:attrNameLst>
+                                      </p:cBhvr>
+                                      <p:to>
+                                        <p:strVal val="visible"/>
+                                      </p:to>
+                                    </p:set>
+                                  </p:childTnLst>
+                                </p:cTn>
+                              </p:par>
+                              <p:par>
+                                <p:cTn id="17" presetID="1" presetClass="entr" presetSubtype="0" fill="hold" grpId="0" nodeType="withEffect">
+                                  <p:stCondLst>
+                                    <p:cond delay="0"/>
+                                  </p:stCondLst>
+                                  <p:childTnLst>
+                                    <p:set>
+                                      <p:cBhvr>
+                                        <p:cTn id="18" dur="1" fill="hold">
+                                          <p:stCondLst>
+                                            <p:cond delay="0"/>
+                                          </p:stCondLst>
+                                        </p:cTn>
+                                        <p:tgtEl>
+                                          <p:spTgt spid="7">
+                                            <p:txEl>
+                                              <p:pRg st="1" end="1"/>
+                                            </p:txEl>
+                                          </p:spTgt>
+                                        </p:tgtEl>
+                                        <p:attrNameLst>
+                                          <p:attrName>style.visibility</p:attrName>
+                                        </p:attrNameLst>
+                                      </p:cBhvr>
+                                      <p:to>
+                                        <p:strVal val="visible"/>
+                                      </p:to>
+                                    </p:set>
+                                  </p:childTnLst>
+                                </p:cTn>
+                              </p:par>
+                            </p:childTnLst>
+                          </p:cTn>
+                        </p:par>
+                      </p:childTnLst>
+                    </p:cTn>
+                  </p:par>
+                </p:childTnLst>
+              </p:cTn>
+              <p:prevCondLst>
+                <p:cond evt="onPrev" delay="0">
+                  <p:tgtEl>
+                    <p:sldTgt/>
+                  </p:tgtEl>
+                </p:cond>
+              </p:prevCondLst>
+              <p:nextCondLst>
+                <p:cond evt="onNext" delay="0">
+                  <p:tgtEl>
+                    <p:sldTgt/>
+                  </p:tgtEl>
+                </p:cond>
+              </p:nextCondLst>
+            </p:seq>
+          </p:childTnLst>
+        </p:cTn>
+      </p:par>
+    </p:tnLst>
+    <p:bldLst>
+      <p:bldP spid="5" grpId="0" build="p"/>
+      <p:bldP spid="3" grpId="0" uiExpand="1" build="p"/>
+      <p:bldP spid="6" grpId="0" build="p"/>
+      <p:bldP spid="7" grpId="0" build="p"/>
+    </p:bldLst>
+  </p:timing>
 </p:sld>
 </file>
 
@@ -8221,25 +9480,16 @@
           <a:bodyPr/>
           <a:lstStyle/>
           <a:p>
-            <a:r>
-              <a:rPr lang="en-US" dirty="0"/>
-              <a:t>Migration Pattern and time frame</a:t>
-            </a:r>
-          </a:p>
-          <a:p>
-            <a:r>
-              <a:rPr lang="en-US" dirty="0"/>
-              <a:t>Observable Trends</a:t>
-            </a:r>
+            <a:endParaRPr lang="en-US" dirty="0"/>
           </a:p>
         </p:txBody>
       </p:sp>
       <p:pic>
         <p:nvPicPr>
-          <p:cNvPr id="3" name="Picture 2">
+          <p:cNvPr id="6" name="Picture 5">
             <a:extLst>
               <a:ext uri="{FF2B5EF4-FFF2-40B4-BE49-F238E27FC236}">
-                <a16:creationId xmlns:a16="http://schemas.microsoft.com/office/drawing/2014/main" id="{48EC9E94-A012-4765-9C03-415A55EC0199}"/>
+                <a16:creationId xmlns:a16="http://schemas.microsoft.com/office/drawing/2014/main" id="{70F6B646-A54B-4EB7-BDD5-6AA082F7F6A1}"/>
               </a:ext>
             </a:extLst>
           </p:cNvPr>
@@ -8256,8 +9506,8 @@
         </p:blipFill>
         <p:spPr>
           <a:xfrm>
-            <a:off x="5907869" y="2194559"/>
-            <a:ext cx="5501100" cy="3899068"/>
+            <a:off x="2906206" y="2194558"/>
+            <a:ext cx="6710591" cy="4024125"/>
           </a:xfrm>
           <a:prstGeom prst="rect">
             <a:avLst/>
@@ -8274,6 +9524,203 @@
   <p:clrMapOvr>
     <a:masterClrMapping/>
   </p:clrMapOvr>
+  <p:timing>
+    <p:tnLst>
+      <p:par>
+        <p:cTn id="1" dur="indefinite" restart="never" nodeType="tmRoot">
+          <p:childTnLst>
+            <p:seq concurrent="1" nextAc="seek">
+              <p:cTn id="2" dur="indefinite" nodeType="mainSeq">
+                <p:childTnLst>
+                  <p:par>
+                    <p:cTn id="3" fill="hold">
+                      <p:stCondLst>
+                        <p:cond delay="indefinite"/>
+                      </p:stCondLst>
+                      <p:childTnLst>
+                        <p:par>
+                          <p:cTn id="4" fill="hold">
+                            <p:stCondLst>
+                              <p:cond delay="0"/>
+                            </p:stCondLst>
+                            <p:childTnLst>
+                              <p:par>
+                                <p:cTn id="5" presetID="31" presetClass="entr" presetSubtype="0" fill="hold" nodeType="clickEffect">
+                                  <p:stCondLst>
+                                    <p:cond delay="0"/>
+                                  </p:stCondLst>
+                                  <p:childTnLst>
+                                    <p:set>
+                                      <p:cBhvr>
+                                        <p:cTn id="6" dur="1" fill="hold">
+                                          <p:stCondLst>
+                                            <p:cond delay="0"/>
+                                          </p:stCondLst>
+                                        </p:cTn>
+                                        <p:tgtEl>
+                                          <p:spTgt spid="5"/>
+                                        </p:tgtEl>
+                                        <p:attrNameLst>
+                                          <p:attrName>style.visibility</p:attrName>
+                                        </p:attrNameLst>
+                                      </p:cBhvr>
+                                      <p:to>
+                                        <p:strVal val="visible"/>
+                                      </p:to>
+                                    </p:set>
+                                    <p:anim calcmode="lin" valueType="num">
+                                      <p:cBhvr>
+                                        <p:cTn id="7" dur="1000" fill="hold"/>
+                                        <p:tgtEl>
+                                          <p:spTgt spid="5"/>
+                                        </p:tgtEl>
+                                        <p:attrNameLst>
+                                          <p:attrName>ppt_w</p:attrName>
+                                        </p:attrNameLst>
+                                      </p:cBhvr>
+                                      <p:tavLst>
+                                        <p:tav tm="0">
+                                          <p:val>
+                                            <p:fltVal val="0"/>
+                                          </p:val>
+                                        </p:tav>
+                                        <p:tav tm="100000">
+                                          <p:val>
+                                            <p:strVal val="#ppt_w"/>
+                                          </p:val>
+                                        </p:tav>
+                                      </p:tavLst>
+                                    </p:anim>
+                                    <p:anim calcmode="lin" valueType="num">
+                                      <p:cBhvr>
+                                        <p:cTn id="8" dur="1000" fill="hold"/>
+                                        <p:tgtEl>
+                                          <p:spTgt spid="5"/>
+                                        </p:tgtEl>
+                                        <p:attrNameLst>
+                                          <p:attrName>ppt_h</p:attrName>
+                                        </p:attrNameLst>
+                                      </p:cBhvr>
+                                      <p:tavLst>
+                                        <p:tav tm="0">
+                                          <p:val>
+                                            <p:fltVal val="0"/>
+                                          </p:val>
+                                        </p:tav>
+                                        <p:tav tm="100000">
+                                          <p:val>
+                                            <p:strVal val="#ppt_h"/>
+                                          </p:val>
+                                        </p:tav>
+                                      </p:tavLst>
+                                    </p:anim>
+                                    <p:anim calcmode="lin" valueType="num">
+                                      <p:cBhvr>
+                                        <p:cTn id="9" dur="1000" fill="hold"/>
+                                        <p:tgtEl>
+                                          <p:spTgt spid="5"/>
+                                        </p:tgtEl>
+                                        <p:attrNameLst>
+                                          <p:attrName>style.rotation</p:attrName>
+                                        </p:attrNameLst>
+                                      </p:cBhvr>
+                                      <p:tavLst>
+                                        <p:tav tm="0">
+                                          <p:val>
+                                            <p:fltVal val="90"/>
+                                          </p:val>
+                                        </p:tav>
+                                        <p:tav tm="100000">
+                                          <p:val>
+                                            <p:fltVal val="0"/>
+                                          </p:val>
+                                        </p:tav>
+                                      </p:tavLst>
+                                    </p:anim>
+                                    <p:animEffect transition="in" filter="fade">
+                                      <p:cBhvr>
+                                        <p:cTn id="10" dur="1000"/>
+                                        <p:tgtEl>
+                                          <p:spTgt spid="5"/>
+                                        </p:tgtEl>
+                                      </p:cBhvr>
+                                    </p:animEffect>
+                                  </p:childTnLst>
+                                </p:cTn>
+                              </p:par>
+                            </p:childTnLst>
+                          </p:cTn>
+                        </p:par>
+                      </p:childTnLst>
+                    </p:cTn>
+                  </p:par>
+                  <p:par>
+                    <p:cTn id="11" fill="hold">
+                      <p:stCondLst>
+                        <p:cond delay="indefinite"/>
+                      </p:stCondLst>
+                      <p:childTnLst>
+                        <p:par>
+                          <p:cTn id="12" fill="hold">
+                            <p:stCondLst>
+                              <p:cond delay="0"/>
+                            </p:stCondLst>
+                            <p:childTnLst>
+                              <p:par>
+                                <p:cTn id="13" presetID="1" presetClass="entr" presetSubtype="0" fill="hold" nodeType="clickEffect">
+                                  <p:stCondLst>
+                                    <p:cond delay="0"/>
+                                  </p:stCondLst>
+                                  <p:childTnLst>
+                                    <p:set>
+                                      <p:cBhvr>
+                                        <p:cTn id="14" dur="1" fill="hold">
+                                          <p:stCondLst>
+                                            <p:cond delay="0"/>
+                                          </p:stCondLst>
+                                        </p:cTn>
+                                        <p:tgtEl>
+                                          <p:spTgt spid="6"/>
+                                        </p:tgtEl>
+                                        <p:attrNameLst>
+                                          <p:attrName>style.visibility</p:attrName>
+                                        </p:attrNameLst>
+                                      </p:cBhvr>
+                                      <p:to>
+                                        <p:strVal val="visible"/>
+                                      </p:to>
+                                    </p:set>
+                                  </p:childTnLst>
+                                </p:cTn>
+                              </p:par>
+                            </p:childTnLst>
+                          </p:cTn>
+                        </p:par>
+                      </p:childTnLst>
+                    </p:cTn>
+                  </p:par>
+                </p:childTnLst>
+              </p:cTn>
+              <p:prevCondLst>
+                <p:cond evt="onPrev" delay="0">
+                  <p:tgtEl>
+                    <p:sldTgt/>
+                  </p:tgtEl>
+                </p:cond>
+              </p:prevCondLst>
+              <p:nextCondLst>
+                <p:cond evt="onNext" delay="0">
+                  <p:tgtEl>
+                    <p:sldTgt/>
+                  </p:tgtEl>
+                </p:cond>
+              </p:nextCondLst>
+            </p:seq>
+          </p:childTnLst>
+        </p:cTn>
+      </p:par>
+    </p:tnLst>
+  </p:timing>
 </p:sld>
 </file>
 
@@ -8373,8 +9820,8 @@
         </p:nvSpPr>
         <p:spPr>
           <a:xfrm>
-            <a:off x="685800" y="3132666"/>
-            <a:ext cx="5311775" cy="3086019"/>
+            <a:off x="685801" y="3132666"/>
+            <a:ext cx="4693722" cy="3086019"/>
           </a:xfrm>
         </p:spPr>
         <p:txBody>
@@ -8521,8 +9968,8 @@
         </p:blipFill>
         <p:spPr>
           <a:xfrm>
-            <a:off x="6172200" y="2194560"/>
-            <a:ext cx="5605672" cy="4024125"/>
+            <a:off x="5652655" y="2194560"/>
+            <a:ext cx="6125217" cy="4024125"/>
           </a:xfrm>
           <a:prstGeom prst="rect">
             <a:avLst/>
@@ -8544,14 +9991,14 @@
           <p:nvPr>
             <p:extLst>
               <p:ext uri="{D42A27DB-BD31-4B8C-83A1-F6EECF244321}">
-                <p14:modId xmlns:p14="http://schemas.microsoft.com/office/powerpoint/2010/main" val="2932743281"/>
+                <p14:modId xmlns:p14="http://schemas.microsoft.com/office/powerpoint/2010/main" val="1692439911"/>
               </p:ext>
             </p:extLst>
           </p:nvPr>
         </p:nvGraphicFramePr>
         <p:xfrm>
-          <a:off x="706046" y="3132666"/>
-          <a:ext cx="5311776" cy="1854200"/>
+          <a:off x="706045" y="3132666"/>
+          <a:ext cx="4018684" cy="1843095"/>
         </p:xfrm>
         <a:graphic>
           <a:graphicData uri="http://schemas.openxmlformats.org/drawingml/2006/table">
@@ -8560,14 +10007,14 @@
                 <a:tableStyleId>{5C22544A-7EE6-4342-B048-85BDC9FD1C3A}</a:tableStyleId>
               </a:tblPr>
               <a:tblGrid>
-                <a:gridCol w="2655888">
+                <a:gridCol w="2009342">
                   <a:extLst>
                     <a:ext uri="{9D8B030D-6E8A-4147-A177-3AD203B41FA5}">
                       <a16:colId xmlns:a16="http://schemas.microsoft.com/office/drawing/2014/main" val="3245679234"/>
                     </a:ext>
                   </a:extLst>
                 </a:gridCol>
-                <a:gridCol w="2655888">
+                <a:gridCol w="2009342">
                   <a:extLst>
                     <a:ext uri="{9D8B030D-6E8A-4147-A177-3AD203B41FA5}">
                       <a16:colId xmlns:a16="http://schemas.microsoft.com/office/drawing/2014/main" val="2484969888"/>
@@ -8575,7 +10022,7 @@
                   </a:extLst>
                 </a:gridCol>
               </a:tblGrid>
-              <a:tr h="370840">
+              <a:tr h="368619">
                 <a:tc>
                   <a:txBody>
                     <a:bodyPr/>
@@ -8622,7 +10069,7 @@
                   </a:ext>
                 </a:extLst>
               </a:tr>
-              <a:tr h="370840">
+              <a:tr h="368619">
                 <a:tc>
                   <a:txBody>
                     <a:bodyPr/>
@@ -8667,7 +10114,7 @@
                   </a:ext>
                 </a:extLst>
               </a:tr>
-              <a:tr h="370840">
+              <a:tr h="368619">
                 <a:tc>
                   <a:txBody>
                     <a:bodyPr/>
@@ -8711,7 +10158,7 @@
                   </a:ext>
                 </a:extLst>
               </a:tr>
-              <a:tr h="370840">
+              <a:tr h="368619">
                 <a:tc>
                   <a:txBody>
                     <a:bodyPr/>
@@ -8756,7 +10203,7 @@
                   </a:ext>
                 </a:extLst>
               </a:tr>
-              <a:tr h="370840">
+              <a:tr h="368619">
                 <a:tc>
                   <a:txBody>
                     <a:bodyPr/>
@@ -8923,53 +10370,21 @@
           </a:prstGeom>
         </p:spPr>
       </p:pic>
-      <p:sp>
-        <p:nvSpPr>
-          <p:cNvPr id="13" name="Content Placeholder 12">
+      <p:pic>
+        <p:nvPicPr>
+          <p:cNvPr id="6" name="Content Placeholder 5">
             <a:extLst>
               <a:ext uri="{FF2B5EF4-FFF2-40B4-BE49-F238E27FC236}">
-                <a16:creationId xmlns:a16="http://schemas.microsoft.com/office/drawing/2014/main" id="{6792DC6A-6E56-439A-8F47-62DAE52E33B1}"/>
-              </a:ext>
-            </a:extLst>
-          </p:cNvPr>
-          <p:cNvSpPr>
-            <a:spLocks noGrp="1"/>
-          </p:cNvSpPr>
-          <p:nvPr>
-            <p:ph idx="1"/>
-          </p:nvPr>
-        </p:nvSpPr>
-        <p:spPr/>
-        <p:txBody>
-          <a:bodyPr/>
-          <a:lstStyle/>
-          <a:p>
-            <a:r>
-              <a:rPr lang="en-US" dirty="0"/>
-              <a:t>Migration Pattern and time frame</a:t>
-            </a:r>
-          </a:p>
-          <a:p>
-            <a:r>
-              <a:rPr lang="en-US" dirty="0"/>
-              <a:t>Observable Trends</a:t>
-            </a:r>
-          </a:p>
-        </p:txBody>
-      </p:sp>
-      <p:pic>
-        <p:nvPicPr>
-          <p:cNvPr id="3" name="Picture 2">
-            <a:extLst>
-              <a:ext uri="{FF2B5EF4-FFF2-40B4-BE49-F238E27FC236}">
-                <a16:creationId xmlns:a16="http://schemas.microsoft.com/office/drawing/2014/main" id="{5C7D26E1-469B-4A3B-B7E3-FB8DA653F31A}"/>
+                <a16:creationId xmlns:a16="http://schemas.microsoft.com/office/drawing/2014/main" id="{6556B06E-2E40-43A9-8719-1324100D51D5}"/>
               </a:ext>
             </a:extLst>
           </p:cNvPr>
           <p:cNvPicPr>
-            <a:picLocks noChangeAspect="1"/>
+            <a:picLocks noGrp="1" noChangeAspect="1"/>
           </p:cNvPicPr>
-          <p:nvPr/>
+          <p:nvPr>
+            <p:ph idx="1"/>
+          </p:nvPr>
         </p:nvPicPr>
         <p:blipFill>
           <a:blip r:embed="rId3"/>
@@ -8979,8 +10394,8 @@
         </p:blipFill>
         <p:spPr>
           <a:xfrm>
-            <a:off x="5853705" y="2263139"/>
-            <a:ext cx="5469070" cy="3745775"/>
+            <a:off x="3063861" y="2222799"/>
+            <a:ext cx="6594033" cy="4133046"/>
           </a:xfrm>
           <a:prstGeom prst="rect">
             <a:avLst/>
@@ -8997,6 +10412,203 @@
   <p:clrMapOvr>
     <a:masterClrMapping/>
   </p:clrMapOvr>
+  <p:timing>
+    <p:tnLst>
+      <p:par>
+        <p:cTn id="1" dur="indefinite" restart="never" nodeType="tmRoot">
+          <p:childTnLst>
+            <p:seq concurrent="1" nextAc="seek">
+              <p:cTn id="2" dur="indefinite" nodeType="mainSeq">
+                <p:childTnLst>
+                  <p:par>
+                    <p:cTn id="3" fill="hold">
+                      <p:stCondLst>
+                        <p:cond delay="indefinite"/>
+                      </p:stCondLst>
+                      <p:childTnLst>
+                        <p:par>
+                          <p:cTn id="4" fill="hold">
+                            <p:stCondLst>
+                              <p:cond delay="0"/>
+                            </p:stCondLst>
+                            <p:childTnLst>
+                              <p:par>
+                                <p:cTn id="5" presetID="31" presetClass="entr" presetSubtype="0" fill="hold" nodeType="clickEffect">
+                                  <p:stCondLst>
+                                    <p:cond delay="0"/>
+                                  </p:stCondLst>
+                                  <p:childTnLst>
+                                    <p:set>
+                                      <p:cBhvr>
+                                        <p:cTn id="6" dur="1" fill="hold">
+                                          <p:stCondLst>
+                                            <p:cond delay="0"/>
+                                          </p:stCondLst>
+                                        </p:cTn>
+                                        <p:tgtEl>
+                                          <p:spTgt spid="5"/>
+                                        </p:tgtEl>
+                                        <p:attrNameLst>
+                                          <p:attrName>style.visibility</p:attrName>
+                                        </p:attrNameLst>
+                                      </p:cBhvr>
+                                      <p:to>
+                                        <p:strVal val="visible"/>
+                                      </p:to>
+                                    </p:set>
+                                    <p:anim calcmode="lin" valueType="num">
+                                      <p:cBhvr>
+                                        <p:cTn id="7" dur="1000" fill="hold"/>
+                                        <p:tgtEl>
+                                          <p:spTgt spid="5"/>
+                                        </p:tgtEl>
+                                        <p:attrNameLst>
+                                          <p:attrName>ppt_w</p:attrName>
+                                        </p:attrNameLst>
+                                      </p:cBhvr>
+                                      <p:tavLst>
+                                        <p:tav tm="0">
+                                          <p:val>
+                                            <p:fltVal val="0"/>
+                                          </p:val>
+                                        </p:tav>
+                                        <p:tav tm="100000">
+                                          <p:val>
+                                            <p:strVal val="#ppt_w"/>
+                                          </p:val>
+                                        </p:tav>
+                                      </p:tavLst>
+                                    </p:anim>
+                                    <p:anim calcmode="lin" valueType="num">
+                                      <p:cBhvr>
+                                        <p:cTn id="8" dur="1000" fill="hold"/>
+                                        <p:tgtEl>
+                                          <p:spTgt spid="5"/>
+                                        </p:tgtEl>
+                                        <p:attrNameLst>
+                                          <p:attrName>ppt_h</p:attrName>
+                                        </p:attrNameLst>
+                                      </p:cBhvr>
+                                      <p:tavLst>
+                                        <p:tav tm="0">
+                                          <p:val>
+                                            <p:fltVal val="0"/>
+                                          </p:val>
+                                        </p:tav>
+                                        <p:tav tm="100000">
+                                          <p:val>
+                                            <p:strVal val="#ppt_h"/>
+                                          </p:val>
+                                        </p:tav>
+                                      </p:tavLst>
+                                    </p:anim>
+                                    <p:anim calcmode="lin" valueType="num">
+                                      <p:cBhvr>
+                                        <p:cTn id="9" dur="1000" fill="hold"/>
+                                        <p:tgtEl>
+                                          <p:spTgt spid="5"/>
+                                        </p:tgtEl>
+                                        <p:attrNameLst>
+                                          <p:attrName>style.rotation</p:attrName>
+                                        </p:attrNameLst>
+                                      </p:cBhvr>
+                                      <p:tavLst>
+                                        <p:tav tm="0">
+                                          <p:val>
+                                            <p:fltVal val="90"/>
+                                          </p:val>
+                                        </p:tav>
+                                        <p:tav tm="100000">
+                                          <p:val>
+                                            <p:fltVal val="0"/>
+                                          </p:val>
+                                        </p:tav>
+                                      </p:tavLst>
+                                    </p:anim>
+                                    <p:animEffect transition="in" filter="fade">
+                                      <p:cBhvr>
+                                        <p:cTn id="10" dur="1000"/>
+                                        <p:tgtEl>
+                                          <p:spTgt spid="5"/>
+                                        </p:tgtEl>
+                                      </p:cBhvr>
+                                    </p:animEffect>
+                                  </p:childTnLst>
+                                </p:cTn>
+                              </p:par>
+                            </p:childTnLst>
+                          </p:cTn>
+                        </p:par>
+                      </p:childTnLst>
+                    </p:cTn>
+                  </p:par>
+                  <p:par>
+                    <p:cTn id="11" fill="hold">
+                      <p:stCondLst>
+                        <p:cond delay="indefinite"/>
+                      </p:stCondLst>
+                      <p:childTnLst>
+                        <p:par>
+                          <p:cTn id="12" fill="hold">
+                            <p:stCondLst>
+                              <p:cond delay="0"/>
+                            </p:stCondLst>
+                            <p:childTnLst>
+                              <p:par>
+                                <p:cTn id="13" presetID="1" presetClass="entr" presetSubtype="0" fill="hold" nodeType="clickEffect">
+                                  <p:stCondLst>
+                                    <p:cond delay="0"/>
+                                  </p:stCondLst>
+                                  <p:childTnLst>
+                                    <p:set>
+                                      <p:cBhvr>
+                                        <p:cTn id="14" dur="1" fill="hold">
+                                          <p:stCondLst>
+                                            <p:cond delay="0"/>
+                                          </p:stCondLst>
+                                        </p:cTn>
+                                        <p:tgtEl>
+                                          <p:spTgt spid="6"/>
+                                        </p:tgtEl>
+                                        <p:attrNameLst>
+                                          <p:attrName>style.visibility</p:attrName>
+                                        </p:attrNameLst>
+                                      </p:cBhvr>
+                                      <p:to>
+                                        <p:strVal val="visible"/>
+                                      </p:to>
+                                    </p:set>
+                                  </p:childTnLst>
+                                </p:cTn>
+                              </p:par>
+                            </p:childTnLst>
+                          </p:cTn>
+                        </p:par>
+                      </p:childTnLst>
+                    </p:cTn>
+                  </p:par>
+                </p:childTnLst>
+              </p:cTn>
+              <p:prevCondLst>
+                <p:cond evt="onPrev" delay="0">
+                  <p:tgtEl>
+                    <p:sldTgt/>
+                  </p:tgtEl>
+                </p:cond>
+              </p:prevCondLst>
+              <p:nextCondLst>
+                <p:cond evt="onNext" delay="0">
+                  <p:tgtEl>
+                    <p:sldTgt/>
+                  </p:tgtEl>
+                </p:cond>
+              </p:nextCondLst>
+            </p:seq>
+          </p:childTnLst>
+        </p:cTn>
+      </p:par>
+    </p:tnLst>
+  </p:timing>
 </p:sld>
 </file>
 
@@ -9201,14 +10813,14 @@
           <p:nvPr>
             <p:extLst>
               <p:ext uri="{D42A27DB-BD31-4B8C-83A1-F6EECF244321}">
-                <p14:modId xmlns:p14="http://schemas.microsoft.com/office/powerpoint/2010/main" val="3937103469"/>
+                <p14:modId xmlns:p14="http://schemas.microsoft.com/office/powerpoint/2010/main" val="2849865104"/>
               </p:ext>
             </p:extLst>
           </p:nvPr>
         </p:nvGraphicFramePr>
         <p:xfrm>
           <a:off x="706046" y="3132666"/>
-          <a:ext cx="4323482" cy="1854200"/>
+          <a:ext cx="3854080" cy="1854200"/>
         </p:xfrm>
         <a:graphic>
           <a:graphicData uri="http://schemas.openxmlformats.org/drawingml/2006/table">
@@ -9217,14 +10829,14 @@
                 <a:tableStyleId>{5C22544A-7EE6-4342-B048-85BDC9FD1C3A}</a:tableStyleId>
               </a:tblPr>
               <a:tblGrid>
-                <a:gridCol w="2161741">
+                <a:gridCol w="1927040">
                   <a:extLst>
                     <a:ext uri="{9D8B030D-6E8A-4147-A177-3AD203B41FA5}">
                       <a16:colId xmlns:a16="http://schemas.microsoft.com/office/drawing/2014/main" val="3245679234"/>
                     </a:ext>
                   </a:extLst>
                 </a:gridCol>
-                <a:gridCol w="2161741">
+                <a:gridCol w="1927040">
                   <a:extLst>
                     <a:ext uri="{9D8B030D-6E8A-4147-A177-3AD203B41FA5}">
                       <a16:colId xmlns:a16="http://schemas.microsoft.com/office/drawing/2014/main" val="2484969888"/>
@@ -9607,40 +11219,38 @@
           </a:p>
         </p:txBody>
       </p:sp>
-      <p:sp>
-        <p:nvSpPr>
-          <p:cNvPr id="15" name="Content Placeholder 14">
+      <p:pic>
+        <p:nvPicPr>
+          <p:cNvPr id="3" name="Content Placeholder 2">
             <a:extLst>
               <a:ext uri="{FF2B5EF4-FFF2-40B4-BE49-F238E27FC236}">
-                <a16:creationId xmlns:a16="http://schemas.microsoft.com/office/drawing/2014/main" id="{BEB2D8DF-8BCE-43BD-8550-7D8C5BAFACA0}"/>
+                <a16:creationId xmlns:a16="http://schemas.microsoft.com/office/drawing/2014/main" id="{18C01C05-3824-447C-AA3C-75C49254C0FF}"/>
               </a:ext>
             </a:extLst>
           </p:cNvPr>
-          <p:cNvSpPr>
-            <a:spLocks noGrp="1"/>
-          </p:cNvSpPr>
+          <p:cNvPicPr>
+            <a:picLocks noGrp="1" noChangeAspect="1"/>
+          </p:cNvPicPr>
           <p:nvPr>
             <p:ph idx="1"/>
           </p:nvPr>
-        </p:nvSpPr>
-        <p:spPr/>
-        <p:txBody>
-          <a:bodyPr/>
-          <a:lstStyle/>
-          <a:p>
-            <a:r>
-              <a:rPr lang="en-US" dirty="0"/>
-              <a:t>Migration Pattern and time frame</a:t>
-            </a:r>
-          </a:p>
-          <a:p>
-            <a:r>
-              <a:rPr lang="en-US" dirty="0"/>
-              <a:t>Observable Trends</a:t>
-            </a:r>
-          </a:p>
-        </p:txBody>
-      </p:sp>
+        </p:nvPicPr>
+        <p:blipFill>
+          <a:blip r:embed="rId3"/>
+          <a:stretch>
+            <a:fillRect/>
+          </a:stretch>
+        </p:blipFill>
+        <p:spPr>
+          <a:xfrm>
+            <a:off x="2682576" y="2182459"/>
+            <a:ext cx="6582335" cy="4125884"/>
+          </a:xfrm>
+          <a:prstGeom prst="rect">
+            <a:avLst/>
+          </a:prstGeom>
+        </p:spPr>
+      </p:pic>
       <p:pic>
         <p:nvPicPr>
           <p:cNvPr id="7" name="Picture 6" descr="A insect on the grass&#10;&#10;Description automatically generated">
@@ -9656,7 +11266,7 @@
           <p:nvPr/>
         </p:nvPicPr>
         <p:blipFill>
-          <a:blip r:embed="rId3">
+          <a:blip r:embed="rId4">
             <a:extLst>
               <a:ext uri="{28A0092B-C50C-407E-A947-70E740481C1C}">
                 <a14:useLocalDpi xmlns:a14="http://schemas.microsoft.com/office/drawing/2010/main" val="0"/>
@@ -9677,36 +11287,6 @@
           </a:prstGeom>
         </p:spPr>
       </p:pic>
-      <p:pic>
-        <p:nvPicPr>
-          <p:cNvPr id="6" name="Picture 5">
-            <a:extLst>
-              <a:ext uri="{FF2B5EF4-FFF2-40B4-BE49-F238E27FC236}">
-                <a16:creationId xmlns:a16="http://schemas.microsoft.com/office/drawing/2014/main" id="{C86D7562-8037-469A-9F56-5B8965D666B4}"/>
-              </a:ext>
-            </a:extLst>
-          </p:cNvPr>
-          <p:cNvPicPr>
-            <a:picLocks noChangeAspect="1"/>
-          </p:cNvPicPr>
-          <p:nvPr/>
-        </p:nvPicPr>
-        <p:blipFill>
-          <a:blip r:embed="rId4"/>
-          <a:stretch>
-            <a:fillRect/>
-          </a:stretch>
-        </p:blipFill>
-        <p:spPr>
-          <a:xfrm>
-            <a:off x="6095999" y="2306474"/>
-            <a:ext cx="5385183" cy="3912211"/>
-          </a:xfrm>
-          <a:prstGeom prst="rect">
-            <a:avLst/>
-          </a:prstGeom>
-        </p:spPr>
-      </p:pic>
     </p:spTree>
     <p:extLst>
       <p:ext uri="{BB962C8B-B14F-4D97-AF65-F5344CB8AC3E}">
@@ -9717,6 +11297,203 @@
   <p:clrMapOvr>
     <a:masterClrMapping/>
   </p:clrMapOvr>
+  <p:timing>
+    <p:tnLst>
+      <p:par>
+        <p:cTn id="1" dur="indefinite" restart="never" nodeType="tmRoot">
+          <p:childTnLst>
+            <p:seq concurrent="1" nextAc="seek">
+              <p:cTn id="2" dur="indefinite" nodeType="mainSeq">
+                <p:childTnLst>
+                  <p:par>
+                    <p:cTn id="3" fill="hold">
+                      <p:stCondLst>
+                        <p:cond delay="indefinite"/>
+                      </p:stCondLst>
+                      <p:childTnLst>
+                        <p:par>
+                          <p:cTn id="4" fill="hold">
+                            <p:stCondLst>
+                              <p:cond delay="0"/>
+                            </p:stCondLst>
+                            <p:childTnLst>
+                              <p:par>
+                                <p:cTn id="5" presetID="31" presetClass="entr" presetSubtype="0" fill="hold" nodeType="clickEffect">
+                                  <p:stCondLst>
+                                    <p:cond delay="0"/>
+                                  </p:stCondLst>
+                                  <p:childTnLst>
+                                    <p:set>
+                                      <p:cBhvr>
+                                        <p:cTn id="6" dur="1" fill="hold">
+                                          <p:stCondLst>
+                                            <p:cond delay="0"/>
+                                          </p:stCondLst>
+                                        </p:cTn>
+                                        <p:tgtEl>
+                                          <p:spTgt spid="7"/>
+                                        </p:tgtEl>
+                                        <p:attrNameLst>
+                                          <p:attrName>style.visibility</p:attrName>
+                                        </p:attrNameLst>
+                                      </p:cBhvr>
+                                      <p:to>
+                                        <p:strVal val="visible"/>
+                                      </p:to>
+                                    </p:set>
+                                    <p:anim calcmode="lin" valueType="num">
+                                      <p:cBhvr>
+                                        <p:cTn id="7" dur="1000" fill="hold"/>
+                                        <p:tgtEl>
+                                          <p:spTgt spid="7"/>
+                                        </p:tgtEl>
+                                        <p:attrNameLst>
+                                          <p:attrName>ppt_w</p:attrName>
+                                        </p:attrNameLst>
+                                      </p:cBhvr>
+                                      <p:tavLst>
+                                        <p:tav tm="0">
+                                          <p:val>
+                                            <p:fltVal val="0"/>
+                                          </p:val>
+                                        </p:tav>
+                                        <p:tav tm="100000">
+                                          <p:val>
+                                            <p:strVal val="#ppt_w"/>
+                                          </p:val>
+                                        </p:tav>
+                                      </p:tavLst>
+                                    </p:anim>
+                                    <p:anim calcmode="lin" valueType="num">
+                                      <p:cBhvr>
+                                        <p:cTn id="8" dur="1000" fill="hold"/>
+                                        <p:tgtEl>
+                                          <p:spTgt spid="7"/>
+                                        </p:tgtEl>
+                                        <p:attrNameLst>
+                                          <p:attrName>ppt_h</p:attrName>
+                                        </p:attrNameLst>
+                                      </p:cBhvr>
+                                      <p:tavLst>
+                                        <p:tav tm="0">
+                                          <p:val>
+                                            <p:fltVal val="0"/>
+                                          </p:val>
+                                        </p:tav>
+                                        <p:tav tm="100000">
+                                          <p:val>
+                                            <p:strVal val="#ppt_h"/>
+                                          </p:val>
+                                        </p:tav>
+                                      </p:tavLst>
+                                    </p:anim>
+                                    <p:anim calcmode="lin" valueType="num">
+                                      <p:cBhvr>
+                                        <p:cTn id="9" dur="1000" fill="hold"/>
+                                        <p:tgtEl>
+                                          <p:spTgt spid="7"/>
+                                        </p:tgtEl>
+                                        <p:attrNameLst>
+                                          <p:attrName>style.rotation</p:attrName>
+                                        </p:attrNameLst>
+                                      </p:cBhvr>
+                                      <p:tavLst>
+                                        <p:tav tm="0">
+                                          <p:val>
+                                            <p:fltVal val="90"/>
+                                          </p:val>
+                                        </p:tav>
+                                        <p:tav tm="100000">
+                                          <p:val>
+                                            <p:fltVal val="0"/>
+                                          </p:val>
+                                        </p:tav>
+                                      </p:tavLst>
+                                    </p:anim>
+                                    <p:animEffect transition="in" filter="fade">
+                                      <p:cBhvr>
+                                        <p:cTn id="10" dur="1000"/>
+                                        <p:tgtEl>
+                                          <p:spTgt spid="7"/>
+                                        </p:tgtEl>
+                                      </p:cBhvr>
+                                    </p:animEffect>
+                                  </p:childTnLst>
+                                </p:cTn>
+                              </p:par>
+                            </p:childTnLst>
+                          </p:cTn>
+                        </p:par>
+                      </p:childTnLst>
+                    </p:cTn>
+                  </p:par>
+                  <p:par>
+                    <p:cTn id="11" fill="hold">
+                      <p:stCondLst>
+                        <p:cond delay="indefinite"/>
+                      </p:stCondLst>
+                      <p:childTnLst>
+                        <p:par>
+                          <p:cTn id="12" fill="hold">
+                            <p:stCondLst>
+                              <p:cond delay="0"/>
+                            </p:stCondLst>
+                            <p:childTnLst>
+                              <p:par>
+                                <p:cTn id="13" presetID="1" presetClass="entr" presetSubtype="0" fill="hold" nodeType="clickEffect">
+                                  <p:stCondLst>
+                                    <p:cond delay="0"/>
+                                  </p:stCondLst>
+                                  <p:childTnLst>
+                                    <p:set>
+                                      <p:cBhvr>
+                                        <p:cTn id="14" dur="1" fill="hold">
+                                          <p:stCondLst>
+                                            <p:cond delay="0"/>
+                                          </p:stCondLst>
+                                        </p:cTn>
+                                        <p:tgtEl>
+                                          <p:spTgt spid="3"/>
+                                        </p:tgtEl>
+                                        <p:attrNameLst>
+                                          <p:attrName>style.visibility</p:attrName>
+                                        </p:attrNameLst>
+                                      </p:cBhvr>
+                                      <p:to>
+                                        <p:strVal val="visible"/>
+                                      </p:to>
+                                    </p:set>
+                                  </p:childTnLst>
+                                </p:cTn>
+                              </p:par>
+                            </p:childTnLst>
+                          </p:cTn>
+                        </p:par>
+                      </p:childTnLst>
+                    </p:cTn>
+                  </p:par>
+                </p:childTnLst>
+              </p:cTn>
+              <p:prevCondLst>
+                <p:cond evt="onPrev" delay="0">
+                  <p:tgtEl>
+                    <p:sldTgt/>
+                  </p:tgtEl>
+                </p:cond>
+              </p:prevCondLst>
+              <p:nextCondLst>
+                <p:cond evt="onNext" delay="0">
+                  <p:tgtEl>
+                    <p:sldTgt/>
+                  </p:tgtEl>
+                </p:cond>
+              </p:nextCondLst>
+            </p:seq>
+          </p:childTnLst>
+        </p:cTn>
+      </p:par>
+    </p:tnLst>
+  </p:timing>
 </p:sld>
 </file>
 
@@ -9850,18 +11627,6 @@
           <a:bodyPr/>
           <a:lstStyle/>
           <a:p>
-            <a:r>
-              <a:rPr lang="en-US" dirty="0"/>
-              <a:t>Migration Pattern and time frame</a:t>
-            </a:r>
-          </a:p>
-          <a:p>
-            <a:r>
-              <a:rPr lang="en-US" dirty="0"/>
-              <a:t>Observable Trends</a:t>
-            </a:r>
-          </a:p>
-          <a:p>
             <a:pPr marL="0" indent="0">
               <a:buNone/>
             </a:pPr>
@@ -9891,8 +11656,8 @@
         </p:blipFill>
         <p:spPr>
           <a:xfrm>
-            <a:off x="5688281" y="2263139"/>
-            <a:ext cx="6105682" cy="3777244"/>
+            <a:off x="2788197" y="2194560"/>
+            <a:ext cx="6615605" cy="4092705"/>
           </a:xfrm>
           <a:prstGeom prst="rect">
             <a:avLst/>
@@ -9909,6 +11674,203 @@
   <p:clrMapOvr>
     <a:masterClrMapping/>
   </p:clrMapOvr>
+  <p:timing>
+    <p:tnLst>
+      <p:par>
+        <p:cTn id="1" dur="indefinite" restart="never" nodeType="tmRoot">
+          <p:childTnLst>
+            <p:seq concurrent="1" nextAc="seek">
+              <p:cTn id="2" dur="indefinite" nodeType="mainSeq">
+                <p:childTnLst>
+                  <p:par>
+                    <p:cTn id="3" fill="hold">
+                      <p:stCondLst>
+                        <p:cond delay="indefinite"/>
+                      </p:stCondLst>
+                      <p:childTnLst>
+                        <p:par>
+                          <p:cTn id="4" fill="hold">
+                            <p:stCondLst>
+                              <p:cond delay="0"/>
+                            </p:stCondLst>
+                            <p:childTnLst>
+                              <p:par>
+                                <p:cTn id="5" presetID="31" presetClass="entr" presetSubtype="0" fill="hold" nodeType="clickEffect">
+                                  <p:stCondLst>
+                                    <p:cond delay="0"/>
+                                  </p:stCondLst>
+                                  <p:childTnLst>
+                                    <p:set>
+                                      <p:cBhvr>
+                                        <p:cTn id="6" dur="1" fill="hold">
+                                          <p:stCondLst>
+                                            <p:cond delay="0"/>
+                                          </p:stCondLst>
+                                        </p:cTn>
+                                        <p:tgtEl>
+                                          <p:spTgt spid="5"/>
+                                        </p:tgtEl>
+                                        <p:attrNameLst>
+                                          <p:attrName>style.visibility</p:attrName>
+                                        </p:attrNameLst>
+                                      </p:cBhvr>
+                                      <p:to>
+                                        <p:strVal val="visible"/>
+                                      </p:to>
+                                    </p:set>
+                                    <p:anim calcmode="lin" valueType="num">
+                                      <p:cBhvr>
+                                        <p:cTn id="7" dur="1000" fill="hold"/>
+                                        <p:tgtEl>
+                                          <p:spTgt spid="5"/>
+                                        </p:tgtEl>
+                                        <p:attrNameLst>
+                                          <p:attrName>ppt_w</p:attrName>
+                                        </p:attrNameLst>
+                                      </p:cBhvr>
+                                      <p:tavLst>
+                                        <p:tav tm="0">
+                                          <p:val>
+                                            <p:fltVal val="0"/>
+                                          </p:val>
+                                        </p:tav>
+                                        <p:tav tm="100000">
+                                          <p:val>
+                                            <p:strVal val="#ppt_w"/>
+                                          </p:val>
+                                        </p:tav>
+                                      </p:tavLst>
+                                    </p:anim>
+                                    <p:anim calcmode="lin" valueType="num">
+                                      <p:cBhvr>
+                                        <p:cTn id="8" dur="1000" fill="hold"/>
+                                        <p:tgtEl>
+                                          <p:spTgt spid="5"/>
+                                        </p:tgtEl>
+                                        <p:attrNameLst>
+                                          <p:attrName>ppt_h</p:attrName>
+                                        </p:attrNameLst>
+                                      </p:cBhvr>
+                                      <p:tavLst>
+                                        <p:tav tm="0">
+                                          <p:val>
+                                            <p:fltVal val="0"/>
+                                          </p:val>
+                                        </p:tav>
+                                        <p:tav tm="100000">
+                                          <p:val>
+                                            <p:strVal val="#ppt_h"/>
+                                          </p:val>
+                                        </p:tav>
+                                      </p:tavLst>
+                                    </p:anim>
+                                    <p:anim calcmode="lin" valueType="num">
+                                      <p:cBhvr>
+                                        <p:cTn id="9" dur="1000" fill="hold"/>
+                                        <p:tgtEl>
+                                          <p:spTgt spid="5"/>
+                                        </p:tgtEl>
+                                        <p:attrNameLst>
+                                          <p:attrName>style.rotation</p:attrName>
+                                        </p:attrNameLst>
+                                      </p:cBhvr>
+                                      <p:tavLst>
+                                        <p:tav tm="0">
+                                          <p:val>
+                                            <p:fltVal val="90"/>
+                                          </p:val>
+                                        </p:tav>
+                                        <p:tav tm="100000">
+                                          <p:val>
+                                            <p:fltVal val="0"/>
+                                          </p:val>
+                                        </p:tav>
+                                      </p:tavLst>
+                                    </p:anim>
+                                    <p:animEffect transition="in" filter="fade">
+                                      <p:cBhvr>
+                                        <p:cTn id="10" dur="1000"/>
+                                        <p:tgtEl>
+                                          <p:spTgt spid="5"/>
+                                        </p:tgtEl>
+                                      </p:cBhvr>
+                                    </p:animEffect>
+                                  </p:childTnLst>
+                                </p:cTn>
+                              </p:par>
+                            </p:childTnLst>
+                          </p:cTn>
+                        </p:par>
+                      </p:childTnLst>
+                    </p:cTn>
+                  </p:par>
+                  <p:par>
+                    <p:cTn id="11" fill="hold">
+                      <p:stCondLst>
+                        <p:cond delay="indefinite"/>
+                      </p:stCondLst>
+                      <p:childTnLst>
+                        <p:par>
+                          <p:cTn id="12" fill="hold">
+                            <p:stCondLst>
+                              <p:cond delay="0"/>
+                            </p:stCondLst>
+                            <p:childTnLst>
+                              <p:par>
+                                <p:cTn id="13" presetID="1" presetClass="entr" presetSubtype="0" fill="hold" nodeType="clickEffect">
+                                  <p:stCondLst>
+                                    <p:cond delay="0"/>
+                                  </p:stCondLst>
+                                  <p:childTnLst>
+                                    <p:set>
+                                      <p:cBhvr>
+                                        <p:cTn id="14" dur="1" fill="hold">
+                                          <p:stCondLst>
+                                            <p:cond delay="0"/>
+                                          </p:stCondLst>
+                                        </p:cTn>
+                                        <p:tgtEl>
+                                          <p:spTgt spid="3"/>
+                                        </p:tgtEl>
+                                        <p:attrNameLst>
+                                          <p:attrName>style.visibility</p:attrName>
+                                        </p:attrNameLst>
+                                      </p:cBhvr>
+                                      <p:to>
+                                        <p:strVal val="visible"/>
+                                      </p:to>
+                                    </p:set>
+                                  </p:childTnLst>
+                                </p:cTn>
+                              </p:par>
+                            </p:childTnLst>
+                          </p:cTn>
+                        </p:par>
+                      </p:childTnLst>
+                    </p:cTn>
+                  </p:par>
+                </p:childTnLst>
+              </p:cTn>
+              <p:prevCondLst>
+                <p:cond evt="onPrev" delay="0">
+                  <p:tgtEl>
+                    <p:sldTgt/>
+                  </p:tgtEl>
+                </p:cond>
+              </p:prevCondLst>
+              <p:nextCondLst>
+                <p:cond evt="onNext" delay="0">
+                  <p:tgtEl>
+                    <p:sldTgt/>
+                  </p:tgtEl>
+                </p:cond>
+              </p:nextCondLst>
+            </p:seq>
+          </p:childTnLst>
+        </p:cTn>
+      </p:par>
+    </p:tnLst>
+  </p:timing>
 </p:sld>
 </file>
 

</xml_diff>